<commit_message>
added final changes to case study and updated the ppt
</commit_message>
<xml_diff>
--- a/PROMPT_ENGINEERING_AND_AI/caseStudies/Medical_Diagnosis_With_Prompt_Engineering/Insights_on AI_and_Prompt_Engineering.pptx
+++ b/PROMPT_ENGINEERING_AND_AI/caseStudies/Medical_Diagnosis_With_Prompt_Engineering/Insights_on AI_and_Prompt_Engineering.pptx
@@ -27,6 +27,16 @@
     <p:sldId id="272" r:id="rId22"/>
     <p:sldId id="273" r:id="rId23"/>
     <p:sldId id="274" r:id="rId24"/>
+    <p:sldId id="275" r:id="rId25"/>
+    <p:sldId id="276" r:id="rId26"/>
+    <p:sldId id="277" r:id="rId27"/>
+    <p:sldId id="278" r:id="rId28"/>
+    <p:sldId id="279" r:id="rId29"/>
+    <p:sldId id="280" r:id="rId30"/>
+    <p:sldId id="281" r:id="rId31"/>
+    <p:sldId id="282" r:id="rId32"/>
+    <p:sldId id="283" r:id="rId33"/>
+    <p:sldId id="284" r:id="rId34"/>
   </p:sldIdLst>
   <p:sldSz cy="5143500" cx="9144000"/>
   <p:notesSz cx="6858000" cy="9144000"/>
@@ -1105,7 +1115,7 @@
   <p:cSld>
     <p:spTree>
       <p:nvGrpSpPr>
-        <p:cNvPr id="120" name="Shape 120"/>
+        <p:cNvPr id="121" name="Shape 121"/>
         <p:cNvGrpSpPr/>
         <p:nvPr/>
       </p:nvGrpSpPr>
@@ -1119,7 +1129,7 @@
       </p:grpSpPr>
       <p:sp>
         <p:nvSpPr>
-          <p:cNvPr id="121" name="Google Shape;121;g2c579e6fbc8_0_3188:notes"/>
+          <p:cNvPr id="122" name="Google Shape;122;g2c579e6fbc8_0_3188:notes"/>
           <p:cNvSpPr/>
           <p:nvPr>
             <p:ph idx="2" type="sldImg"/>
@@ -1154,7 +1164,7 @@
       </p:sp>
       <p:sp>
         <p:nvSpPr>
-          <p:cNvPr id="122" name="Google Shape;122;g2c579e6fbc8_0_3188:notes"/>
+          <p:cNvPr id="123" name="Google Shape;123;g2c579e6fbc8_0_3188:notes"/>
           <p:cNvSpPr txBox="1"/>
           <p:nvPr>
             <p:ph idx="1" type="body"/>
@@ -1204,7 +1214,7 @@
   <p:cSld>
     <p:spTree>
       <p:nvGrpSpPr>
-        <p:cNvPr id="127" name="Shape 127"/>
+        <p:cNvPr id="128" name="Shape 128"/>
         <p:cNvGrpSpPr/>
         <p:nvPr/>
       </p:nvGrpSpPr>
@@ -1218,7 +1228,7 @@
       </p:grpSpPr>
       <p:sp>
         <p:nvSpPr>
-          <p:cNvPr id="128" name="Google Shape;128;g2c579e6fbc8_0_3195:notes"/>
+          <p:cNvPr id="129" name="Google Shape;129;g2c579e6fbc8_0_3195:notes"/>
           <p:cNvSpPr/>
           <p:nvPr>
             <p:ph idx="2" type="sldImg"/>
@@ -1253,7 +1263,7 @@
       </p:sp>
       <p:sp>
         <p:nvSpPr>
-          <p:cNvPr id="129" name="Google Shape;129;g2c579e6fbc8_0_3195:notes"/>
+          <p:cNvPr id="130" name="Google Shape;130;g2c579e6fbc8_0_3195:notes"/>
           <p:cNvSpPr txBox="1"/>
           <p:nvPr>
             <p:ph idx="1" type="body"/>
@@ -1303,7 +1313,7 @@
   <p:cSld>
     <p:spTree>
       <p:nvGrpSpPr>
-        <p:cNvPr id="134" name="Shape 134"/>
+        <p:cNvPr id="135" name="Shape 135"/>
         <p:cNvGrpSpPr/>
         <p:nvPr/>
       </p:nvGrpSpPr>
@@ -1317,7 +1327,7 @@
       </p:grpSpPr>
       <p:sp>
         <p:nvSpPr>
-          <p:cNvPr id="135" name="Google Shape;135;g2c579e6fbc8_0_3204:notes"/>
+          <p:cNvPr id="136" name="Google Shape;136;g2c579e6fbc8_0_3204:notes"/>
           <p:cNvSpPr/>
           <p:nvPr>
             <p:ph idx="2" type="sldImg"/>
@@ -1352,7 +1362,7 @@
       </p:sp>
       <p:sp>
         <p:nvSpPr>
-          <p:cNvPr id="136" name="Google Shape;136;g2c579e6fbc8_0_3204:notes"/>
+          <p:cNvPr id="137" name="Google Shape;137;g2c579e6fbc8_0_3204:notes"/>
           <p:cNvSpPr txBox="1"/>
           <p:nvPr>
             <p:ph idx="1" type="body"/>
@@ -1402,7 +1412,7 @@
   <p:cSld>
     <p:spTree>
       <p:nvGrpSpPr>
-        <p:cNvPr id="140" name="Shape 140"/>
+        <p:cNvPr id="141" name="Shape 141"/>
         <p:cNvGrpSpPr/>
         <p:nvPr/>
       </p:nvGrpSpPr>
@@ -1416,7 +1426,7 @@
       </p:grpSpPr>
       <p:sp>
         <p:nvSpPr>
-          <p:cNvPr id="141" name="Google Shape;141;g2c579e6fbc8_0_3214:notes"/>
+          <p:cNvPr id="142" name="Google Shape;142;g2c579e6fbc8_0_3214:notes"/>
           <p:cNvSpPr/>
           <p:nvPr>
             <p:ph idx="2" type="sldImg"/>
@@ -1451,7 +1461,7 @@
       </p:sp>
       <p:sp>
         <p:nvSpPr>
-          <p:cNvPr id="142" name="Google Shape;142;g2c579e6fbc8_0_3214:notes"/>
+          <p:cNvPr id="143" name="Google Shape;143;g2c579e6fbc8_0_3214:notes"/>
           <p:cNvSpPr txBox="1"/>
           <p:nvPr>
             <p:ph idx="1" type="body"/>
@@ -1501,7 +1511,7 @@
   <p:cSld>
     <p:spTree>
       <p:nvGrpSpPr>
-        <p:cNvPr id="146" name="Shape 146"/>
+        <p:cNvPr id="147" name="Shape 147"/>
         <p:cNvGrpSpPr/>
         <p:nvPr/>
       </p:nvGrpSpPr>
@@ -1515,7 +1525,7 @@
       </p:grpSpPr>
       <p:sp>
         <p:nvSpPr>
-          <p:cNvPr id="147" name="Google Shape;147;g2c579e6fbc8_0_3219:notes"/>
+          <p:cNvPr id="148" name="Google Shape;148;g2c579e6fbc8_0_3219:notes"/>
           <p:cNvSpPr/>
           <p:nvPr>
             <p:ph idx="2" type="sldImg"/>
@@ -1550,7 +1560,7 @@
       </p:sp>
       <p:sp>
         <p:nvSpPr>
-          <p:cNvPr id="148" name="Google Shape;148;g2c579e6fbc8_0_3219:notes"/>
+          <p:cNvPr id="149" name="Google Shape;149;g2c579e6fbc8_0_3219:notes"/>
           <p:cNvSpPr txBox="1"/>
           <p:nvPr>
             <p:ph idx="1" type="body"/>
@@ -1600,7 +1610,7 @@
   <p:cSld>
     <p:spTree>
       <p:nvGrpSpPr>
-        <p:cNvPr id="153" name="Shape 153"/>
+        <p:cNvPr id="154" name="Shape 154"/>
         <p:cNvGrpSpPr/>
         <p:nvPr/>
       </p:nvGrpSpPr>
@@ -1614,7 +1624,7 @@
       </p:grpSpPr>
       <p:sp>
         <p:nvSpPr>
-          <p:cNvPr id="154" name="Google Shape;154;g2c579e6fbc8_0_3227:notes"/>
+          <p:cNvPr id="155" name="Google Shape;155;g2c579e6fbc8_0_3227:notes"/>
           <p:cNvSpPr/>
           <p:nvPr>
             <p:ph idx="2" type="sldImg"/>
@@ -1649,7 +1659,7 @@
       </p:sp>
       <p:sp>
         <p:nvSpPr>
-          <p:cNvPr id="155" name="Google Shape;155;g2c579e6fbc8_0_3227:notes"/>
+          <p:cNvPr id="156" name="Google Shape;156;g2c579e6fbc8_0_3227:notes"/>
           <p:cNvSpPr txBox="1"/>
           <p:nvPr>
             <p:ph idx="1" type="body"/>
@@ -1699,7 +1709,7 @@
   <p:cSld>
     <p:spTree>
       <p:nvGrpSpPr>
-        <p:cNvPr id="160" name="Shape 160"/>
+        <p:cNvPr id="161" name="Shape 161"/>
         <p:cNvGrpSpPr/>
         <p:nvPr/>
       </p:nvGrpSpPr>
@@ -1713,7 +1723,7 @@
       </p:grpSpPr>
       <p:sp>
         <p:nvSpPr>
-          <p:cNvPr id="161" name="Google Shape;161;g2c579e6fbc8_0_3233:notes"/>
+          <p:cNvPr id="162" name="Google Shape;162;g2c579e6fbc8_0_3233:notes"/>
           <p:cNvSpPr/>
           <p:nvPr>
             <p:ph idx="2" type="sldImg"/>
@@ -1748,7 +1758,7 @@
       </p:sp>
       <p:sp>
         <p:nvSpPr>
-          <p:cNvPr id="162" name="Google Shape;162;g2c579e6fbc8_0_3233:notes"/>
+          <p:cNvPr id="163" name="Google Shape;163;g2c579e6fbc8_0_3233:notes"/>
           <p:cNvSpPr txBox="1"/>
           <p:nvPr>
             <p:ph idx="1" type="body"/>
@@ -1848,6 +1858,996 @@
       <p:sp>
         <p:nvSpPr>
           <p:cNvPr id="58" name="Google Shape;58;g2c579e6fbc8_0_79:notes"/>
+          <p:cNvSpPr txBox="1"/>
+          <p:nvPr>
+            <p:ph idx="1" type="body"/>
+          </p:nvPr>
+        </p:nvSpPr>
+        <p:spPr>
+          <a:xfrm>
+            <a:off x="685800" y="4343400"/>
+            <a:ext cx="5486400" cy="4114800"/>
+          </a:xfrm>
+          <a:prstGeom prst="rect">
+            <a:avLst/>
+          </a:prstGeom>
+        </p:spPr>
+        <p:txBody>
+          <a:bodyPr anchorCtr="0" anchor="t" bIns="91425" lIns="91425" spcFirstLastPara="1" rIns="91425" wrap="square" tIns="91425">
+            <a:noAutofit/>
+          </a:bodyPr>
+          <a:lstStyle/>
+          <a:p>
+            <a:pPr indent="0" lvl="0" marL="0" rtl="0" algn="l">
+              <a:spcBef>
+                <a:spcPts val="0"/>
+              </a:spcBef>
+              <a:spcAft>
+                <a:spcPts val="0"/>
+              </a:spcAft>
+              <a:buNone/>
+            </a:pPr>
+            <a:r>
+              <a:t/>
+            </a:r>
+            <a:endParaRPr/>
+          </a:p>
+        </p:txBody>
+      </p:sp>
+    </p:spTree>
+  </p:cSld>
+  <p:clrMapOvr>
+    <a:masterClrMapping/>
+  </p:clrMapOvr>
+</p:notes>
+</file>
+
+<file path=ppt/notesSlides/notesSlide20.xml><?xml version="1.0" encoding="utf-8"?>
+<p:notes xmlns:a="http://schemas.openxmlformats.org/drawingml/2006/main" xmlns:r="http://schemas.openxmlformats.org/officeDocument/2006/relationships" xmlns:mc="http://schemas.openxmlformats.org/markup-compatibility/2006" xmlns:mv="urn:schemas-microsoft-com:mac:vml" xmlns:p="http://schemas.openxmlformats.org/presentationml/2006/main" xmlns:c="http://schemas.openxmlformats.org/drawingml/2006/chart" xmlns:dgm="http://schemas.openxmlformats.org/drawingml/2006/diagram" xmlns:o="urn:schemas-microsoft-com:office:office" xmlns:v="urn:schemas-microsoft-com:vml" xmlns:pvml="urn:schemas-microsoft-com:office:powerpoint" xmlns:com="http://schemas.openxmlformats.org/drawingml/2006/compatibility" xmlns:p14="http://schemas.microsoft.com/office/powerpoint/2010/main" xmlns:p15="http://schemas.microsoft.com/office/powerpoint/2012/main" xmlns:ahyp="http://schemas.microsoft.com/office/drawing/2018/hyperlinkcolor" showMasterPhAnim="0" showMasterSp="0">
+  <p:cSld>
+    <p:spTree>
+      <p:nvGrpSpPr>
+        <p:cNvPr id="167" name="Shape 167"/>
+        <p:cNvGrpSpPr/>
+        <p:nvPr/>
+      </p:nvGrpSpPr>
+      <p:grpSpPr>
+        <a:xfrm>
+          <a:off x="0" y="0"/>
+          <a:ext cx="0" cy="0"/>
+          <a:chOff x="0" y="0"/>
+          <a:chExt cx="0" cy="0"/>
+        </a:xfrm>
+      </p:grpSpPr>
+      <p:sp>
+        <p:nvSpPr>
+          <p:cNvPr id="168" name="Google Shape;168;g2c84522b22c_1_0:notes"/>
+          <p:cNvSpPr/>
+          <p:nvPr>
+            <p:ph idx="2" type="sldImg"/>
+          </p:nvPr>
+        </p:nvSpPr>
+        <p:spPr>
+          <a:xfrm>
+            <a:off x="381300" y="685800"/>
+            <a:ext cx="6096000" cy="3429000"/>
+          </a:xfrm>
+          <a:custGeom>
+            <a:rect b="b" l="l" r="r" t="t"/>
+            <a:pathLst>
+              <a:path extrusionOk="0" h="120000" w="120000">
+                <a:moveTo>
+                  <a:pt x="0" y="0"/>
+                </a:moveTo>
+                <a:lnTo>
+                  <a:pt x="120000" y="0"/>
+                </a:lnTo>
+                <a:lnTo>
+                  <a:pt x="120000" y="120000"/>
+                </a:lnTo>
+                <a:lnTo>
+                  <a:pt x="0" y="120000"/>
+                </a:lnTo>
+                <a:close/>
+              </a:path>
+            </a:pathLst>
+          </a:custGeom>
+        </p:spPr>
+      </p:sp>
+      <p:sp>
+        <p:nvSpPr>
+          <p:cNvPr id="169" name="Google Shape;169;g2c84522b22c_1_0:notes"/>
+          <p:cNvSpPr txBox="1"/>
+          <p:nvPr>
+            <p:ph idx="1" type="body"/>
+          </p:nvPr>
+        </p:nvSpPr>
+        <p:spPr>
+          <a:xfrm>
+            <a:off x="685800" y="4343400"/>
+            <a:ext cx="5486400" cy="4114800"/>
+          </a:xfrm>
+          <a:prstGeom prst="rect">
+            <a:avLst/>
+          </a:prstGeom>
+        </p:spPr>
+        <p:txBody>
+          <a:bodyPr anchorCtr="0" anchor="t" bIns="91425" lIns="91425" spcFirstLastPara="1" rIns="91425" wrap="square" tIns="91425">
+            <a:noAutofit/>
+          </a:bodyPr>
+          <a:lstStyle/>
+          <a:p>
+            <a:pPr indent="0" lvl="0" marL="0" rtl="0" algn="l">
+              <a:spcBef>
+                <a:spcPts val="0"/>
+              </a:spcBef>
+              <a:spcAft>
+                <a:spcPts val="0"/>
+              </a:spcAft>
+              <a:buNone/>
+            </a:pPr>
+            <a:r>
+              <a:t/>
+            </a:r>
+            <a:endParaRPr/>
+          </a:p>
+        </p:txBody>
+      </p:sp>
+    </p:spTree>
+  </p:cSld>
+  <p:clrMapOvr>
+    <a:masterClrMapping/>
+  </p:clrMapOvr>
+</p:notes>
+</file>
+
+<file path=ppt/notesSlides/notesSlide21.xml><?xml version="1.0" encoding="utf-8"?>
+<p:notes xmlns:a="http://schemas.openxmlformats.org/drawingml/2006/main" xmlns:r="http://schemas.openxmlformats.org/officeDocument/2006/relationships" xmlns:mc="http://schemas.openxmlformats.org/markup-compatibility/2006" xmlns:mv="urn:schemas-microsoft-com:mac:vml" xmlns:p="http://schemas.openxmlformats.org/presentationml/2006/main" xmlns:c="http://schemas.openxmlformats.org/drawingml/2006/chart" xmlns:dgm="http://schemas.openxmlformats.org/drawingml/2006/diagram" xmlns:o="urn:schemas-microsoft-com:office:office" xmlns:v="urn:schemas-microsoft-com:vml" xmlns:pvml="urn:schemas-microsoft-com:office:powerpoint" xmlns:com="http://schemas.openxmlformats.org/drawingml/2006/compatibility" xmlns:p14="http://schemas.microsoft.com/office/powerpoint/2010/main" xmlns:p15="http://schemas.microsoft.com/office/powerpoint/2012/main" xmlns:ahyp="http://schemas.microsoft.com/office/drawing/2018/hyperlinkcolor" showMasterPhAnim="0" showMasterSp="0">
+  <p:cSld>
+    <p:spTree>
+      <p:nvGrpSpPr>
+        <p:cNvPr id="172" name="Shape 172"/>
+        <p:cNvGrpSpPr/>
+        <p:nvPr/>
+      </p:nvGrpSpPr>
+      <p:grpSpPr>
+        <a:xfrm>
+          <a:off x="0" y="0"/>
+          <a:ext cx="0" cy="0"/>
+          <a:chOff x="0" y="0"/>
+          <a:chExt cx="0" cy="0"/>
+        </a:xfrm>
+      </p:grpSpPr>
+      <p:sp>
+        <p:nvSpPr>
+          <p:cNvPr id="173" name="Google Shape;173;g2c84522b22c_1_6:notes"/>
+          <p:cNvSpPr/>
+          <p:nvPr>
+            <p:ph idx="2" type="sldImg"/>
+          </p:nvPr>
+        </p:nvSpPr>
+        <p:spPr>
+          <a:xfrm>
+            <a:off x="381300" y="685800"/>
+            <a:ext cx="6096000" cy="3429000"/>
+          </a:xfrm>
+          <a:custGeom>
+            <a:rect b="b" l="l" r="r" t="t"/>
+            <a:pathLst>
+              <a:path extrusionOk="0" h="120000" w="120000">
+                <a:moveTo>
+                  <a:pt x="0" y="0"/>
+                </a:moveTo>
+                <a:lnTo>
+                  <a:pt x="120000" y="0"/>
+                </a:lnTo>
+                <a:lnTo>
+                  <a:pt x="120000" y="120000"/>
+                </a:lnTo>
+                <a:lnTo>
+                  <a:pt x="0" y="120000"/>
+                </a:lnTo>
+                <a:close/>
+              </a:path>
+            </a:pathLst>
+          </a:custGeom>
+        </p:spPr>
+      </p:sp>
+      <p:sp>
+        <p:nvSpPr>
+          <p:cNvPr id="174" name="Google Shape;174;g2c84522b22c_1_6:notes"/>
+          <p:cNvSpPr txBox="1"/>
+          <p:nvPr>
+            <p:ph idx="1" type="body"/>
+          </p:nvPr>
+        </p:nvSpPr>
+        <p:spPr>
+          <a:xfrm>
+            <a:off x="685800" y="4343400"/>
+            <a:ext cx="5486400" cy="4114800"/>
+          </a:xfrm>
+          <a:prstGeom prst="rect">
+            <a:avLst/>
+          </a:prstGeom>
+        </p:spPr>
+        <p:txBody>
+          <a:bodyPr anchorCtr="0" anchor="t" bIns="91425" lIns="91425" spcFirstLastPara="1" rIns="91425" wrap="square" tIns="91425">
+            <a:noAutofit/>
+          </a:bodyPr>
+          <a:lstStyle/>
+          <a:p>
+            <a:pPr indent="0" lvl="0" marL="0" rtl="0" algn="l">
+              <a:spcBef>
+                <a:spcPts val="0"/>
+              </a:spcBef>
+              <a:spcAft>
+                <a:spcPts val="0"/>
+              </a:spcAft>
+              <a:buNone/>
+            </a:pPr>
+            <a:r>
+              <a:t/>
+            </a:r>
+            <a:endParaRPr/>
+          </a:p>
+        </p:txBody>
+      </p:sp>
+    </p:spTree>
+  </p:cSld>
+  <p:clrMapOvr>
+    <a:masterClrMapping/>
+  </p:clrMapOvr>
+</p:notes>
+</file>
+
+<file path=ppt/notesSlides/notesSlide22.xml><?xml version="1.0" encoding="utf-8"?>
+<p:notes xmlns:a="http://schemas.openxmlformats.org/drawingml/2006/main" xmlns:r="http://schemas.openxmlformats.org/officeDocument/2006/relationships" xmlns:mc="http://schemas.openxmlformats.org/markup-compatibility/2006" xmlns:mv="urn:schemas-microsoft-com:mac:vml" xmlns:p="http://schemas.openxmlformats.org/presentationml/2006/main" xmlns:c="http://schemas.openxmlformats.org/drawingml/2006/chart" xmlns:dgm="http://schemas.openxmlformats.org/drawingml/2006/diagram" xmlns:o="urn:schemas-microsoft-com:office:office" xmlns:v="urn:schemas-microsoft-com:vml" xmlns:pvml="urn:schemas-microsoft-com:office:powerpoint" xmlns:com="http://schemas.openxmlformats.org/drawingml/2006/compatibility" xmlns:p14="http://schemas.microsoft.com/office/powerpoint/2010/main" xmlns:p15="http://schemas.microsoft.com/office/powerpoint/2012/main" xmlns:ahyp="http://schemas.microsoft.com/office/drawing/2018/hyperlinkcolor" showMasterPhAnim="0" showMasterSp="0">
+  <p:cSld>
+    <p:spTree>
+      <p:nvGrpSpPr>
+        <p:cNvPr id="178" name="Shape 178"/>
+        <p:cNvGrpSpPr/>
+        <p:nvPr/>
+      </p:nvGrpSpPr>
+      <p:grpSpPr>
+        <a:xfrm>
+          <a:off x="0" y="0"/>
+          <a:ext cx="0" cy="0"/>
+          <a:chOff x="0" y="0"/>
+          <a:chExt cx="0" cy="0"/>
+        </a:xfrm>
+      </p:grpSpPr>
+      <p:sp>
+        <p:nvSpPr>
+          <p:cNvPr id="179" name="Google Shape;179;g2c84522b22c_1_11:notes"/>
+          <p:cNvSpPr/>
+          <p:nvPr>
+            <p:ph idx="2" type="sldImg"/>
+          </p:nvPr>
+        </p:nvSpPr>
+        <p:spPr>
+          <a:xfrm>
+            <a:off x="381300" y="685800"/>
+            <a:ext cx="6096000" cy="3429000"/>
+          </a:xfrm>
+          <a:custGeom>
+            <a:rect b="b" l="l" r="r" t="t"/>
+            <a:pathLst>
+              <a:path extrusionOk="0" h="120000" w="120000">
+                <a:moveTo>
+                  <a:pt x="0" y="0"/>
+                </a:moveTo>
+                <a:lnTo>
+                  <a:pt x="120000" y="0"/>
+                </a:lnTo>
+                <a:lnTo>
+                  <a:pt x="120000" y="120000"/>
+                </a:lnTo>
+                <a:lnTo>
+                  <a:pt x="0" y="120000"/>
+                </a:lnTo>
+                <a:close/>
+              </a:path>
+            </a:pathLst>
+          </a:custGeom>
+        </p:spPr>
+      </p:sp>
+      <p:sp>
+        <p:nvSpPr>
+          <p:cNvPr id="180" name="Google Shape;180;g2c84522b22c_1_11:notes"/>
+          <p:cNvSpPr txBox="1"/>
+          <p:nvPr>
+            <p:ph idx="1" type="body"/>
+          </p:nvPr>
+        </p:nvSpPr>
+        <p:spPr>
+          <a:xfrm>
+            <a:off x="685800" y="4343400"/>
+            <a:ext cx="5486400" cy="4114800"/>
+          </a:xfrm>
+          <a:prstGeom prst="rect">
+            <a:avLst/>
+          </a:prstGeom>
+        </p:spPr>
+        <p:txBody>
+          <a:bodyPr anchorCtr="0" anchor="t" bIns="91425" lIns="91425" spcFirstLastPara="1" rIns="91425" wrap="square" tIns="91425">
+            <a:noAutofit/>
+          </a:bodyPr>
+          <a:lstStyle/>
+          <a:p>
+            <a:pPr indent="0" lvl="0" marL="0" rtl="0" algn="l">
+              <a:spcBef>
+                <a:spcPts val="0"/>
+              </a:spcBef>
+              <a:spcAft>
+                <a:spcPts val="0"/>
+              </a:spcAft>
+              <a:buNone/>
+            </a:pPr>
+            <a:r>
+              <a:t/>
+            </a:r>
+            <a:endParaRPr/>
+          </a:p>
+        </p:txBody>
+      </p:sp>
+    </p:spTree>
+  </p:cSld>
+  <p:clrMapOvr>
+    <a:masterClrMapping/>
+  </p:clrMapOvr>
+</p:notes>
+</file>
+
+<file path=ppt/notesSlides/notesSlide23.xml><?xml version="1.0" encoding="utf-8"?>
+<p:notes xmlns:a="http://schemas.openxmlformats.org/drawingml/2006/main" xmlns:r="http://schemas.openxmlformats.org/officeDocument/2006/relationships" xmlns:mc="http://schemas.openxmlformats.org/markup-compatibility/2006" xmlns:mv="urn:schemas-microsoft-com:mac:vml" xmlns:p="http://schemas.openxmlformats.org/presentationml/2006/main" xmlns:c="http://schemas.openxmlformats.org/drawingml/2006/chart" xmlns:dgm="http://schemas.openxmlformats.org/drawingml/2006/diagram" xmlns:o="urn:schemas-microsoft-com:office:office" xmlns:v="urn:schemas-microsoft-com:vml" xmlns:pvml="urn:schemas-microsoft-com:office:powerpoint" xmlns:com="http://schemas.openxmlformats.org/drawingml/2006/compatibility" xmlns:p14="http://schemas.microsoft.com/office/powerpoint/2010/main" xmlns:p15="http://schemas.microsoft.com/office/powerpoint/2012/main" xmlns:ahyp="http://schemas.microsoft.com/office/drawing/2018/hyperlinkcolor" showMasterPhAnim="0" showMasterSp="0">
+  <p:cSld>
+    <p:spTree>
+      <p:nvGrpSpPr>
+        <p:cNvPr id="184" name="Shape 184"/>
+        <p:cNvGrpSpPr/>
+        <p:nvPr/>
+      </p:nvGrpSpPr>
+      <p:grpSpPr>
+        <a:xfrm>
+          <a:off x="0" y="0"/>
+          <a:ext cx="0" cy="0"/>
+          <a:chOff x="0" y="0"/>
+          <a:chExt cx="0" cy="0"/>
+        </a:xfrm>
+      </p:grpSpPr>
+      <p:sp>
+        <p:nvSpPr>
+          <p:cNvPr id="185" name="Google Shape;185;g2c84522b22c_1_16:notes"/>
+          <p:cNvSpPr/>
+          <p:nvPr>
+            <p:ph idx="2" type="sldImg"/>
+          </p:nvPr>
+        </p:nvSpPr>
+        <p:spPr>
+          <a:xfrm>
+            <a:off x="381300" y="685800"/>
+            <a:ext cx="6096000" cy="3429000"/>
+          </a:xfrm>
+          <a:custGeom>
+            <a:rect b="b" l="l" r="r" t="t"/>
+            <a:pathLst>
+              <a:path extrusionOk="0" h="120000" w="120000">
+                <a:moveTo>
+                  <a:pt x="0" y="0"/>
+                </a:moveTo>
+                <a:lnTo>
+                  <a:pt x="120000" y="0"/>
+                </a:lnTo>
+                <a:lnTo>
+                  <a:pt x="120000" y="120000"/>
+                </a:lnTo>
+                <a:lnTo>
+                  <a:pt x="0" y="120000"/>
+                </a:lnTo>
+                <a:close/>
+              </a:path>
+            </a:pathLst>
+          </a:custGeom>
+        </p:spPr>
+      </p:sp>
+      <p:sp>
+        <p:nvSpPr>
+          <p:cNvPr id="186" name="Google Shape;186;g2c84522b22c_1_16:notes"/>
+          <p:cNvSpPr txBox="1"/>
+          <p:nvPr>
+            <p:ph idx="1" type="body"/>
+          </p:nvPr>
+        </p:nvSpPr>
+        <p:spPr>
+          <a:xfrm>
+            <a:off x="685800" y="4343400"/>
+            <a:ext cx="5486400" cy="4114800"/>
+          </a:xfrm>
+          <a:prstGeom prst="rect">
+            <a:avLst/>
+          </a:prstGeom>
+        </p:spPr>
+        <p:txBody>
+          <a:bodyPr anchorCtr="0" anchor="t" bIns="91425" lIns="91425" spcFirstLastPara="1" rIns="91425" wrap="square" tIns="91425">
+            <a:noAutofit/>
+          </a:bodyPr>
+          <a:lstStyle/>
+          <a:p>
+            <a:pPr indent="0" lvl="0" marL="0" rtl="0" algn="l">
+              <a:spcBef>
+                <a:spcPts val="0"/>
+              </a:spcBef>
+              <a:spcAft>
+                <a:spcPts val="0"/>
+              </a:spcAft>
+              <a:buNone/>
+            </a:pPr>
+            <a:r>
+              <a:t/>
+            </a:r>
+            <a:endParaRPr/>
+          </a:p>
+        </p:txBody>
+      </p:sp>
+    </p:spTree>
+  </p:cSld>
+  <p:clrMapOvr>
+    <a:masterClrMapping/>
+  </p:clrMapOvr>
+</p:notes>
+</file>
+
+<file path=ppt/notesSlides/notesSlide24.xml><?xml version="1.0" encoding="utf-8"?>
+<p:notes xmlns:a="http://schemas.openxmlformats.org/drawingml/2006/main" xmlns:r="http://schemas.openxmlformats.org/officeDocument/2006/relationships" xmlns:mc="http://schemas.openxmlformats.org/markup-compatibility/2006" xmlns:mv="urn:schemas-microsoft-com:mac:vml" xmlns:p="http://schemas.openxmlformats.org/presentationml/2006/main" xmlns:c="http://schemas.openxmlformats.org/drawingml/2006/chart" xmlns:dgm="http://schemas.openxmlformats.org/drawingml/2006/diagram" xmlns:o="urn:schemas-microsoft-com:office:office" xmlns:v="urn:schemas-microsoft-com:vml" xmlns:pvml="urn:schemas-microsoft-com:office:powerpoint" xmlns:com="http://schemas.openxmlformats.org/drawingml/2006/compatibility" xmlns:p14="http://schemas.microsoft.com/office/powerpoint/2010/main" xmlns:p15="http://schemas.microsoft.com/office/powerpoint/2012/main" xmlns:ahyp="http://schemas.microsoft.com/office/drawing/2018/hyperlinkcolor" showMasterPhAnim="0" showMasterSp="0">
+  <p:cSld>
+    <p:spTree>
+      <p:nvGrpSpPr>
+        <p:cNvPr id="191" name="Shape 191"/>
+        <p:cNvGrpSpPr/>
+        <p:nvPr/>
+      </p:nvGrpSpPr>
+      <p:grpSpPr>
+        <a:xfrm>
+          <a:off x="0" y="0"/>
+          <a:ext cx="0" cy="0"/>
+          <a:chOff x="0" y="0"/>
+          <a:chExt cx="0" cy="0"/>
+        </a:xfrm>
+      </p:grpSpPr>
+      <p:sp>
+        <p:nvSpPr>
+          <p:cNvPr id="192" name="Google Shape;192;g2c84522b22c_1_23:notes"/>
+          <p:cNvSpPr/>
+          <p:nvPr>
+            <p:ph idx="2" type="sldImg"/>
+          </p:nvPr>
+        </p:nvSpPr>
+        <p:spPr>
+          <a:xfrm>
+            <a:off x="381300" y="685800"/>
+            <a:ext cx="6096000" cy="3429000"/>
+          </a:xfrm>
+          <a:custGeom>
+            <a:rect b="b" l="l" r="r" t="t"/>
+            <a:pathLst>
+              <a:path extrusionOk="0" h="120000" w="120000">
+                <a:moveTo>
+                  <a:pt x="0" y="0"/>
+                </a:moveTo>
+                <a:lnTo>
+                  <a:pt x="120000" y="0"/>
+                </a:lnTo>
+                <a:lnTo>
+                  <a:pt x="120000" y="120000"/>
+                </a:lnTo>
+                <a:lnTo>
+                  <a:pt x="0" y="120000"/>
+                </a:lnTo>
+                <a:close/>
+              </a:path>
+            </a:pathLst>
+          </a:custGeom>
+        </p:spPr>
+      </p:sp>
+      <p:sp>
+        <p:nvSpPr>
+          <p:cNvPr id="193" name="Google Shape;193;g2c84522b22c_1_23:notes"/>
+          <p:cNvSpPr txBox="1"/>
+          <p:nvPr>
+            <p:ph idx="1" type="body"/>
+          </p:nvPr>
+        </p:nvSpPr>
+        <p:spPr>
+          <a:xfrm>
+            <a:off x="685800" y="4343400"/>
+            <a:ext cx="5486400" cy="4114800"/>
+          </a:xfrm>
+          <a:prstGeom prst="rect">
+            <a:avLst/>
+          </a:prstGeom>
+        </p:spPr>
+        <p:txBody>
+          <a:bodyPr anchorCtr="0" anchor="t" bIns="91425" lIns="91425" spcFirstLastPara="1" rIns="91425" wrap="square" tIns="91425">
+            <a:noAutofit/>
+          </a:bodyPr>
+          <a:lstStyle/>
+          <a:p>
+            <a:pPr indent="0" lvl="0" marL="0" rtl="0" algn="l">
+              <a:spcBef>
+                <a:spcPts val="0"/>
+              </a:spcBef>
+              <a:spcAft>
+                <a:spcPts val="0"/>
+              </a:spcAft>
+              <a:buNone/>
+            </a:pPr>
+            <a:r>
+              <a:t/>
+            </a:r>
+            <a:endParaRPr/>
+          </a:p>
+        </p:txBody>
+      </p:sp>
+    </p:spTree>
+  </p:cSld>
+  <p:clrMapOvr>
+    <a:masterClrMapping/>
+  </p:clrMapOvr>
+</p:notes>
+</file>
+
+<file path=ppt/notesSlides/notesSlide25.xml><?xml version="1.0" encoding="utf-8"?>
+<p:notes xmlns:a="http://schemas.openxmlformats.org/drawingml/2006/main" xmlns:r="http://schemas.openxmlformats.org/officeDocument/2006/relationships" xmlns:mc="http://schemas.openxmlformats.org/markup-compatibility/2006" xmlns:mv="urn:schemas-microsoft-com:mac:vml" xmlns:p="http://schemas.openxmlformats.org/presentationml/2006/main" xmlns:c="http://schemas.openxmlformats.org/drawingml/2006/chart" xmlns:dgm="http://schemas.openxmlformats.org/drawingml/2006/diagram" xmlns:o="urn:schemas-microsoft-com:office:office" xmlns:v="urn:schemas-microsoft-com:vml" xmlns:pvml="urn:schemas-microsoft-com:office:powerpoint" xmlns:com="http://schemas.openxmlformats.org/drawingml/2006/compatibility" xmlns:p14="http://schemas.microsoft.com/office/powerpoint/2010/main" xmlns:p15="http://schemas.microsoft.com/office/powerpoint/2012/main" xmlns:ahyp="http://schemas.microsoft.com/office/drawing/2018/hyperlinkcolor" showMasterPhAnim="0" showMasterSp="0">
+  <p:cSld>
+    <p:spTree>
+      <p:nvGrpSpPr>
+        <p:cNvPr id="198" name="Shape 198"/>
+        <p:cNvGrpSpPr/>
+        <p:nvPr/>
+      </p:nvGrpSpPr>
+      <p:grpSpPr>
+        <a:xfrm>
+          <a:off x="0" y="0"/>
+          <a:ext cx="0" cy="0"/>
+          <a:chOff x="0" y="0"/>
+          <a:chExt cx="0" cy="0"/>
+        </a:xfrm>
+      </p:grpSpPr>
+      <p:sp>
+        <p:nvSpPr>
+          <p:cNvPr id="199" name="Google Shape;199;g2c84522b22c_1_31:notes"/>
+          <p:cNvSpPr/>
+          <p:nvPr>
+            <p:ph idx="2" type="sldImg"/>
+          </p:nvPr>
+        </p:nvSpPr>
+        <p:spPr>
+          <a:xfrm>
+            <a:off x="381300" y="685800"/>
+            <a:ext cx="6096000" cy="3429000"/>
+          </a:xfrm>
+          <a:custGeom>
+            <a:rect b="b" l="l" r="r" t="t"/>
+            <a:pathLst>
+              <a:path extrusionOk="0" h="120000" w="120000">
+                <a:moveTo>
+                  <a:pt x="0" y="0"/>
+                </a:moveTo>
+                <a:lnTo>
+                  <a:pt x="120000" y="0"/>
+                </a:lnTo>
+                <a:lnTo>
+                  <a:pt x="120000" y="120000"/>
+                </a:lnTo>
+                <a:lnTo>
+                  <a:pt x="0" y="120000"/>
+                </a:lnTo>
+                <a:close/>
+              </a:path>
+            </a:pathLst>
+          </a:custGeom>
+        </p:spPr>
+      </p:sp>
+      <p:sp>
+        <p:nvSpPr>
+          <p:cNvPr id="200" name="Google Shape;200;g2c84522b22c_1_31:notes"/>
+          <p:cNvSpPr txBox="1"/>
+          <p:nvPr>
+            <p:ph idx="1" type="body"/>
+          </p:nvPr>
+        </p:nvSpPr>
+        <p:spPr>
+          <a:xfrm>
+            <a:off x="685800" y="4343400"/>
+            <a:ext cx="5486400" cy="4114800"/>
+          </a:xfrm>
+          <a:prstGeom prst="rect">
+            <a:avLst/>
+          </a:prstGeom>
+        </p:spPr>
+        <p:txBody>
+          <a:bodyPr anchorCtr="0" anchor="t" bIns="91425" lIns="91425" spcFirstLastPara="1" rIns="91425" wrap="square" tIns="91425">
+            <a:noAutofit/>
+          </a:bodyPr>
+          <a:lstStyle/>
+          <a:p>
+            <a:pPr indent="0" lvl="0" marL="0" rtl="0" algn="l">
+              <a:spcBef>
+                <a:spcPts val="0"/>
+              </a:spcBef>
+              <a:spcAft>
+                <a:spcPts val="0"/>
+              </a:spcAft>
+              <a:buNone/>
+            </a:pPr>
+            <a:r>
+              <a:t/>
+            </a:r>
+            <a:endParaRPr/>
+          </a:p>
+        </p:txBody>
+      </p:sp>
+    </p:spTree>
+  </p:cSld>
+  <p:clrMapOvr>
+    <a:masterClrMapping/>
+  </p:clrMapOvr>
+</p:notes>
+</file>
+
+<file path=ppt/notesSlides/notesSlide26.xml><?xml version="1.0" encoding="utf-8"?>
+<p:notes xmlns:a="http://schemas.openxmlformats.org/drawingml/2006/main" xmlns:r="http://schemas.openxmlformats.org/officeDocument/2006/relationships" xmlns:mc="http://schemas.openxmlformats.org/markup-compatibility/2006" xmlns:mv="urn:schemas-microsoft-com:mac:vml" xmlns:p="http://schemas.openxmlformats.org/presentationml/2006/main" xmlns:c="http://schemas.openxmlformats.org/drawingml/2006/chart" xmlns:dgm="http://schemas.openxmlformats.org/drawingml/2006/diagram" xmlns:o="urn:schemas-microsoft-com:office:office" xmlns:v="urn:schemas-microsoft-com:vml" xmlns:pvml="urn:schemas-microsoft-com:office:powerpoint" xmlns:com="http://schemas.openxmlformats.org/drawingml/2006/compatibility" xmlns:p14="http://schemas.microsoft.com/office/powerpoint/2010/main" xmlns:p15="http://schemas.microsoft.com/office/powerpoint/2012/main" xmlns:ahyp="http://schemas.microsoft.com/office/drawing/2018/hyperlinkcolor" showMasterPhAnim="0" showMasterSp="0">
+  <p:cSld>
+    <p:spTree>
+      <p:nvGrpSpPr>
+        <p:cNvPr id="204" name="Shape 204"/>
+        <p:cNvGrpSpPr/>
+        <p:nvPr/>
+      </p:nvGrpSpPr>
+      <p:grpSpPr>
+        <a:xfrm>
+          <a:off x="0" y="0"/>
+          <a:ext cx="0" cy="0"/>
+          <a:chOff x="0" y="0"/>
+          <a:chExt cx="0" cy="0"/>
+        </a:xfrm>
+      </p:grpSpPr>
+      <p:sp>
+        <p:nvSpPr>
+          <p:cNvPr id="205" name="Google Shape;205;g2c84522b22c_1_37:notes"/>
+          <p:cNvSpPr/>
+          <p:nvPr>
+            <p:ph idx="2" type="sldImg"/>
+          </p:nvPr>
+        </p:nvSpPr>
+        <p:spPr>
+          <a:xfrm>
+            <a:off x="381300" y="685800"/>
+            <a:ext cx="6096000" cy="3429000"/>
+          </a:xfrm>
+          <a:custGeom>
+            <a:rect b="b" l="l" r="r" t="t"/>
+            <a:pathLst>
+              <a:path extrusionOk="0" h="120000" w="120000">
+                <a:moveTo>
+                  <a:pt x="0" y="0"/>
+                </a:moveTo>
+                <a:lnTo>
+                  <a:pt x="120000" y="0"/>
+                </a:lnTo>
+                <a:lnTo>
+                  <a:pt x="120000" y="120000"/>
+                </a:lnTo>
+                <a:lnTo>
+                  <a:pt x="0" y="120000"/>
+                </a:lnTo>
+                <a:close/>
+              </a:path>
+            </a:pathLst>
+          </a:custGeom>
+        </p:spPr>
+      </p:sp>
+      <p:sp>
+        <p:nvSpPr>
+          <p:cNvPr id="206" name="Google Shape;206;g2c84522b22c_1_37:notes"/>
+          <p:cNvSpPr txBox="1"/>
+          <p:nvPr>
+            <p:ph idx="1" type="body"/>
+          </p:nvPr>
+        </p:nvSpPr>
+        <p:spPr>
+          <a:xfrm>
+            <a:off x="685800" y="4343400"/>
+            <a:ext cx="5486400" cy="4114800"/>
+          </a:xfrm>
+          <a:prstGeom prst="rect">
+            <a:avLst/>
+          </a:prstGeom>
+        </p:spPr>
+        <p:txBody>
+          <a:bodyPr anchorCtr="0" anchor="t" bIns="91425" lIns="91425" spcFirstLastPara="1" rIns="91425" wrap="square" tIns="91425">
+            <a:noAutofit/>
+          </a:bodyPr>
+          <a:lstStyle/>
+          <a:p>
+            <a:pPr indent="0" lvl="0" marL="0" rtl="0" algn="l">
+              <a:spcBef>
+                <a:spcPts val="0"/>
+              </a:spcBef>
+              <a:spcAft>
+                <a:spcPts val="0"/>
+              </a:spcAft>
+              <a:buNone/>
+            </a:pPr>
+            <a:r>
+              <a:t/>
+            </a:r>
+            <a:endParaRPr/>
+          </a:p>
+        </p:txBody>
+      </p:sp>
+    </p:spTree>
+  </p:cSld>
+  <p:clrMapOvr>
+    <a:masterClrMapping/>
+  </p:clrMapOvr>
+</p:notes>
+</file>
+
+<file path=ppt/notesSlides/notesSlide27.xml><?xml version="1.0" encoding="utf-8"?>
+<p:notes xmlns:a="http://schemas.openxmlformats.org/drawingml/2006/main" xmlns:r="http://schemas.openxmlformats.org/officeDocument/2006/relationships" xmlns:mc="http://schemas.openxmlformats.org/markup-compatibility/2006" xmlns:mv="urn:schemas-microsoft-com:mac:vml" xmlns:p="http://schemas.openxmlformats.org/presentationml/2006/main" xmlns:c="http://schemas.openxmlformats.org/drawingml/2006/chart" xmlns:dgm="http://schemas.openxmlformats.org/drawingml/2006/diagram" xmlns:o="urn:schemas-microsoft-com:office:office" xmlns:v="urn:schemas-microsoft-com:vml" xmlns:pvml="urn:schemas-microsoft-com:office:powerpoint" xmlns:com="http://schemas.openxmlformats.org/drawingml/2006/compatibility" xmlns:p14="http://schemas.microsoft.com/office/powerpoint/2010/main" xmlns:p15="http://schemas.microsoft.com/office/powerpoint/2012/main" xmlns:ahyp="http://schemas.microsoft.com/office/drawing/2018/hyperlinkcolor" showMasterPhAnim="0" showMasterSp="0">
+  <p:cSld>
+    <p:spTree>
+      <p:nvGrpSpPr>
+        <p:cNvPr id="211" name="Shape 211"/>
+        <p:cNvGrpSpPr/>
+        <p:nvPr/>
+      </p:nvGrpSpPr>
+      <p:grpSpPr>
+        <a:xfrm>
+          <a:off x="0" y="0"/>
+          <a:ext cx="0" cy="0"/>
+          <a:chOff x="0" y="0"/>
+          <a:chExt cx="0" cy="0"/>
+        </a:xfrm>
+      </p:grpSpPr>
+      <p:sp>
+        <p:nvSpPr>
+          <p:cNvPr id="212" name="Google Shape;212;g2c84522b22c_1_45:notes"/>
+          <p:cNvSpPr/>
+          <p:nvPr>
+            <p:ph idx="2" type="sldImg"/>
+          </p:nvPr>
+        </p:nvSpPr>
+        <p:spPr>
+          <a:xfrm>
+            <a:off x="381300" y="685800"/>
+            <a:ext cx="6096000" cy="3429000"/>
+          </a:xfrm>
+          <a:custGeom>
+            <a:rect b="b" l="l" r="r" t="t"/>
+            <a:pathLst>
+              <a:path extrusionOk="0" h="120000" w="120000">
+                <a:moveTo>
+                  <a:pt x="0" y="0"/>
+                </a:moveTo>
+                <a:lnTo>
+                  <a:pt x="120000" y="0"/>
+                </a:lnTo>
+                <a:lnTo>
+                  <a:pt x="120000" y="120000"/>
+                </a:lnTo>
+                <a:lnTo>
+                  <a:pt x="0" y="120000"/>
+                </a:lnTo>
+                <a:close/>
+              </a:path>
+            </a:pathLst>
+          </a:custGeom>
+        </p:spPr>
+      </p:sp>
+      <p:sp>
+        <p:nvSpPr>
+          <p:cNvPr id="213" name="Google Shape;213;g2c84522b22c_1_45:notes"/>
+          <p:cNvSpPr txBox="1"/>
+          <p:nvPr>
+            <p:ph idx="1" type="body"/>
+          </p:nvPr>
+        </p:nvSpPr>
+        <p:spPr>
+          <a:xfrm>
+            <a:off x="685800" y="4343400"/>
+            <a:ext cx="5486400" cy="4114800"/>
+          </a:xfrm>
+          <a:prstGeom prst="rect">
+            <a:avLst/>
+          </a:prstGeom>
+        </p:spPr>
+        <p:txBody>
+          <a:bodyPr anchorCtr="0" anchor="t" bIns="91425" lIns="91425" spcFirstLastPara="1" rIns="91425" wrap="square" tIns="91425">
+            <a:noAutofit/>
+          </a:bodyPr>
+          <a:lstStyle/>
+          <a:p>
+            <a:pPr indent="0" lvl="0" marL="0" rtl="0" algn="l">
+              <a:spcBef>
+                <a:spcPts val="0"/>
+              </a:spcBef>
+              <a:spcAft>
+                <a:spcPts val="0"/>
+              </a:spcAft>
+              <a:buNone/>
+            </a:pPr>
+            <a:r>
+              <a:t/>
+            </a:r>
+            <a:endParaRPr/>
+          </a:p>
+        </p:txBody>
+      </p:sp>
+    </p:spTree>
+  </p:cSld>
+  <p:clrMapOvr>
+    <a:masterClrMapping/>
+  </p:clrMapOvr>
+</p:notes>
+</file>
+
+<file path=ppt/notesSlides/notesSlide28.xml><?xml version="1.0" encoding="utf-8"?>
+<p:notes xmlns:a="http://schemas.openxmlformats.org/drawingml/2006/main" xmlns:r="http://schemas.openxmlformats.org/officeDocument/2006/relationships" xmlns:mc="http://schemas.openxmlformats.org/markup-compatibility/2006" xmlns:mv="urn:schemas-microsoft-com:mac:vml" xmlns:p="http://schemas.openxmlformats.org/presentationml/2006/main" xmlns:c="http://schemas.openxmlformats.org/drawingml/2006/chart" xmlns:dgm="http://schemas.openxmlformats.org/drawingml/2006/diagram" xmlns:o="urn:schemas-microsoft-com:office:office" xmlns:v="urn:schemas-microsoft-com:vml" xmlns:pvml="urn:schemas-microsoft-com:office:powerpoint" xmlns:com="http://schemas.openxmlformats.org/drawingml/2006/compatibility" xmlns:p14="http://schemas.microsoft.com/office/powerpoint/2010/main" xmlns:p15="http://schemas.microsoft.com/office/powerpoint/2012/main" xmlns:ahyp="http://schemas.microsoft.com/office/drawing/2018/hyperlinkcolor" showMasterPhAnim="0" showMasterSp="0">
+  <p:cSld>
+    <p:spTree>
+      <p:nvGrpSpPr>
+        <p:cNvPr id="218" name="Shape 218"/>
+        <p:cNvGrpSpPr/>
+        <p:nvPr/>
+      </p:nvGrpSpPr>
+      <p:grpSpPr>
+        <a:xfrm>
+          <a:off x="0" y="0"/>
+          <a:ext cx="0" cy="0"/>
+          <a:chOff x="0" y="0"/>
+          <a:chExt cx="0" cy="0"/>
+        </a:xfrm>
+      </p:grpSpPr>
+      <p:sp>
+        <p:nvSpPr>
+          <p:cNvPr id="219" name="Google Shape;219;g2c84522b22c_1_53:notes"/>
+          <p:cNvSpPr/>
+          <p:nvPr>
+            <p:ph idx="2" type="sldImg"/>
+          </p:nvPr>
+        </p:nvSpPr>
+        <p:spPr>
+          <a:xfrm>
+            <a:off x="381300" y="685800"/>
+            <a:ext cx="6096000" cy="3429000"/>
+          </a:xfrm>
+          <a:custGeom>
+            <a:rect b="b" l="l" r="r" t="t"/>
+            <a:pathLst>
+              <a:path extrusionOk="0" h="120000" w="120000">
+                <a:moveTo>
+                  <a:pt x="0" y="0"/>
+                </a:moveTo>
+                <a:lnTo>
+                  <a:pt x="120000" y="0"/>
+                </a:lnTo>
+                <a:lnTo>
+                  <a:pt x="120000" y="120000"/>
+                </a:lnTo>
+                <a:lnTo>
+                  <a:pt x="0" y="120000"/>
+                </a:lnTo>
+                <a:close/>
+              </a:path>
+            </a:pathLst>
+          </a:custGeom>
+        </p:spPr>
+      </p:sp>
+      <p:sp>
+        <p:nvSpPr>
+          <p:cNvPr id="220" name="Google Shape;220;g2c84522b22c_1_53:notes"/>
+          <p:cNvSpPr txBox="1"/>
+          <p:nvPr>
+            <p:ph idx="1" type="body"/>
+          </p:nvPr>
+        </p:nvSpPr>
+        <p:spPr>
+          <a:xfrm>
+            <a:off x="685800" y="4343400"/>
+            <a:ext cx="5486400" cy="4114800"/>
+          </a:xfrm>
+          <a:prstGeom prst="rect">
+            <a:avLst/>
+          </a:prstGeom>
+        </p:spPr>
+        <p:txBody>
+          <a:bodyPr anchorCtr="0" anchor="t" bIns="91425" lIns="91425" spcFirstLastPara="1" rIns="91425" wrap="square" tIns="91425">
+            <a:noAutofit/>
+          </a:bodyPr>
+          <a:lstStyle/>
+          <a:p>
+            <a:pPr indent="0" lvl="0" marL="0" rtl="0" algn="l">
+              <a:spcBef>
+                <a:spcPts val="0"/>
+              </a:spcBef>
+              <a:spcAft>
+                <a:spcPts val="0"/>
+              </a:spcAft>
+              <a:buNone/>
+            </a:pPr>
+            <a:r>
+              <a:t/>
+            </a:r>
+            <a:endParaRPr/>
+          </a:p>
+        </p:txBody>
+      </p:sp>
+    </p:spTree>
+  </p:cSld>
+  <p:clrMapOvr>
+    <a:masterClrMapping/>
+  </p:clrMapOvr>
+</p:notes>
+</file>
+
+<file path=ppt/notesSlides/notesSlide29.xml><?xml version="1.0" encoding="utf-8"?>
+<p:notes xmlns:a="http://schemas.openxmlformats.org/drawingml/2006/main" xmlns:r="http://schemas.openxmlformats.org/officeDocument/2006/relationships" xmlns:mc="http://schemas.openxmlformats.org/markup-compatibility/2006" xmlns:mv="urn:schemas-microsoft-com:mac:vml" xmlns:p="http://schemas.openxmlformats.org/presentationml/2006/main" xmlns:c="http://schemas.openxmlformats.org/drawingml/2006/chart" xmlns:dgm="http://schemas.openxmlformats.org/drawingml/2006/diagram" xmlns:o="urn:schemas-microsoft-com:office:office" xmlns:v="urn:schemas-microsoft-com:vml" xmlns:pvml="urn:schemas-microsoft-com:office:powerpoint" xmlns:com="http://schemas.openxmlformats.org/drawingml/2006/compatibility" xmlns:p14="http://schemas.microsoft.com/office/powerpoint/2010/main" xmlns:p15="http://schemas.microsoft.com/office/powerpoint/2012/main" xmlns:ahyp="http://schemas.microsoft.com/office/drawing/2018/hyperlinkcolor" showMasterPhAnim="0" showMasterSp="0">
+  <p:cSld>
+    <p:spTree>
+      <p:nvGrpSpPr>
+        <p:cNvPr id="224" name="Shape 224"/>
+        <p:cNvGrpSpPr/>
+        <p:nvPr/>
+      </p:nvGrpSpPr>
+      <p:grpSpPr>
+        <a:xfrm>
+          <a:off x="0" y="0"/>
+          <a:ext cx="0" cy="0"/>
+          <a:chOff x="0" y="0"/>
+          <a:chExt cx="0" cy="0"/>
+        </a:xfrm>
+      </p:grpSpPr>
+      <p:sp>
+        <p:nvSpPr>
+          <p:cNvPr id="225" name="Google Shape;225;g2c84522b22c_1_58:notes"/>
+          <p:cNvSpPr/>
+          <p:nvPr>
+            <p:ph idx="2" type="sldImg"/>
+          </p:nvPr>
+        </p:nvSpPr>
+        <p:spPr>
+          <a:xfrm>
+            <a:off x="381300" y="685800"/>
+            <a:ext cx="6096000" cy="3429000"/>
+          </a:xfrm>
+          <a:custGeom>
+            <a:rect b="b" l="l" r="r" t="t"/>
+            <a:pathLst>
+              <a:path extrusionOk="0" h="120000" w="120000">
+                <a:moveTo>
+                  <a:pt x="0" y="0"/>
+                </a:moveTo>
+                <a:lnTo>
+                  <a:pt x="120000" y="0"/>
+                </a:lnTo>
+                <a:lnTo>
+                  <a:pt x="120000" y="120000"/>
+                </a:lnTo>
+                <a:lnTo>
+                  <a:pt x="0" y="120000"/>
+                </a:lnTo>
+                <a:close/>
+              </a:path>
+            </a:pathLst>
+          </a:custGeom>
+        </p:spPr>
+      </p:sp>
+      <p:sp>
+        <p:nvSpPr>
+          <p:cNvPr id="226" name="Google Shape;226;g2c84522b22c_1_58:notes"/>
           <p:cNvSpPr txBox="1"/>
           <p:nvPr>
             <p:ph idx="1" type="body"/>
@@ -8028,7 +9028,7 @@
         <p:spPr>
           <a:xfrm>
             <a:off x="184950" y="833075"/>
-            <a:ext cx="8774100" cy="2361300"/>
+            <a:ext cx="4070400" cy="3764700"/>
           </a:xfrm>
           <a:prstGeom prst="rect">
             <a:avLst/>
@@ -8050,29 +9050,6 @@
               <a:buNone/>
             </a:pPr>
             <a:r>
-              <a:t/>
-            </a:r>
-            <a:endParaRPr sz="1500">
-              <a:solidFill>
-                <a:schemeClr val="dk1"/>
-              </a:solidFill>
-              <a:latin typeface="Calibri"/>
-              <a:ea typeface="Calibri"/>
-              <a:cs typeface="Calibri"/>
-              <a:sym typeface="Calibri"/>
-            </a:endParaRPr>
-          </a:p>
-          <a:p>
-            <a:pPr indent="0" lvl="0" marL="0" rtl="0" algn="l">
-              <a:spcBef>
-                <a:spcPts val="0"/>
-              </a:spcBef>
-              <a:spcAft>
-                <a:spcPts val="0"/>
-              </a:spcAft>
-              <a:buNone/>
-            </a:pPr>
-            <a:r>
               <a:rPr lang="en-GB" sz="1500">
                 <a:solidFill>
                   <a:schemeClr val="dk1"/>
@@ -8117,8 +9094,58 @@
               <a:sym typeface="Calibri"/>
             </a:endParaRPr>
           </a:p>
+          <a:p>
+            <a:pPr indent="0" lvl="0" marL="0" rtl="0" algn="l">
+              <a:spcBef>
+                <a:spcPts val="0"/>
+              </a:spcBef>
+              <a:spcAft>
+                <a:spcPts val="0"/>
+              </a:spcAft>
+              <a:buNone/>
+            </a:pPr>
+            <a:r>
+              <a:t/>
+            </a:r>
+            <a:endParaRPr b="1" sz="1500">
+              <a:solidFill>
+                <a:schemeClr val="dk1"/>
+              </a:solidFill>
+              <a:latin typeface="Calibri"/>
+              <a:ea typeface="Calibri"/>
+              <a:cs typeface="Calibri"/>
+              <a:sym typeface="Calibri"/>
+            </a:endParaRPr>
+          </a:p>
         </p:txBody>
       </p:sp>
+      <p:pic>
+        <p:nvPicPr>
+          <p:cNvPr id="120" name="Google Shape;120;p24"/>
+          <p:cNvPicPr preferRelativeResize="0"/>
+          <p:nvPr/>
+        </p:nvPicPr>
+        <p:blipFill rotWithShape="1">
+          <a:blip r:embed="rId3">
+            <a:alphaModFix/>
+          </a:blip>
+          <a:srcRect b="0" l="13387" r="18999" t="0"/>
+          <a:stretch/>
+        </p:blipFill>
+        <p:spPr>
+          <a:xfrm>
+            <a:off x="4322225" y="879325"/>
+            <a:ext cx="4669650" cy="2588500"/>
+          </a:xfrm>
+          <a:prstGeom prst="rect">
+            <a:avLst/>
+          </a:prstGeom>
+          <a:noFill/>
+          <a:ln>
+            <a:noFill/>
+          </a:ln>
+        </p:spPr>
+      </p:pic>
     </p:spTree>
   </p:cSld>
   <p:clrMapOvr>
@@ -8132,7 +9159,7 @@
   <p:cSld>
     <p:spTree>
       <p:nvGrpSpPr>
-        <p:cNvPr id="123" name="Shape 123"/>
+        <p:cNvPr id="124" name="Shape 124"/>
         <p:cNvGrpSpPr/>
         <p:nvPr/>
       </p:nvGrpSpPr>
@@ -8146,7 +9173,7 @@
       </p:grpSpPr>
       <p:sp>
         <p:nvSpPr>
-          <p:cNvPr id="124" name="Google Shape;124;p25"/>
+          <p:cNvPr id="125" name="Google Shape;125;p25"/>
           <p:cNvSpPr txBox="1"/>
           <p:nvPr>
             <p:ph type="ctrTitle"/>
@@ -8250,7 +9277,7 @@
       </p:sp>
       <p:sp>
         <p:nvSpPr>
-          <p:cNvPr id="125" name="Google Shape;125;p25"/>
+          <p:cNvPr id="126" name="Google Shape;126;p25"/>
           <p:cNvSpPr txBox="1"/>
           <p:nvPr>
             <p:ph idx="1" type="subTitle"/>
@@ -8258,8 +9285,8 @@
         </p:nvSpPr>
         <p:spPr>
           <a:xfrm>
-            <a:off x="149900" y="737975"/>
-            <a:ext cx="3574500" cy="3856800"/>
+            <a:off x="149900" y="670775"/>
+            <a:ext cx="3717000" cy="3856800"/>
           </a:xfrm>
           <a:prstGeom prst="rect">
             <a:avLst/>
@@ -8357,7 +9384,7 @@
               <a:t>Chat Link: </a:t>
             </a:r>
             <a:r>
-              <a:rPr lang="en-GB" sz="1100" u="sng">
+              <a:rPr lang="en-GB" sz="1300" u="sng">
                 <a:solidFill>
                   <a:srgbClr val="1155CC"/>
                 </a:solidFill>
@@ -8375,7 +9402,7 @@
               </a:rPr>
               <a:t>https://chat.openai.com/share/cd37d5f6-4e3e-4edf-bad8-f43cd6ec4479</a:t>
             </a:r>
-            <a:endParaRPr sz="1100">
+            <a:endParaRPr sz="1300">
               <a:solidFill>
                 <a:schemeClr val="dk1"/>
               </a:solidFill>
@@ -8466,7 +9493,7 @@
       </p:sp>
       <p:pic>
         <p:nvPicPr>
-          <p:cNvPr id="126" name="Google Shape;126;p25"/>
+          <p:cNvPr id="127" name="Google Shape;127;p25"/>
           <p:cNvPicPr preferRelativeResize="0"/>
           <p:nvPr/>
         </p:nvPicPr>
@@ -8480,8 +9507,8 @@
         </p:blipFill>
         <p:spPr>
           <a:xfrm>
-            <a:off x="4068325" y="670763"/>
-            <a:ext cx="4997800" cy="4374125"/>
+            <a:off x="3922204" y="737975"/>
+            <a:ext cx="5129195" cy="4294524"/>
           </a:xfrm>
           <a:prstGeom prst="rect">
             <a:avLst/>
@@ -8505,7 +9532,7 @@
   <p:cSld>
     <p:spTree>
       <p:nvGrpSpPr>
-        <p:cNvPr id="130" name="Shape 130"/>
+        <p:cNvPr id="131" name="Shape 131"/>
         <p:cNvGrpSpPr/>
         <p:nvPr/>
       </p:nvGrpSpPr>
@@ -8519,7 +9546,7 @@
       </p:grpSpPr>
       <p:sp>
         <p:nvSpPr>
-          <p:cNvPr id="131" name="Google Shape;131;p26"/>
+          <p:cNvPr id="132" name="Google Shape;132;p26"/>
           <p:cNvSpPr txBox="1"/>
           <p:nvPr>
             <p:ph type="ctrTitle"/>
@@ -8611,7 +9638,7 @@
       </p:sp>
       <p:sp>
         <p:nvSpPr>
-          <p:cNvPr id="132" name="Google Shape;132;p26"/>
+          <p:cNvPr id="133" name="Google Shape;133;p26"/>
           <p:cNvSpPr txBox="1"/>
           <p:nvPr>
             <p:ph idx="1" type="subTitle"/>
@@ -8619,8 +9646,8 @@
         </p:nvSpPr>
         <p:spPr>
           <a:xfrm>
-            <a:off x="128475" y="759375"/>
-            <a:ext cx="3758100" cy="4135500"/>
+            <a:off x="128475" y="673200"/>
+            <a:ext cx="4654200" cy="4135500"/>
           </a:xfrm>
           <a:prstGeom prst="rect">
             <a:avLst/>
@@ -8718,7 +9745,7 @@
               <a:t>Chat Link: </a:t>
             </a:r>
             <a:r>
-              <a:rPr lang="en-GB" sz="1100" u="sng">
+              <a:rPr lang="en-GB" sz="1300" u="sng">
                 <a:solidFill>
                   <a:srgbClr val="1155CC"/>
                 </a:solidFill>
@@ -8736,7 +9763,7 @@
               </a:rPr>
               <a:t>https://chat.openai.com/share/8ccfc610-df85-46f1-9b93-4f69120c5e25</a:t>
             </a:r>
-            <a:endParaRPr sz="1500">
+            <a:endParaRPr sz="1300">
               <a:solidFill>
                 <a:schemeClr val="dk1"/>
               </a:solidFill>
@@ -8796,22 +9823,21 @@
       </p:sp>
       <p:pic>
         <p:nvPicPr>
-          <p:cNvPr id="133" name="Google Shape;133;p26"/>
+          <p:cNvPr id="134" name="Google Shape;134;p26"/>
           <p:cNvPicPr preferRelativeResize="0"/>
           <p:nvPr/>
         </p:nvPicPr>
-        <p:blipFill>
+        <p:blipFill rotWithShape="1">
           <a:blip r:embed="rId4">
             <a:alphaModFix/>
           </a:blip>
-          <a:stretch>
-            <a:fillRect/>
-          </a:stretch>
+          <a:srcRect b="0" l="2869" r="2128" t="0"/>
+          <a:stretch/>
         </p:blipFill>
         <p:spPr>
           <a:xfrm>
-            <a:off x="4038975" y="825600"/>
-            <a:ext cx="4707802" cy="4165501"/>
+            <a:off x="4819750" y="723225"/>
+            <a:ext cx="4218374" cy="4343350"/>
           </a:xfrm>
           <a:prstGeom prst="rect">
             <a:avLst/>
@@ -8835,7 +9861,7 @@
   <p:cSld>
     <p:spTree>
       <p:nvGrpSpPr>
-        <p:cNvPr id="137" name="Shape 137"/>
+        <p:cNvPr id="138" name="Shape 138"/>
         <p:cNvGrpSpPr/>
         <p:nvPr/>
       </p:nvGrpSpPr>
@@ -8849,7 +9875,7 @@
       </p:grpSpPr>
       <p:sp>
         <p:nvSpPr>
-          <p:cNvPr id="138" name="Google Shape;138;p27"/>
+          <p:cNvPr id="139" name="Google Shape;139;p27"/>
           <p:cNvSpPr txBox="1"/>
           <p:nvPr>
             <p:ph type="ctrTitle"/>
@@ -8905,7 +9931,7 @@
       </p:sp>
       <p:sp>
         <p:nvSpPr>
-          <p:cNvPr id="139" name="Google Shape;139;p27"/>
+          <p:cNvPr id="140" name="Google Shape;140;p27"/>
           <p:cNvSpPr txBox="1"/>
           <p:nvPr>
             <p:ph idx="1" type="subTitle"/>
@@ -9080,7 +10106,7 @@
   <p:cSld>
     <p:spTree>
       <p:nvGrpSpPr>
-        <p:cNvPr id="143" name="Shape 143"/>
+        <p:cNvPr id="144" name="Shape 144"/>
         <p:cNvGrpSpPr/>
         <p:nvPr/>
       </p:nvGrpSpPr>
@@ -9094,7 +10120,7 @@
       </p:grpSpPr>
       <p:sp>
         <p:nvSpPr>
-          <p:cNvPr id="144" name="Google Shape;144;p28"/>
+          <p:cNvPr id="145" name="Google Shape;145;p28"/>
           <p:cNvSpPr txBox="1"/>
           <p:nvPr>
             <p:ph type="ctrTitle"/>
@@ -9162,7 +10188,7 @@
       </p:sp>
       <p:sp>
         <p:nvSpPr>
-          <p:cNvPr id="145" name="Google Shape;145;p28"/>
+          <p:cNvPr id="146" name="Google Shape;146;p28"/>
           <p:cNvSpPr txBox="1"/>
           <p:nvPr>
             <p:ph idx="1" type="subTitle"/>
@@ -9327,7 +10353,7 @@
   <p:cSld>
     <p:spTree>
       <p:nvGrpSpPr>
-        <p:cNvPr id="149" name="Shape 149"/>
+        <p:cNvPr id="150" name="Shape 150"/>
         <p:cNvGrpSpPr/>
         <p:nvPr/>
       </p:nvGrpSpPr>
@@ -9341,7 +10367,7 @@
       </p:grpSpPr>
       <p:sp>
         <p:nvSpPr>
-          <p:cNvPr id="150" name="Google Shape;150;p29"/>
+          <p:cNvPr id="151" name="Google Shape;151;p29"/>
           <p:cNvSpPr txBox="1"/>
           <p:nvPr>
             <p:ph type="ctrTitle"/>
@@ -9421,7 +10447,7 @@
       </p:sp>
       <p:sp>
         <p:nvSpPr>
-          <p:cNvPr id="151" name="Google Shape;151;p29"/>
+          <p:cNvPr id="152" name="Google Shape;152;p29"/>
           <p:cNvSpPr txBox="1"/>
           <p:nvPr>
             <p:ph idx="1" type="subTitle"/>
@@ -9429,8 +10455,8 @@
         </p:nvSpPr>
         <p:spPr>
           <a:xfrm>
-            <a:off x="149900" y="737975"/>
-            <a:ext cx="3574500" cy="3856800"/>
+            <a:off x="149900" y="670775"/>
+            <a:ext cx="3559800" cy="3856800"/>
           </a:xfrm>
           <a:prstGeom prst="rect">
             <a:avLst/>
@@ -9528,7 +10554,7 @@
               <a:t>Chat Link: </a:t>
             </a:r>
             <a:r>
-              <a:rPr lang="en-GB" sz="1100" u="sng">
+              <a:rPr lang="en-GB" sz="1300" u="sng">
                 <a:solidFill>
                   <a:srgbClr val="1155CC"/>
                 </a:solidFill>
@@ -9546,7 +10572,7 @@
               </a:rPr>
               <a:t>https://chat.openai.com/share/f6904fc4-8f98-48ab-96eb-3f0b5f1b7607</a:t>
             </a:r>
-            <a:endParaRPr sz="1100">
+            <a:endParaRPr sz="1300">
               <a:solidFill>
                 <a:schemeClr val="dk1"/>
               </a:solidFill>
@@ -9632,7 +10658,7 @@
       </p:sp>
       <p:pic>
         <p:nvPicPr>
-          <p:cNvPr id="152" name="Google Shape;152;p29"/>
+          <p:cNvPr id="153" name="Google Shape;153;p29"/>
           <p:cNvPicPr preferRelativeResize="0"/>
           <p:nvPr/>
         </p:nvPicPr>
@@ -9646,8 +10672,8 @@
         </p:blipFill>
         <p:spPr>
           <a:xfrm>
-            <a:off x="3876800" y="823175"/>
-            <a:ext cx="5114800" cy="3866442"/>
+            <a:off x="3765975" y="846575"/>
+            <a:ext cx="5211623" cy="3450350"/>
           </a:xfrm>
           <a:prstGeom prst="rect">
             <a:avLst/>
@@ -9671,7 +10697,7 @@
   <p:cSld>
     <p:spTree>
       <p:nvGrpSpPr>
-        <p:cNvPr id="156" name="Shape 156"/>
+        <p:cNvPr id="157" name="Shape 157"/>
         <p:cNvGrpSpPr/>
         <p:nvPr/>
       </p:nvGrpSpPr>
@@ -9685,7 +10711,7 @@
       </p:grpSpPr>
       <p:sp>
         <p:nvSpPr>
-          <p:cNvPr id="157" name="Google Shape;157;p30"/>
+          <p:cNvPr id="158" name="Google Shape;158;p30"/>
           <p:cNvSpPr txBox="1"/>
           <p:nvPr>
             <p:ph type="ctrTitle"/>
@@ -9777,7 +10803,7 @@
       </p:sp>
       <p:sp>
         <p:nvSpPr>
-          <p:cNvPr id="158" name="Google Shape;158;p30"/>
+          <p:cNvPr id="159" name="Google Shape;159;p30"/>
           <p:cNvSpPr txBox="1"/>
           <p:nvPr>
             <p:ph idx="1" type="subTitle"/>
@@ -9785,8 +10811,8 @@
         </p:nvSpPr>
         <p:spPr>
           <a:xfrm>
-            <a:off x="96375" y="737975"/>
-            <a:ext cx="4165200" cy="4755000"/>
+            <a:off x="119550" y="599200"/>
+            <a:ext cx="8904900" cy="4048200"/>
           </a:xfrm>
           <a:prstGeom prst="rect">
             <a:avLst/>
@@ -9833,32 +10859,6 @@
             </a:endParaRPr>
           </a:p>
           <a:p>
-            <a:pPr indent="0" lvl="0" marL="0" rtl="0" algn="just">
-              <a:lnSpc>
-                <a:spcPct val="115000"/>
-              </a:lnSpc>
-              <a:spcBef>
-                <a:spcPts val="0"/>
-              </a:spcBef>
-              <a:spcAft>
-                <a:spcPts val="0"/>
-              </a:spcAft>
-              <a:buNone/>
-            </a:pPr>
-            <a:r>
-              <a:t/>
-            </a:r>
-            <a:endParaRPr sz="1500">
-              <a:solidFill>
-                <a:schemeClr val="dk1"/>
-              </a:solidFill>
-              <a:latin typeface="Calibri"/>
-              <a:ea typeface="Calibri"/>
-              <a:cs typeface="Calibri"/>
-              <a:sym typeface="Calibri"/>
-            </a:endParaRPr>
-          </a:p>
-          <a:p>
             <a:pPr indent="0" lvl="0" marL="0" rtl="0" algn="l">
               <a:lnSpc>
                 <a:spcPct val="115000"/>
@@ -9884,7 +10884,7 @@
               <a:t>Chat Link: </a:t>
             </a:r>
             <a:r>
-              <a:rPr lang="en-GB" sz="1100" u="sng">
+              <a:rPr lang="en-GB" sz="1300" u="sng">
                 <a:solidFill>
                   <a:srgbClr val="1155CC"/>
                 </a:solidFill>
@@ -9902,7 +10902,7 @@
               </a:rPr>
               <a:t>https://chat.openai.com/share/8623403d-4410-4b33-9143-1b22c23f4031</a:t>
             </a:r>
-            <a:endParaRPr sz="1100">
+            <a:endParaRPr sz="1300">
               <a:solidFill>
                 <a:schemeClr val="dk1"/>
               </a:solidFill>
@@ -9988,7 +10988,7 @@
       </p:sp>
       <p:pic>
         <p:nvPicPr>
-          <p:cNvPr id="159" name="Google Shape;159;p30"/>
+          <p:cNvPr id="160" name="Google Shape;160;p30"/>
           <p:cNvPicPr preferRelativeResize="0"/>
           <p:nvPr/>
         </p:nvPicPr>
@@ -10002,8 +11002,8 @@
         </p:blipFill>
         <p:spPr>
           <a:xfrm>
-            <a:off x="4261575" y="781625"/>
-            <a:ext cx="4818175" cy="4165125"/>
+            <a:off x="1383850" y="2571750"/>
+            <a:ext cx="6251650" cy="2479099"/>
           </a:xfrm>
           <a:prstGeom prst="rect">
             <a:avLst/>
@@ -10027,7 +11027,7 @@
   <p:cSld>
     <p:spTree>
       <p:nvGrpSpPr>
-        <p:cNvPr id="163" name="Shape 163"/>
+        <p:cNvPr id="164" name="Shape 164"/>
         <p:cNvGrpSpPr/>
         <p:nvPr/>
       </p:nvGrpSpPr>
@@ -10041,7 +11041,7 @@
       </p:grpSpPr>
       <p:sp>
         <p:nvSpPr>
-          <p:cNvPr id="164" name="Google Shape;164;p31"/>
+          <p:cNvPr id="165" name="Google Shape;165;p31"/>
           <p:cNvSpPr txBox="1"/>
           <p:nvPr>
             <p:ph type="ctrTitle"/>
@@ -10097,7 +11097,7 @@
       </p:sp>
       <p:sp>
         <p:nvSpPr>
-          <p:cNvPr id="165" name="Google Shape;165;p31"/>
+          <p:cNvPr id="166" name="Google Shape;166;p31"/>
           <p:cNvSpPr txBox="1"/>
           <p:nvPr>
             <p:ph idx="1" type="subTitle"/>
@@ -10105,7 +11105,7 @@
         </p:nvSpPr>
         <p:spPr>
           <a:xfrm>
-            <a:off x="184950" y="1079350"/>
+            <a:off x="184950" y="977600"/>
             <a:ext cx="8774100" cy="2361300"/>
           </a:xfrm>
           <a:prstGeom prst="rect">
@@ -10674,6 +11674,2832 @@
               <a:ea typeface="Calibri"/>
               <a:cs typeface="Calibri"/>
               <a:sym typeface="Calibri"/>
+            </a:endParaRPr>
+          </a:p>
+        </p:txBody>
+      </p:sp>
+    </p:spTree>
+  </p:cSld>
+  <p:clrMapOvr>
+    <a:masterClrMapping/>
+  </p:clrMapOvr>
+</p:sld>
+</file>
+
+<file path=ppt/slides/slide20.xml><?xml version="1.0" encoding="utf-8"?>
+<p:sld xmlns:a="http://schemas.openxmlformats.org/drawingml/2006/main" xmlns:r="http://schemas.openxmlformats.org/officeDocument/2006/relationships" xmlns:mc="http://schemas.openxmlformats.org/markup-compatibility/2006" xmlns:mv="urn:schemas-microsoft-com:mac:vml" xmlns:p="http://schemas.openxmlformats.org/presentationml/2006/main" xmlns:c="http://schemas.openxmlformats.org/drawingml/2006/chart" xmlns:dgm="http://schemas.openxmlformats.org/drawingml/2006/diagram" xmlns:o="urn:schemas-microsoft-com:office:office" xmlns:v="urn:schemas-microsoft-com:vml" xmlns:pvml="urn:schemas-microsoft-com:office:powerpoint" xmlns:com="http://schemas.openxmlformats.org/drawingml/2006/compatibility" xmlns:p14="http://schemas.microsoft.com/office/powerpoint/2010/main" xmlns:p15="http://schemas.microsoft.com/office/powerpoint/2012/main" xmlns:ahyp="http://schemas.microsoft.com/office/drawing/2018/hyperlinkcolor">
+  <p:cSld>
+    <p:spTree>
+      <p:nvGrpSpPr>
+        <p:cNvPr id="170" name="Shape 170"/>
+        <p:cNvGrpSpPr/>
+        <p:nvPr/>
+      </p:nvGrpSpPr>
+      <p:grpSpPr>
+        <a:xfrm>
+          <a:off x="0" y="0"/>
+          <a:ext cx="0" cy="0"/>
+          <a:chOff x="0" y="0"/>
+          <a:chExt cx="0" cy="0"/>
+        </a:xfrm>
+      </p:grpSpPr>
+      <p:sp>
+        <p:nvSpPr>
+          <p:cNvPr id="171" name="Google Shape;171;p32"/>
+          <p:cNvSpPr txBox="1"/>
+          <p:nvPr>
+            <p:ph type="ctrTitle"/>
+          </p:nvPr>
+        </p:nvSpPr>
+        <p:spPr>
+          <a:xfrm>
+            <a:off x="1730325" y="1956600"/>
+            <a:ext cx="6151500" cy="1230300"/>
+          </a:xfrm>
+          <a:prstGeom prst="rect">
+            <a:avLst/>
+          </a:prstGeom>
+        </p:spPr>
+        <p:txBody>
+          <a:bodyPr anchorCtr="0" anchor="b" bIns="91425" lIns="91425" spcFirstLastPara="1" rIns="91425" wrap="square" tIns="91425">
+            <a:normAutofit/>
+          </a:bodyPr>
+          <a:lstStyle/>
+          <a:p>
+            <a:pPr indent="0" lvl="0" marL="0" rtl="0" algn="ctr">
+              <a:spcBef>
+                <a:spcPts val="0"/>
+              </a:spcBef>
+              <a:spcAft>
+                <a:spcPts val="0"/>
+              </a:spcAft>
+              <a:buNone/>
+            </a:pPr>
+            <a:r>
+              <a:rPr b="1" lang="en-GB" sz="3200">
+                <a:solidFill>
+                  <a:srgbClr val="CC0000"/>
+                </a:solidFill>
+                <a:latin typeface="Times"/>
+                <a:ea typeface="Times"/>
+                <a:cs typeface="Times"/>
+                <a:sym typeface="Times"/>
+              </a:rPr>
+              <a:t>Importance of using the correct Prompt Pattern</a:t>
+            </a:r>
+            <a:endParaRPr b="1" sz="3200">
+              <a:latin typeface="Times"/>
+              <a:ea typeface="Times"/>
+              <a:cs typeface="Times"/>
+              <a:sym typeface="Times"/>
+            </a:endParaRPr>
+          </a:p>
+        </p:txBody>
+      </p:sp>
+    </p:spTree>
+  </p:cSld>
+  <p:clrMapOvr>
+    <a:masterClrMapping/>
+  </p:clrMapOvr>
+</p:sld>
+</file>
+
+<file path=ppt/slides/slide21.xml><?xml version="1.0" encoding="utf-8"?>
+<p:sld xmlns:a="http://schemas.openxmlformats.org/drawingml/2006/main" xmlns:r="http://schemas.openxmlformats.org/officeDocument/2006/relationships" xmlns:mc="http://schemas.openxmlformats.org/markup-compatibility/2006" xmlns:mv="urn:schemas-microsoft-com:mac:vml" xmlns:p="http://schemas.openxmlformats.org/presentationml/2006/main" xmlns:c="http://schemas.openxmlformats.org/drawingml/2006/chart" xmlns:dgm="http://schemas.openxmlformats.org/drawingml/2006/diagram" xmlns:o="urn:schemas-microsoft-com:office:office" xmlns:v="urn:schemas-microsoft-com:vml" xmlns:pvml="urn:schemas-microsoft-com:office:powerpoint" xmlns:com="http://schemas.openxmlformats.org/drawingml/2006/compatibility" xmlns:p14="http://schemas.microsoft.com/office/powerpoint/2010/main" xmlns:p15="http://schemas.microsoft.com/office/powerpoint/2012/main" xmlns:ahyp="http://schemas.microsoft.com/office/drawing/2018/hyperlinkcolor">
+  <p:cSld>
+    <p:spTree>
+      <p:nvGrpSpPr>
+        <p:cNvPr id="175" name="Shape 175"/>
+        <p:cNvGrpSpPr/>
+        <p:nvPr/>
+      </p:nvGrpSpPr>
+      <p:grpSpPr>
+        <a:xfrm>
+          <a:off x="0" y="0"/>
+          <a:ext cx="0" cy="0"/>
+          <a:chOff x="0" y="0"/>
+          <a:chExt cx="0" cy="0"/>
+        </a:xfrm>
+      </p:grpSpPr>
+      <p:sp>
+        <p:nvSpPr>
+          <p:cNvPr id="176" name="Google Shape;176;p33"/>
+          <p:cNvSpPr txBox="1"/>
+          <p:nvPr>
+            <p:ph type="ctrTitle"/>
+          </p:nvPr>
+        </p:nvSpPr>
+        <p:spPr>
+          <a:xfrm>
+            <a:off x="184950" y="-83250"/>
+            <a:ext cx="8521800" cy="749400"/>
+          </a:xfrm>
+          <a:prstGeom prst="rect">
+            <a:avLst/>
+          </a:prstGeom>
+        </p:spPr>
+        <p:txBody>
+          <a:bodyPr anchorCtr="0" anchor="b" bIns="91425" lIns="91425" spcFirstLastPara="1" rIns="91425" wrap="square" tIns="91425">
+            <a:normAutofit/>
+          </a:bodyPr>
+          <a:lstStyle/>
+          <a:p>
+            <a:pPr indent="0" lvl="0" marL="0" rtl="0" algn="l">
+              <a:spcBef>
+                <a:spcPts val="0"/>
+              </a:spcBef>
+              <a:spcAft>
+                <a:spcPts val="0"/>
+              </a:spcAft>
+              <a:buNone/>
+            </a:pPr>
+            <a:r>
+              <a:rPr lang="en-GB" sz="2800">
+                <a:solidFill>
+                  <a:srgbClr val="CC0000"/>
+                </a:solidFill>
+                <a:latin typeface="Calibri"/>
+                <a:ea typeface="Calibri"/>
+                <a:cs typeface="Calibri"/>
+                <a:sym typeface="Calibri"/>
+              </a:rPr>
+              <a:t>Instructional Prompt Vs. Persona Prompt</a:t>
+            </a:r>
+            <a:endParaRPr sz="2800">
+              <a:solidFill>
+                <a:srgbClr val="CC0000"/>
+              </a:solidFill>
+              <a:latin typeface="Calibri"/>
+              <a:ea typeface="Calibri"/>
+              <a:cs typeface="Calibri"/>
+              <a:sym typeface="Calibri"/>
+            </a:endParaRPr>
+          </a:p>
+        </p:txBody>
+      </p:sp>
+      <p:sp>
+        <p:nvSpPr>
+          <p:cNvPr id="177" name="Google Shape;177;p33"/>
+          <p:cNvSpPr txBox="1"/>
+          <p:nvPr>
+            <p:ph idx="1" type="subTitle"/>
+          </p:nvPr>
+        </p:nvSpPr>
+        <p:spPr>
+          <a:xfrm>
+            <a:off x="184950" y="666150"/>
+            <a:ext cx="8677500" cy="4017900"/>
+          </a:xfrm>
+          <a:prstGeom prst="rect">
+            <a:avLst/>
+          </a:prstGeom>
+        </p:spPr>
+        <p:txBody>
+          <a:bodyPr anchorCtr="0" anchor="t" bIns="91425" lIns="91425" spcFirstLastPara="1" rIns="91425" wrap="square" tIns="91425">
+            <a:noAutofit/>
+          </a:bodyPr>
+          <a:lstStyle/>
+          <a:p>
+            <a:pPr indent="0" lvl="0" marL="0" rtl="0" algn="just">
+              <a:lnSpc>
+                <a:spcPct val="115000"/>
+              </a:lnSpc>
+              <a:spcBef>
+                <a:spcPts val="0"/>
+              </a:spcBef>
+              <a:spcAft>
+                <a:spcPts val="0"/>
+              </a:spcAft>
+              <a:buNone/>
+            </a:pPr>
+            <a:r>
+              <a:rPr b="1" lang="en-GB" sz="1300">
+                <a:solidFill>
+                  <a:schemeClr val="dk1"/>
+                </a:solidFill>
+                <a:latin typeface="Calibri"/>
+                <a:ea typeface="Calibri"/>
+                <a:cs typeface="Calibri"/>
+                <a:sym typeface="Calibri"/>
+              </a:rPr>
+              <a:t>Instructional Prompt:</a:t>
+            </a:r>
+            <a:endParaRPr b="1" sz="1300">
+              <a:solidFill>
+                <a:schemeClr val="dk1"/>
+              </a:solidFill>
+              <a:latin typeface="Calibri"/>
+              <a:ea typeface="Calibri"/>
+              <a:cs typeface="Calibri"/>
+              <a:sym typeface="Calibri"/>
+            </a:endParaRPr>
+          </a:p>
+          <a:p>
+            <a:pPr indent="-311150" lvl="0" marL="457200" rtl="0" algn="just">
+              <a:lnSpc>
+                <a:spcPct val="115000"/>
+              </a:lnSpc>
+              <a:spcBef>
+                <a:spcPts val="0"/>
+              </a:spcBef>
+              <a:spcAft>
+                <a:spcPts val="0"/>
+              </a:spcAft>
+              <a:buClr>
+                <a:schemeClr val="dk1"/>
+              </a:buClr>
+              <a:buSzPts val="1300"/>
+              <a:buFont typeface="Times New Roman"/>
+              <a:buChar char="●"/>
+            </a:pPr>
+            <a:r>
+              <a:rPr lang="en-GB" sz="1300">
+                <a:solidFill>
+                  <a:schemeClr val="dk1"/>
+                </a:solidFill>
+                <a:latin typeface="Times New Roman"/>
+                <a:ea typeface="Times New Roman"/>
+                <a:cs typeface="Times New Roman"/>
+                <a:sym typeface="Times New Roman"/>
+              </a:rPr>
+              <a:t>You are an intelligent medical assistant designed to assist healthcare professionals in diagnosing patients' conditions accurately.</a:t>
+            </a:r>
+            <a:endParaRPr sz="1300">
+              <a:solidFill>
+                <a:schemeClr val="dk1"/>
+              </a:solidFill>
+              <a:latin typeface="Times New Roman"/>
+              <a:ea typeface="Times New Roman"/>
+              <a:cs typeface="Times New Roman"/>
+              <a:sym typeface="Times New Roman"/>
+            </a:endParaRPr>
+          </a:p>
+          <a:p>
+            <a:pPr indent="-311150" lvl="0" marL="457200" rtl="0" algn="just">
+              <a:lnSpc>
+                <a:spcPct val="115000"/>
+              </a:lnSpc>
+              <a:spcBef>
+                <a:spcPts val="0"/>
+              </a:spcBef>
+              <a:spcAft>
+                <a:spcPts val="0"/>
+              </a:spcAft>
+              <a:buClr>
+                <a:schemeClr val="dk1"/>
+              </a:buClr>
+              <a:buSzPts val="1300"/>
+              <a:buFont typeface="Times New Roman"/>
+              <a:buChar char="●"/>
+            </a:pPr>
+            <a:r>
+              <a:rPr lang="en-GB" sz="1300">
+                <a:solidFill>
+                  <a:schemeClr val="dk1"/>
+                </a:solidFill>
+                <a:latin typeface="Times New Roman"/>
+                <a:ea typeface="Times New Roman"/>
+                <a:cs typeface="Times New Roman"/>
+                <a:sym typeface="Times New Roman"/>
+              </a:rPr>
+              <a:t>Your primary function is to provide insightful responses to medical inquiries and assist in determining the appropriate diagnosis and treatment plan.</a:t>
+            </a:r>
+            <a:endParaRPr sz="1300">
+              <a:solidFill>
+                <a:schemeClr val="dk1"/>
+              </a:solidFill>
+              <a:latin typeface="Times New Roman"/>
+              <a:ea typeface="Times New Roman"/>
+              <a:cs typeface="Times New Roman"/>
+              <a:sym typeface="Times New Roman"/>
+            </a:endParaRPr>
+          </a:p>
+          <a:p>
+            <a:pPr indent="-311150" lvl="0" marL="457200" rtl="0" algn="just">
+              <a:lnSpc>
+                <a:spcPct val="115000"/>
+              </a:lnSpc>
+              <a:spcBef>
+                <a:spcPts val="0"/>
+              </a:spcBef>
+              <a:spcAft>
+                <a:spcPts val="0"/>
+              </a:spcAft>
+              <a:buClr>
+                <a:schemeClr val="dk1"/>
+              </a:buClr>
+              <a:buSzPts val="1300"/>
+              <a:buFont typeface="Times New Roman"/>
+              <a:buChar char="●"/>
+            </a:pPr>
+            <a:r>
+              <a:rPr lang="en-GB" sz="1300">
+                <a:solidFill>
+                  <a:schemeClr val="dk1"/>
+                </a:solidFill>
+                <a:latin typeface="Times New Roman"/>
+                <a:ea typeface="Times New Roman"/>
+                <a:cs typeface="Times New Roman"/>
+                <a:sym typeface="Times New Roman"/>
+              </a:rPr>
+              <a:t>You will diligently follow the instructions and queries provided by healthcare professionals, offering comprehensive and relevant information to aid in</a:t>
+            </a:r>
+            <a:r>
+              <a:rPr lang="en-GB" sz="1300">
+                <a:solidFill>
+                  <a:schemeClr val="dk1"/>
+                </a:solidFill>
+                <a:latin typeface="Times New Roman"/>
+                <a:ea typeface="Times New Roman"/>
+                <a:cs typeface="Times New Roman"/>
+                <a:sym typeface="Times New Roman"/>
+              </a:rPr>
+              <a:t> </a:t>
+            </a:r>
+            <a:r>
+              <a:rPr lang="en-GB" sz="1300">
+                <a:solidFill>
+                  <a:schemeClr val="dk1"/>
+                </a:solidFill>
+                <a:latin typeface="Times New Roman"/>
+                <a:ea typeface="Times New Roman"/>
+                <a:cs typeface="Times New Roman"/>
+                <a:sym typeface="Times New Roman"/>
+              </a:rPr>
+              <a:t>diagnosis.</a:t>
+            </a:r>
+            <a:endParaRPr sz="1300">
+              <a:solidFill>
+                <a:schemeClr val="dk1"/>
+              </a:solidFill>
+              <a:latin typeface="Times New Roman"/>
+              <a:ea typeface="Times New Roman"/>
+              <a:cs typeface="Times New Roman"/>
+              <a:sym typeface="Times New Roman"/>
+            </a:endParaRPr>
+          </a:p>
+          <a:p>
+            <a:pPr indent="-311150" lvl="0" marL="457200" rtl="0" algn="just">
+              <a:lnSpc>
+                <a:spcPct val="115000"/>
+              </a:lnSpc>
+              <a:spcBef>
+                <a:spcPts val="0"/>
+              </a:spcBef>
+              <a:spcAft>
+                <a:spcPts val="0"/>
+              </a:spcAft>
+              <a:buClr>
+                <a:schemeClr val="dk1"/>
+              </a:buClr>
+              <a:buSzPts val="1300"/>
+              <a:buFont typeface="Times New Roman"/>
+              <a:buChar char="●"/>
+            </a:pPr>
+            <a:r>
+              <a:rPr lang="en-GB" sz="1300">
+                <a:solidFill>
+                  <a:schemeClr val="dk1"/>
+                </a:solidFill>
+                <a:latin typeface="Times New Roman"/>
+                <a:ea typeface="Times New Roman"/>
+                <a:cs typeface="Times New Roman"/>
+                <a:sym typeface="Times New Roman"/>
+              </a:rPr>
+              <a:t>You will never provide misleading or incorrect information that could jeopardize the patient's health or the accuracy of the diagnosis.</a:t>
+            </a:r>
+            <a:endParaRPr sz="1300">
+              <a:solidFill>
+                <a:schemeClr val="dk1"/>
+              </a:solidFill>
+              <a:latin typeface="Times New Roman"/>
+              <a:ea typeface="Times New Roman"/>
+              <a:cs typeface="Times New Roman"/>
+              <a:sym typeface="Times New Roman"/>
+            </a:endParaRPr>
+          </a:p>
+          <a:p>
+            <a:pPr indent="-311150" lvl="0" marL="457200" rtl="0" algn="just">
+              <a:lnSpc>
+                <a:spcPct val="115000"/>
+              </a:lnSpc>
+              <a:spcBef>
+                <a:spcPts val="0"/>
+              </a:spcBef>
+              <a:spcAft>
+                <a:spcPts val="0"/>
+              </a:spcAft>
+              <a:buClr>
+                <a:schemeClr val="dk1"/>
+              </a:buClr>
+              <a:buSzPts val="1300"/>
+              <a:buFont typeface="Times New Roman"/>
+              <a:buChar char="●"/>
+            </a:pPr>
+            <a:r>
+              <a:rPr lang="en-GB" sz="1300">
+                <a:solidFill>
+                  <a:schemeClr val="dk1"/>
+                </a:solidFill>
+                <a:latin typeface="Times New Roman"/>
+                <a:ea typeface="Times New Roman"/>
+                <a:cs typeface="Times New Roman"/>
+                <a:sym typeface="Times New Roman"/>
+              </a:rPr>
+              <a:t>It is imperative that you maintain a professional and empathetic tone in all interactions, prioritizing the well-being and comfort of the patient and healthcare providers.</a:t>
+            </a:r>
+            <a:endParaRPr sz="1300">
+              <a:solidFill>
+                <a:schemeClr val="dk1"/>
+              </a:solidFill>
+              <a:latin typeface="Times New Roman"/>
+              <a:ea typeface="Times New Roman"/>
+              <a:cs typeface="Times New Roman"/>
+              <a:sym typeface="Times New Roman"/>
+            </a:endParaRPr>
+          </a:p>
+          <a:p>
+            <a:pPr indent="-311150" lvl="0" marL="457200" rtl="0" algn="just">
+              <a:lnSpc>
+                <a:spcPct val="115000"/>
+              </a:lnSpc>
+              <a:spcBef>
+                <a:spcPts val="0"/>
+              </a:spcBef>
+              <a:spcAft>
+                <a:spcPts val="0"/>
+              </a:spcAft>
+              <a:buClr>
+                <a:schemeClr val="dk1"/>
+              </a:buClr>
+              <a:buSzPts val="1300"/>
+              <a:buFont typeface="Times New Roman"/>
+              <a:buChar char="●"/>
+            </a:pPr>
+            <a:r>
+              <a:rPr lang="en-GB" sz="1300">
+                <a:solidFill>
+                  <a:schemeClr val="dk1"/>
+                </a:solidFill>
+                <a:latin typeface="Times New Roman"/>
+                <a:ea typeface="Times New Roman"/>
+                <a:cs typeface="Times New Roman"/>
+                <a:sym typeface="Times New Roman"/>
+              </a:rPr>
+              <a:t>You possess advanced knowledge and expertise in various medical fields, enabling you to analyze symptoms, interpret test results, and suggest</a:t>
+            </a:r>
+            <a:r>
+              <a:rPr lang="en-GB" sz="1300">
+                <a:solidFill>
+                  <a:schemeClr val="dk1"/>
+                </a:solidFill>
+                <a:latin typeface="Times New Roman"/>
+                <a:ea typeface="Times New Roman"/>
+                <a:cs typeface="Times New Roman"/>
+                <a:sym typeface="Times New Roman"/>
+              </a:rPr>
+              <a:t> </a:t>
+            </a:r>
+            <a:r>
+              <a:rPr lang="en-GB" sz="1300">
+                <a:solidFill>
+                  <a:schemeClr val="dk1"/>
+                </a:solidFill>
+                <a:latin typeface="Times New Roman"/>
+                <a:ea typeface="Times New Roman"/>
+                <a:cs typeface="Times New Roman"/>
+                <a:sym typeface="Times New Roman"/>
+              </a:rPr>
+              <a:t>potential diagnoses based on evidence-based medicine principles.</a:t>
+            </a:r>
+            <a:endParaRPr sz="1300">
+              <a:solidFill>
+                <a:schemeClr val="dk1"/>
+              </a:solidFill>
+              <a:latin typeface="Times New Roman"/>
+              <a:ea typeface="Times New Roman"/>
+              <a:cs typeface="Times New Roman"/>
+              <a:sym typeface="Times New Roman"/>
+            </a:endParaRPr>
+          </a:p>
+          <a:p>
+            <a:pPr indent="-311150" lvl="0" marL="457200" rtl="0" algn="just">
+              <a:lnSpc>
+                <a:spcPct val="115000"/>
+              </a:lnSpc>
+              <a:spcBef>
+                <a:spcPts val="0"/>
+              </a:spcBef>
+              <a:spcAft>
+                <a:spcPts val="0"/>
+              </a:spcAft>
+              <a:buClr>
+                <a:schemeClr val="dk1"/>
+              </a:buClr>
+              <a:buSzPts val="1300"/>
+              <a:buFont typeface="Times New Roman"/>
+              <a:buChar char="●"/>
+            </a:pPr>
+            <a:r>
+              <a:rPr lang="en-GB" sz="1300">
+                <a:solidFill>
+                  <a:schemeClr val="dk1"/>
+                </a:solidFill>
+                <a:latin typeface="Times New Roman"/>
+                <a:ea typeface="Times New Roman"/>
+                <a:cs typeface="Times New Roman"/>
+                <a:sym typeface="Times New Roman"/>
+              </a:rPr>
+              <a:t>Your commitment to patient confidentiality is unwavering, and you will safeguard sensitive medical information at all costs, adhering to strict privacy regulations and ethical guidelines. You will not share any patient’s biographic data or symptoms and diagnosis (medical history) with any other individual.</a:t>
+            </a:r>
+            <a:endParaRPr sz="1300">
+              <a:solidFill>
+                <a:schemeClr val="dk1"/>
+              </a:solidFill>
+              <a:latin typeface="Times New Roman"/>
+              <a:ea typeface="Times New Roman"/>
+              <a:cs typeface="Times New Roman"/>
+              <a:sym typeface="Times New Roman"/>
+            </a:endParaRPr>
+          </a:p>
+          <a:p>
+            <a:pPr indent="-311150" lvl="0" marL="457200" rtl="0" algn="just">
+              <a:lnSpc>
+                <a:spcPct val="115000"/>
+              </a:lnSpc>
+              <a:spcBef>
+                <a:spcPts val="0"/>
+              </a:spcBef>
+              <a:spcAft>
+                <a:spcPts val="0"/>
+              </a:spcAft>
+              <a:buClr>
+                <a:schemeClr val="dk1"/>
+              </a:buClr>
+              <a:buSzPts val="1300"/>
+              <a:buFont typeface="Times New Roman"/>
+              <a:buChar char="●"/>
+            </a:pPr>
+            <a:r>
+              <a:rPr lang="en-GB" sz="1300">
+                <a:solidFill>
+                  <a:schemeClr val="dk1"/>
+                </a:solidFill>
+                <a:latin typeface="Times New Roman"/>
+                <a:ea typeface="Times New Roman"/>
+                <a:cs typeface="Times New Roman"/>
+                <a:sym typeface="Times New Roman"/>
+              </a:rPr>
+              <a:t>In cases of uncertainty or complexity, you will transparently communicate the limitations of your analysis and recommend consulting wi</a:t>
+            </a:r>
+            <a:r>
+              <a:rPr lang="en-GB" sz="1300">
+                <a:solidFill>
+                  <a:schemeClr val="dk1"/>
+                </a:solidFill>
+                <a:latin typeface="Times New Roman"/>
+                <a:ea typeface="Times New Roman"/>
+                <a:cs typeface="Times New Roman"/>
+                <a:sym typeface="Times New Roman"/>
+              </a:rPr>
+              <a:t>th qualified medical professionals for further evaluation and assistance.</a:t>
+            </a:r>
+            <a:endParaRPr sz="1300">
+              <a:solidFill>
+                <a:schemeClr val="dk1"/>
+              </a:solidFill>
+              <a:latin typeface="Times New Roman"/>
+              <a:ea typeface="Times New Roman"/>
+              <a:cs typeface="Times New Roman"/>
+              <a:sym typeface="Times New Roman"/>
+            </a:endParaRPr>
+          </a:p>
+          <a:p>
+            <a:pPr indent="0" lvl="0" marL="0" rtl="0" algn="just">
+              <a:lnSpc>
+                <a:spcPct val="115000"/>
+              </a:lnSpc>
+              <a:spcBef>
+                <a:spcPts val="0"/>
+              </a:spcBef>
+              <a:spcAft>
+                <a:spcPts val="0"/>
+              </a:spcAft>
+              <a:buNone/>
+            </a:pPr>
+            <a:r>
+              <a:t/>
+            </a:r>
+            <a:endParaRPr sz="1100">
+              <a:solidFill>
+                <a:schemeClr val="dk1"/>
+              </a:solidFill>
+              <a:latin typeface="Times New Roman"/>
+              <a:ea typeface="Times New Roman"/>
+              <a:cs typeface="Times New Roman"/>
+              <a:sym typeface="Times New Roman"/>
+            </a:endParaRPr>
+          </a:p>
+          <a:p>
+            <a:pPr indent="0" lvl="0" marL="0" rtl="0" algn="just">
+              <a:lnSpc>
+                <a:spcPct val="115000"/>
+              </a:lnSpc>
+              <a:spcBef>
+                <a:spcPts val="0"/>
+              </a:spcBef>
+              <a:spcAft>
+                <a:spcPts val="0"/>
+              </a:spcAft>
+              <a:buNone/>
+            </a:pPr>
+            <a:r>
+              <a:t/>
+            </a:r>
+            <a:endParaRPr sz="1500">
+              <a:solidFill>
+                <a:schemeClr val="dk1"/>
+              </a:solidFill>
+              <a:latin typeface="Calibri"/>
+              <a:ea typeface="Calibri"/>
+              <a:cs typeface="Calibri"/>
+              <a:sym typeface="Calibri"/>
+            </a:endParaRPr>
+          </a:p>
+          <a:p>
+            <a:pPr indent="0" lvl="0" marL="0" rtl="0" algn="just">
+              <a:lnSpc>
+                <a:spcPct val="115000"/>
+              </a:lnSpc>
+              <a:spcBef>
+                <a:spcPts val="0"/>
+              </a:spcBef>
+              <a:spcAft>
+                <a:spcPts val="0"/>
+              </a:spcAft>
+              <a:buNone/>
+            </a:pPr>
+            <a:r>
+              <a:t/>
+            </a:r>
+            <a:endParaRPr sz="1500">
+              <a:solidFill>
+                <a:schemeClr val="dk1"/>
+              </a:solidFill>
+              <a:latin typeface="Calibri"/>
+              <a:ea typeface="Calibri"/>
+              <a:cs typeface="Calibri"/>
+              <a:sym typeface="Calibri"/>
+            </a:endParaRPr>
+          </a:p>
+          <a:p>
+            <a:pPr indent="0" lvl="0" marL="0" rtl="0" algn="l">
+              <a:spcBef>
+                <a:spcPts val="0"/>
+              </a:spcBef>
+              <a:spcAft>
+                <a:spcPts val="0"/>
+              </a:spcAft>
+              <a:buNone/>
+            </a:pPr>
+            <a:r>
+              <a:t/>
+            </a:r>
+            <a:endParaRPr sz="1500">
+              <a:solidFill>
+                <a:schemeClr val="dk1"/>
+              </a:solidFill>
+              <a:latin typeface="Calibri"/>
+              <a:ea typeface="Calibri"/>
+              <a:cs typeface="Calibri"/>
+              <a:sym typeface="Calibri"/>
+            </a:endParaRPr>
+          </a:p>
+          <a:p>
+            <a:pPr indent="0" lvl="0" marL="0" rtl="0" algn="l">
+              <a:spcBef>
+                <a:spcPts val="0"/>
+              </a:spcBef>
+              <a:spcAft>
+                <a:spcPts val="0"/>
+              </a:spcAft>
+              <a:buNone/>
+            </a:pPr>
+            <a:r>
+              <a:t/>
+            </a:r>
+            <a:endParaRPr sz="1500">
+              <a:solidFill>
+                <a:schemeClr val="dk1"/>
+              </a:solidFill>
+              <a:latin typeface="Calibri"/>
+              <a:ea typeface="Calibri"/>
+              <a:cs typeface="Calibri"/>
+              <a:sym typeface="Calibri"/>
+            </a:endParaRPr>
+          </a:p>
+        </p:txBody>
+      </p:sp>
+    </p:spTree>
+  </p:cSld>
+  <p:clrMapOvr>
+    <a:masterClrMapping/>
+  </p:clrMapOvr>
+</p:sld>
+</file>
+
+<file path=ppt/slides/slide22.xml><?xml version="1.0" encoding="utf-8"?>
+<p:sld xmlns:a="http://schemas.openxmlformats.org/drawingml/2006/main" xmlns:r="http://schemas.openxmlformats.org/officeDocument/2006/relationships" xmlns:mc="http://schemas.openxmlformats.org/markup-compatibility/2006" xmlns:mv="urn:schemas-microsoft-com:mac:vml" xmlns:p="http://schemas.openxmlformats.org/presentationml/2006/main" xmlns:c="http://schemas.openxmlformats.org/drawingml/2006/chart" xmlns:dgm="http://schemas.openxmlformats.org/drawingml/2006/diagram" xmlns:o="urn:schemas-microsoft-com:office:office" xmlns:v="urn:schemas-microsoft-com:vml" xmlns:pvml="urn:schemas-microsoft-com:office:powerpoint" xmlns:com="http://schemas.openxmlformats.org/drawingml/2006/compatibility" xmlns:p14="http://schemas.microsoft.com/office/powerpoint/2010/main" xmlns:p15="http://schemas.microsoft.com/office/powerpoint/2012/main" xmlns:ahyp="http://schemas.microsoft.com/office/drawing/2018/hyperlinkcolor">
+  <p:cSld>
+    <p:spTree>
+      <p:nvGrpSpPr>
+        <p:cNvPr id="181" name="Shape 181"/>
+        <p:cNvGrpSpPr/>
+        <p:nvPr/>
+      </p:nvGrpSpPr>
+      <p:grpSpPr>
+        <a:xfrm>
+          <a:off x="0" y="0"/>
+          <a:ext cx="0" cy="0"/>
+          <a:chOff x="0" y="0"/>
+          <a:chExt cx="0" cy="0"/>
+        </a:xfrm>
+      </p:grpSpPr>
+      <p:sp>
+        <p:nvSpPr>
+          <p:cNvPr id="182" name="Google Shape;182;p34"/>
+          <p:cNvSpPr txBox="1"/>
+          <p:nvPr>
+            <p:ph type="ctrTitle"/>
+          </p:nvPr>
+        </p:nvSpPr>
+        <p:spPr>
+          <a:xfrm>
+            <a:off x="184950" y="0"/>
+            <a:ext cx="8521800" cy="749400"/>
+          </a:xfrm>
+          <a:prstGeom prst="rect">
+            <a:avLst/>
+          </a:prstGeom>
+        </p:spPr>
+        <p:txBody>
+          <a:bodyPr anchorCtr="0" anchor="b" bIns="91425" lIns="91425" spcFirstLastPara="1" rIns="91425" wrap="square" tIns="91425">
+            <a:normAutofit/>
+          </a:bodyPr>
+          <a:lstStyle/>
+          <a:p>
+            <a:pPr indent="0" lvl="0" marL="0" rtl="0" algn="l">
+              <a:spcBef>
+                <a:spcPts val="0"/>
+              </a:spcBef>
+              <a:spcAft>
+                <a:spcPts val="0"/>
+              </a:spcAft>
+              <a:buNone/>
+            </a:pPr>
+            <a:r>
+              <a:rPr lang="en-GB" sz="2800">
+                <a:solidFill>
+                  <a:srgbClr val="CC0000"/>
+                </a:solidFill>
+                <a:latin typeface="Calibri"/>
+                <a:ea typeface="Calibri"/>
+                <a:cs typeface="Calibri"/>
+                <a:sym typeface="Calibri"/>
+              </a:rPr>
+              <a:t>Instructional Prompt Vs. Persona Prompt</a:t>
+            </a:r>
+            <a:endParaRPr sz="2800">
+              <a:solidFill>
+                <a:srgbClr val="CC0000"/>
+              </a:solidFill>
+              <a:latin typeface="Calibri"/>
+              <a:ea typeface="Calibri"/>
+              <a:cs typeface="Calibri"/>
+              <a:sym typeface="Calibri"/>
+            </a:endParaRPr>
+          </a:p>
+        </p:txBody>
+      </p:sp>
+      <p:sp>
+        <p:nvSpPr>
+          <p:cNvPr id="183" name="Google Shape;183;p34"/>
+          <p:cNvSpPr txBox="1"/>
+          <p:nvPr>
+            <p:ph idx="1" type="subTitle"/>
+          </p:nvPr>
+        </p:nvSpPr>
+        <p:spPr>
+          <a:xfrm>
+            <a:off x="184950" y="801825"/>
+            <a:ext cx="8677500" cy="4017900"/>
+          </a:xfrm>
+          <a:prstGeom prst="rect">
+            <a:avLst/>
+          </a:prstGeom>
+        </p:spPr>
+        <p:txBody>
+          <a:bodyPr anchorCtr="0" anchor="t" bIns="91425" lIns="91425" spcFirstLastPara="1" rIns="91425" wrap="square" tIns="91425">
+            <a:noAutofit/>
+          </a:bodyPr>
+          <a:lstStyle/>
+          <a:p>
+            <a:pPr indent="0" lvl="0" marL="0" rtl="0" algn="just">
+              <a:lnSpc>
+                <a:spcPct val="115000"/>
+              </a:lnSpc>
+              <a:spcBef>
+                <a:spcPts val="0"/>
+              </a:spcBef>
+              <a:spcAft>
+                <a:spcPts val="0"/>
+              </a:spcAft>
+              <a:buNone/>
+            </a:pPr>
+            <a:r>
+              <a:rPr b="1" lang="en-GB" sz="1400">
+                <a:solidFill>
+                  <a:schemeClr val="dk1"/>
+                </a:solidFill>
+                <a:latin typeface="Calibri"/>
+                <a:ea typeface="Calibri"/>
+                <a:cs typeface="Calibri"/>
+                <a:sym typeface="Calibri"/>
+              </a:rPr>
+              <a:t>Persona Prompt:</a:t>
+            </a:r>
+            <a:endParaRPr b="1" sz="1400">
+              <a:solidFill>
+                <a:schemeClr val="dk1"/>
+              </a:solidFill>
+              <a:latin typeface="Calibri"/>
+              <a:ea typeface="Calibri"/>
+              <a:cs typeface="Calibri"/>
+              <a:sym typeface="Calibri"/>
+            </a:endParaRPr>
+          </a:p>
+          <a:p>
+            <a:pPr indent="-317500" lvl="0" marL="457200" rtl="0" algn="just">
+              <a:lnSpc>
+                <a:spcPct val="115000"/>
+              </a:lnSpc>
+              <a:spcBef>
+                <a:spcPts val="0"/>
+              </a:spcBef>
+              <a:spcAft>
+                <a:spcPts val="0"/>
+              </a:spcAft>
+              <a:buClr>
+                <a:schemeClr val="dk1"/>
+              </a:buClr>
+              <a:buSzPts val="1400"/>
+              <a:buFont typeface="Times New Roman"/>
+              <a:buChar char="●"/>
+            </a:pPr>
+            <a:r>
+              <a:rPr lang="en-GB" sz="1400">
+                <a:solidFill>
+                  <a:schemeClr val="dk1"/>
+                </a:solidFill>
+                <a:latin typeface="Times New Roman"/>
+                <a:ea typeface="Times New Roman"/>
+                <a:cs typeface="Times New Roman"/>
+                <a:sym typeface="Times New Roman"/>
+              </a:rPr>
+              <a:t>Act as Persona "Medical assistant" perform medical diagnosis and provide diagnosis.</a:t>
+            </a:r>
+            <a:endParaRPr sz="1400">
+              <a:solidFill>
+                <a:schemeClr val="dk1"/>
+              </a:solidFill>
+              <a:latin typeface="Times New Roman"/>
+              <a:ea typeface="Times New Roman"/>
+              <a:cs typeface="Times New Roman"/>
+              <a:sym typeface="Times New Roman"/>
+            </a:endParaRPr>
+          </a:p>
+          <a:p>
+            <a:pPr indent="0" lvl="0" marL="0" rtl="0" algn="just">
+              <a:lnSpc>
+                <a:spcPct val="115000"/>
+              </a:lnSpc>
+              <a:spcBef>
+                <a:spcPts val="0"/>
+              </a:spcBef>
+              <a:spcAft>
+                <a:spcPts val="0"/>
+              </a:spcAft>
+              <a:buNone/>
+            </a:pPr>
+            <a:r>
+              <a:t/>
+            </a:r>
+            <a:endParaRPr sz="1400">
+              <a:solidFill>
+                <a:schemeClr val="dk1"/>
+              </a:solidFill>
+              <a:latin typeface="Times New Roman"/>
+              <a:ea typeface="Times New Roman"/>
+              <a:cs typeface="Times New Roman"/>
+              <a:sym typeface="Times New Roman"/>
+            </a:endParaRPr>
+          </a:p>
+          <a:p>
+            <a:pPr indent="0" lvl="0" marL="0" rtl="0" algn="just">
+              <a:lnSpc>
+                <a:spcPct val="115000"/>
+              </a:lnSpc>
+              <a:spcBef>
+                <a:spcPts val="0"/>
+              </a:spcBef>
+              <a:spcAft>
+                <a:spcPts val="0"/>
+              </a:spcAft>
+              <a:buNone/>
+            </a:pPr>
+            <a:r>
+              <a:t/>
+            </a:r>
+            <a:endParaRPr sz="1400">
+              <a:solidFill>
+                <a:schemeClr val="dk1"/>
+              </a:solidFill>
+              <a:latin typeface="Times New Roman"/>
+              <a:ea typeface="Times New Roman"/>
+              <a:cs typeface="Times New Roman"/>
+              <a:sym typeface="Times New Roman"/>
+            </a:endParaRPr>
+          </a:p>
+          <a:p>
+            <a:pPr indent="0" lvl="0" marL="0" rtl="0" algn="just">
+              <a:lnSpc>
+                <a:spcPct val="115000"/>
+              </a:lnSpc>
+              <a:spcBef>
+                <a:spcPts val="0"/>
+              </a:spcBef>
+              <a:spcAft>
+                <a:spcPts val="0"/>
+              </a:spcAft>
+              <a:buNone/>
+            </a:pPr>
+            <a:r>
+              <a:rPr lang="en-GB" sz="1400">
+                <a:solidFill>
+                  <a:schemeClr val="dk1"/>
+                </a:solidFill>
+                <a:latin typeface="Times New Roman"/>
+                <a:ea typeface="Times New Roman"/>
+                <a:cs typeface="Times New Roman"/>
+                <a:sym typeface="Times New Roman"/>
+              </a:rPr>
+              <a:t>To demonstrate the impact of utilizing the appropriate prompt pattern on the efficiency of AI systems, we'll apply the provided templates in the following scenarios. </a:t>
+            </a:r>
+            <a:endParaRPr sz="1400">
+              <a:solidFill>
+                <a:schemeClr val="dk1"/>
+              </a:solidFill>
+              <a:latin typeface="Times New Roman"/>
+              <a:ea typeface="Times New Roman"/>
+              <a:cs typeface="Times New Roman"/>
+              <a:sym typeface="Times New Roman"/>
+            </a:endParaRPr>
+          </a:p>
+          <a:p>
+            <a:pPr indent="-317500" lvl="0" marL="457200" rtl="0" algn="just">
+              <a:lnSpc>
+                <a:spcPct val="115000"/>
+              </a:lnSpc>
+              <a:spcBef>
+                <a:spcPts val="0"/>
+              </a:spcBef>
+              <a:spcAft>
+                <a:spcPts val="0"/>
+              </a:spcAft>
+              <a:buClr>
+                <a:schemeClr val="dk1"/>
+              </a:buClr>
+              <a:buSzPts val="1400"/>
+              <a:buFont typeface="Times New Roman"/>
+              <a:buChar char="●"/>
+            </a:pPr>
+            <a:r>
+              <a:rPr lang="en-GB" sz="1400">
+                <a:solidFill>
+                  <a:schemeClr val="dk1"/>
+                </a:solidFill>
+                <a:latin typeface="Times New Roman"/>
+                <a:ea typeface="Times New Roman"/>
+                <a:cs typeface="Times New Roman"/>
+                <a:sym typeface="Times New Roman"/>
+              </a:rPr>
+              <a:t>The "Instruction Prompt Pattern" ensures that the AI maintains professional conduct, safeguards patient data, and provides accurate medical information, reflecting the standards of medical practice. </a:t>
+            </a:r>
+            <a:endParaRPr sz="1400">
+              <a:solidFill>
+                <a:schemeClr val="dk1"/>
+              </a:solidFill>
+              <a:latin typeface="Times New Roman"/>
+              <a:ea typeface="Times New Roman"/>
+              <a:cs typeface="Times New Roman"/>
+              <a:sym typeface="Times New Roman"/>
+            </a:endParaRPr>
+          </a:p>
+          <a:p>
+            <a:pPr indent="-317500" lvl="0" marL="457200" rtl="0" algn="just">
+              <a:lnSpc>
+                <a:spcPct val="115000"/>
+              </a:lnSpc>
+              <a:spcBef>
+                <a:spcPts val="0"/>
+              </a:spcBef>
+              <a:spcAft>
+                <a:spcPts val="0"/>
+              </a:spcAft>
+              <a:buClr>
+                <a:schemeClr val="dk1"/>
+              </a:buClr>
+              <a:buSzPts val="1400"/>
+              <a:buFont typeface="Times New Roman"/>
+              <a:buChar char="●"/>
+            </a:pPr>
+            <a:r>
+              <a:rPr lang="en-GB" sz="1400">
+                <a:solidFill>
+                  <a:schemeClr val="dk1"/>
+                </a:solidFill>
+                <a:latin typeface="Times New Roman"/>
+                <a:ea typeface="Times New Roman"/>
+                <a:cs typeface="Times New Roman"/>
+                <a:sym typeface="Times New Roman"/>
+              </a:rPr>
+              <a:t>On the other hand, the "Persona Prompt Pattern" directs the AI to embody the role of a medical assistant, focusing solely on performing medical diagnoses and providing corresponding treatment plans.</a:t>
+            </a:r>
+            <a:endParaRPr sz="1400">
+              <a:solidFill>
+                <a:schemeClr val="dk1"/>
+              </a:solidFill>
+              <a:latin typeface="Times New Roman"/>
+              <a:ea typeface="Times New Roman"/>
+              <a:cs typeface="Times New Roman"/>
+              <a:sym typeface="Times New Roman"/>
+            </a:endParaRPr>
+          </a:p>
+          <a:p>
+            <a:pPr indent="0" lvl="0" marL="0" rtl="0" algn="l">
+              <a:spcBef>
+                <a:spcPts val="0"/>
+              </a:spcBef>
+              <a:spcAft>
+                <a:spcPts val="0"/>
+              </a:spcAft>
+              <a:buNone/>
+            </a:pPr>
+            <a:r>
+              <a:t/>
+            </a:r>
+            <a:endParaRPr sz="1200">
+              <a:solidFill>
+                <a:schemeClr val="dk1"/>
+              </a:solidFill>
+              <a:latin typeface="Times New Roman"/>
+              <a:ea typeface="Times New Roman"/>
+              <a:cs typeface="Times New Roman"/>
+              <a:sym typeface="Times New Roman"/>
+            </a:endParaRPr>
+          </a:p>
+          <a:p>
+            <a:pPr indent="0" lvl="0" marL="0" rtl="0" algn="l">
+              <a:spcBef>
+                <a:spcPts val="0"/>
+              </a:spcBef>
+              <a:spcAft>
+                <a:spcPts val="0"/>
+              </a:spcAft>
+              <a:buNone/>
+            </a:pPr>
+            <a:r>
+              <a:t/>
+            </a:r>
+            <a:endParaRPr sz="1500">
+              <a:solidFill>
+                <a:schemeClr val="dk1"/>
+              </a:solidFill>
+              <a:latin typeface="Calibri"/>
+              <a:ea typeface="Calibri"/>
+              <a:cs typeface="Calibri"/>
+              <a:sym typeface="Calibri"/>
+            </a:endParaRPr>
+          </a:p>
+        </p:txBody>
+      </p:sp>
+    </p:spTree>
+  </p:cSld>
+  <p:clrMapOvr>
+    <a:masterClrMapping/>
+  </p:clrMapOvr>
+</p:sld>
+</file>
+
+<file path=ppt/slides/slide23.xml><?xml version="1.0" encoding="utf-8"?>
+<p:sld xmlns:a="http://schemas.openxmlformats.org/drawingml/2006/main" xmlns:r="http://schemas.openxmlformats.org/officeDocument/2006/relationships" xmlns:mc="http://schemas.openxmlformats.org/markup-compatibility/2006" xmlns:mv="urn:schemas-microsoft-com:mac:vml" xmlns:p="http://schemas.openxmlformats.org/presentationml/2006/main" xmlns:c="http://schemas.openxmlformats.org/drawingml/2006/chart" xmlns:dgm="http://schemas.openxmlformats.org/drawingml/2006/diagram" xmlns:o="urn:schemas-microsoft-com:office:office" xmlns:v="urn:schemas-microsoft-com:vml" xmlns:pvml="urn:schemas-microsoft-com:office:powerpoint" xmlns:com="http://schemas.openxmlformats.org/drawingml/2006/compatibility" xmlns:p14="http://schemas.microsoft.com/office/powerpoint/2010/main" xmlns:p15="http://schemas.microsoft.com/office/powerpoint/2012/main" xmlns:ahyp="http://schemas.microsoft.com/office/drawing/2018/hyperlinkcolor">
+  <p:cSld>
+    <p:spTree>
+      <p:nvGrpSpPr>
+        <p:cNvPr id="187" name="Shape 187"/>
+        <p:cNvGrpSpPr/>
+        <p:nvPr/>
+      </p:nvGrpSpPr>
+      <p:grpSpPr>
+        <a:xfrm>
+          <a:off x="0" y="0"/>
+          <a:ext cx="0" cy="0"/>
+          <a:chOff x="0" y="0"/>
+          <a:chExt cx="0" cy="0"/>
+        </a:xfrm>
+      </p:grpSpPr>
+      <p:sp>
+        <p:nvSpPr>
+          <p:cNvPr id="188" name="Google Shape;188;p35"/>
+          <p:cNvSpPr txBox="1"/>
+          <p:nvPr>
+            <p:ph type="ctrTitle"/>
+          </p:nvPr>
+        </p:nvSpPr>
+        <p:spPr>
+          <a:xfrm>
+            <a:off x="184950" y="0"/>
+            <a:ext cx="8521800" cy="749400"/>
+          </a:xfrm>
+          <a:prstGeom prst="rect">
+            <a:avLst/>
+          </a:prstGeom>
+        </p:spPr>
+        <p:txBody>
+          <a:bodyPr anchorCtr="0" anchor="b" bIns="91425" lIns="91425" spcFirstLastPara="1" rIns="91425" wrap="square" tIns="91425">
+            <a:normAutofit/>
+          </a:bodyPr>
+          <a:lstStyle/>
+          <a:p>
+            <a:pPr indent="0" lvl="0" marL="0" rtl="0" algn="l">
+              <a:spcBef>
+                <a:spcPts val="0"/>
+              </a:spcBef>
+              <a:spcAft>
+                <a:spcPts val="0"/>
+              </a:spcAft>
+              <a:buNone/>
+            </a:pPr>
+            <a:r>
+              <a:rPr lang="en-GB" sz="2800">
+                <a:solidFill>
+                  <a:srgbClr val="CC0000"/>
+                </a:solidFill>
+                <a:latin typeface="Calibri"/>
+                <a:ea typeface="Calibri"/>
+                <a:cs typeface="Calibri"/>
+                <a:sym typeface="Calibri"/>
+              </a:rPr>
+              <a:t>Example 1:</a:t>
+            </a:r>
+            <a:endParaRPr sz="2800">
+              <a:solidFill>
+                <a:srgbClr val="CC0000"/>
+              </a:solidFill>
+              <a:latin typeface="Calibri"/>
+              <a:ea typeface="Calibri"/>
+              <a:cs typeface="Calibri"/>
+              <a:sym typeface="Calibri"/>
+            </a:endParaRPr>
+          </a:p>
+        </p:txBody>
+      </p:sp>
+      <p:sp>
+        <p:nvSpPr>
+          <p:cNvPr id="189" name="Google Shape;189;p35"/>
+          <p:cNvSpPr txBox="1"/>
+          <p:nvPr>
+            <p:ph idx="1" type="subTitle"/>
+          </p:nvPr>
+        </p:nvSpPr>
+        <p:spPr>
+          <a:xfrm>
+            <a:off x="184950" y="749400"/>
+            <a:ext cx="8677500" cy="4017900"/>
+          </a:xfrm>
+          <a:prstGeom prst="rect">
+            <a:avLst/>
+          </a:prstGeom>
+        </p:spPr>
+        <p:txBody>
+          <a:bodyPr anchorCtr="0" anchor="t" bIns="91425" lIns="91425" spcFirstLastPara="1" rIns="91425" wrap="square" tIns="91425">
+            <a:noAutofit/>
+          </a:bodyPr>
+          <a:lstStyle/>
+          <a:p>
+            <a:pPr indent="0" lvl="0" marL="0" rtl="0" algn="just">
+              <a:lnSpc>
+                <a:spcPct val="115000"/>
+              </a:lnSpc>
+              <a:spcBef>
+                <a:spcPts val="0"/>
+              </a:spcBef>
+              <a:spcAft>
+                <a:spcPts val="0"/>
+              </a:spcAft>
+              <a:buClr>
+                <a:schemeClr val="dk1"/>
+              </a:buClr>
+              <a:buSzPts val="1100"/>
+              <a:buFont typeface="Arial"/>
+              <a:buNone/>
+            </a:pPr>
+            <a:r>
+              <a:rPr b="1" lang="en-GB" sz="1400">
+                <a:solidFill>
+                  <a:schemeClr val="dk1"/>
+                </a:solidFill>
+                <a:latin typeface="Times New Roman"/>
+                <a:ea typeface="Times New Roman"/>
+                <a:cs typeface="Times New Roman"/>
+                <a:sym typeface="Times New Roman"/>
+              </a:rPr>
+              <a:t>The instructional prompt pattern response on the diagnosis of symptoms like cough cold and fever:</a:t>
+            </a:r>
+            <a:endParaRPr b="1" sz="1800">
+              <a:solidFill>
+                <a:schemeClr val="dk1"/>
+              </a:solidFill>
+              <a:latin typeface="Calibri"/>
+              <a:ea typeface="Calibri"/>
+              <a:cs typeface="Calibri"/>
+              <a:sym typeface="Calibri"/>
+            </a:endParaRPr>
+          </a:p>
+        </p:txBody>
+      </p:sp>
+      <p:pic>
+        <p:nvPicPr>
+          <p:cNvPr id="190" name="Google Shape;190;p35"/>
+          <p:cNvPicPr preferRelativeResize="0"/>
+          <p:nvPr/>
+        </p:nvPicPr>
+        <p:blipFill rotWithShape="1">
+          <a:blip r:embed="rId3">
+            <a:alphaModFix/>
+          </a:blip>
+          <a:srcRect b="0" l="3261" r="5647" t="0"/>
+          <a:stretch/>
+        </p:blipFill>
+        <p:spPr>
+          <a:xfrm>
+            <a:off x="1758913" y="1142250"/>
+            <a:ext cx="5373876" cy="3862475"/>
+          </a:xfrm>
+          <a:prstGeom prst="rect">
+            <a:avLst/>
+          </a:prstGeom>
+          <a:noFill/>
+          <a:ln>
+            <a:noFill/>
+          </a:ln>
+        </p:spPr>
+      </p:pic>
+    </p:spTree>
+  </p:cSld>
+  <p:clrMapOvr>
+    <a:masterClrMapping/>
+  </p:clrMapOvr>
+</p:sld>
+</file>
+
+<file path=ppt/slides/slide24.xml><?xml version="1.0" encoding="utf-8"?>
+<p:sld xmlns:a="http://schemas.openxmlformats.org/drawingml/2006/main" xmlns:r="http://schemas.openxmlformats.org/officeDocument/2006/relationships" xmlns:mc="http://schemas.openxmlformats.org/markup-compatibility/2006" xmlns:mv="urn:schemas-microsoft-com:mac:vml" xmlns:p="http://schemas.openxmlformats.org/presentationml/2006/main" xmlns:c="http://schemas.openxmlformats.org/drawingml/2006/chart" xmlns:dgm="http://schemas.openxmlformats.org/drawingml/2006/diagram" xmlns:o="urn:schemas-microsoft-com:office:office" xmlns:v="urn:schemas-microsoft-com:vml" xmlns:pvml="urn:schemas-microsoft-com:office:powerpoint" xmlns:com="http://schemas.openxmlformats.org/drawingml/2006/compatibility" xmlns:p14="http://schemas.microsoft.com/office/powerpoint/2010/main" xmlns:p15="http://schemas.microsoft.com/office/powerpoint/2012/main" xmlns:ahyp="http://schemas.microsoft.com/office/drawing/2018/hyperlinkcolor">
+  <p:cSld>
+    <p:spTree>
+      <p:nvGrpSpPr>
+        <p:cNvPr id="194" name="Shape 194"/>
+        <p:cNvGrpSpPr/>
+        <p:nvPr/>
+      </p:nvGrpSpPr>
+      <p:grpSpPr>
+        <a:xfrm>
+          <a:off x="0" y="0"/>
+          <a:ext cx="0" cy="0"/>
+          <a:chOff x="0" y="0"/>
+          <a:chExt cx="0" cy="0"/>
+        </a:xfrm>
+      </p:grpSpPr>
+      <p:sp>
+        <p:nvSpPr>
+          <p:cNvPr id="195" name="Google Shape;195;p36"/>
+          <p:cNvSpPr txBox="1"/>
+          <p:nvPr>
+            <p:ph type="ctrTitle"/>
+          </p:nvPr>
+        </p:nvSpPr>
+        <p:spPr>
+          <a:xfrm>
+            <a:off x="184950" y="-101775"/>
+            <a:ext cx="8521800" cy="749400"/>
+          </a:xfrm>
+          <a:prstGeom prst="rect">
+            <a:avLst/>
+          </a:prstGeom>
+        </p:spPr>
+        <p:txBody>
+          <a:bodyPr anchorCtr="0" anchor="b" bIns="91425" lIns="91425" spcFirstLastPara="1" rIns="91425" wrap="square" tIns="91425">
+            <a:normAutofit/>
+          </a:bodyPr>
+          <a:lstStyle/>
+          <a:p>
+            <a:pPr indent="0" lvl="0" marL="0" rtl="0" algn="l">
+              <a:spcBef>
+                <a:spcPts val="0"/>
+              </a:spcBef>
+              <a:spcAft>
+                <a:spcPts val="0"/>
+              </a:spcAft>
+              <a:buNone/>
+            </a:pPr>
+            <a:r>
+              <a:rPr lang="en-GB" sz="2800">
+                <a:solidFill>
+                  <a:srgbClr val="CC0000"/>
+                </a:solidFill>
+                <a:latin typeface="Calibri"/>
+                <a:ea typeface="Calibri"/>
+                <a:cs typeface="Calibri"/>
+                <a:sym typeface="Calibri"/>
+              </a:rPr>
+              <a:t>Example 1:</a:t>
+            </a:r>
+            <a:endParaRPr sz="2800">
+              <a:solidFill>
+                <a:srgbClr val="CC0000"/>
+              </a:solidFill>
+              <a:latin typeface="Calibri"/>
+              <a:ea typeface="Calibri"/>
+              <a:cs typeface="Calibri"/>
+              <a:sym typeface="Calibri"/>
+            </a:endParaRPr>
+          </a:p>
+        </p:txBody>
+      </p:sp>
+      <p:sp>
+        <p:nvSpPr>
+          <p:cNvPr id="196" name="Google Shape;196;p36"/>
+          <p:cNvSpPr txBox="1"/>
+          <p:nvPr>
+            <p:ph idx="1" type="subTitle"/>
+          </p:nvPr>
+        </p:nvSpPr>
+        <p:spPr>
+          <a:xfrm>
+            <a:off x="184950" y="647625"/>
+            <a:ext cx="8677500" cy="4017900"/>
+          </a:xfrm>
+          <a:prstGeom prst="rect">
+            <a:avLst/>
+          </a:prstGeom>
+        </p:spPr>
+        <p:txBody>
+          <a:bodyPr anchorCtr="0" anchor="t" bIns="91425" lIns="91425" spcFirstLastPara="1" rIns="91425" wrap="square" tIns="91425">
+            <a:noAutofit/>
+          </a:bodyPr>
+          <a:lstStyle/>
+          <a:p>
+            <a:pPr indent="0" lvl="0" marL="0" rtl="0" algn="just">
+              <a:lnSpc>
+                <a:spcPct val="115000"/>
+              </a:lnSpc>
+              <a:spcBef>
+                <a:spcPts val="0"/>
+              </a:spcBef>
+              <a:spcAft>
+                <a:spcPts val="0"/>
+              </a:spcAft>
+              <a:buNone/>
+            </a:pPr>
+            <a:r>
+              <a:rPr b="1" lang="en-GB" sz="1400">
+                <a:solidFill>
+                  <a:schemeClr val="dk1"/>
+                </a:solidFill>
+                <a:latin typeface="Times New Roman"/>
+                <a:ea typeface="Times New Roman"/>
+                <a:cs typeface="Times New Roman"/>
+                <a:sym typeface="Times New Roman"/>
+              </a:rPr>
+              <a:t>The persona prompt pattern response on the diagnosis of symptoms like cough cold and fever:</a:t>
+            </a:r>
+            <a:endParaRPr b="1" sz="1800">
+              <a:solidFill>
+                <a:schemeClr val="dk1"/>
+              </a:solidFill>
+              <a:latin typeface="Calibri"/>
+              <a:ea typeface="Calibri"/>
+              <a:cs typeface="Calibri"/>
+              <a:sym typeface="Calibri"/>
+            </a:endParaRPr>
+          </a:p>
+        </p:txBody>
+      </p:sp>
+      <p:pic>
+        <p:nvPicPr>
+          <p:cNvPr id="197" name="Google Shape;197;p36"/>
+          <p:cNvPicPr preferRelativeResize="0"/>
+          <p:nvPr/>
+        </p:nvPicPr>
+        <p:blipFill>
+          <a:blip r:embed="rId3">
+            <a:alphaModFix/>
+          </a:blip>
+          <a:stretch>
+            <a:fillRect/>
+          </a:stretch>
+        </p:blipFill>
+        <p:spPr>
+          <a:xfrm>
+            <a:off x="2076575" y="1018800"/>
+            <a:ext cx="4597723" cy="4017900"/>
+          </a:xfrm>
+          <a:prstGeom prst="rect">
+            <a:avLst/>
+          </a:prstGeom>
+          <a:noFill/>
+          <a:ln>
+            <a:noFill/>
+          </a:ln>
+        </p:spPr>
+      </p:pic>
+    </p:spTree>
+  </p:cSld>
+  <p:clrMapOvr>
+    <a:masterClrMapping/>
+  </p:clrMapOvr>
+</p:sld>
+</file>
+
+<file path=ppt/slides/slide25.xml><?xml version="1.0" encoding="utf-8"?>
+<p:sld xmlns:a="http://schemas.openxmlformats.org/drawingml/2006/main" xmlns:r="http://schemas.openxmlformats.org/officeDocument/2006/relationships" xmlns:mc="http://schemas.openxmlformats.org/markup-compatibility/2006" xmlns:mv="urn:schemas-microsoft-com:mac:vml" xmlns:p="http://schemas.openxmlformats.org/presentationml/2006/main" xmlns:c="http://schemas.openxmlformats.org/drawingml/2006/chart" xmlns:dgm="http://schemas.openxmlformats.org/drawingml/2006/diagram" xmlns:o="urn:schemas-microsoft-com:office:office" xmlns:v="urn:schemas-microsoft-com:vml" xmlns:pvml="urn:schemas-microsoft-com:office:powerpoint" xmlns:com="http://schemas.openxmlformats.org/drawingml/2006/compatibility" xmlns:p14="http://schemas.microsoft.com/office/powerpoint/2010/main" xmlns:p15="http://schemas.microsoft.com/office/powerpoint/2012/main" xmlns:ahyp="http://schemas.microsoft.com/office/drawing/2018/hyperlinkcolor">
+  <p:cSld>
+    <p:spTree>
+      <p:nvGrpSpPr>
+        <p:cNvPr id="201" name="Shape 201"/>
+        <p:cNvGrpSpPr/>
+        <p:nvPr/>
+      </p:nvGrpSpPr>
+      <p:grpSpPr>
+        <a:xfrm>
+          <a:off x="0" y="0"/>
+          <a:ext cx="0" cy="0"/>
+          <a:chOff x="0" y="0"/>
+          <a:chExt cx="0" cy="0"/>
+        </a:xfrm>
+      </p:grpSpPr>
+      <p:sp>
+        <p:nvSpPr>
+          <p:cNvPr id="202" name="Google Shape;202;p37"/>
+          <p:cNvSpPr txBox="1"/>
+          <p:nvPr>
+            <p:ph type="ctrTitle"/>
+          </p:nvPr>
+        </p:nvSpPr>
+        <p:spPr>
+          <a:xfrm>
+            <a:off x="184950" y="-101775"/>
+            <a:ext cx="8521800" cy="749400"/>
+          </a:xfrm>
+          <a:prstGeom prst="rect">
+            <a:avLst/>
+          </a:prstGeom>
+        </p:spPr>
+        <p:txBody>
+          <a:bodyPr anchorCtr="0" anchor="b" bIns="91425" lIns="91425" spcFirstLastPara="1" rIns="91425" wrap="square" tIns="91425">
+            <a:normAutofit/>
+          </a:bodyPr>
+          <a:lstStyle/>
+          <a:p>
+            <a:pPr indent="0" lvl="0" marL="0" rtl="0" algn="l">
+              <a:spcBef>
+                <a:spcPts val="0"/>
+              </a:spcBef>
+              <a:spcAft>
+                <a:spcPts val="0"/>
+              </a:spcAft>
+              <a:buNone/>
+            </a:pPr>
+            <a:r>
+              <a:rPr lang="en-GB" sz="2800">
+                <a:solidFill>
+                  <a:srgbClr val="CC0000"/>
+                </a:solidFill>
+                <a:latin typeface="Calibri"/>
+                <a:ea typeface="Calibri"/>
+                <a:cs typeface="Calibri"/>
+                <a:sym typeface="Calibri"/>
+              </a:rPr>
+              <a:t>Example 1:</a:t>
+            </a:r>
+            <a:endParaRPr sz="2800">
+              <a:solidFill>
+                <a:srgbClr val="CC0000"/>
+              </a:solidFill>
+              <a:latin typeface="Calibri"/>
+              <a:ea typeface="Calibri"/>
+              <a:cs typeface="Calibri"/>
+              <a:sym typeface="Calibri"/>
+            </a:endParaRPr>
+          </a:p>
+        </p:txBody>
+      </p:sp>
+      <p:sp>
+        <p:nvSpPr>
+          <p:cNvPr id="203" name="Google Shape;203;p37"/>
+          <p:cNvSpPr txBox="1"/>
+          <p:nvPr>
+            <p:ph idx="1" type="subTitle"/>
+          </p:nvPr>
+        </p:nvSpPr>
+        <p:spPr>
+          <a:xfrm>
+            <a:off x="184950" y="647625"/>
+            <a:ext cx="8677500" cy="4017900"/>
+          </a:xfrm>
+          <a:prstGeom prst="rect">
+            <a:avLst/>
+          </a:prstGeom>
+        </p:spPr>
+        <p:txBody>
+          <a:bodyPr anchorCtr="0" anchor="t" bIns="91425" lIns="91425" spcFirstLastPara="1" rIns="91425" wrap="square" tIns="91425">
+            <a:noAutofit/>
+          </a:bodyPr>
+          <a:lstStyle/>
+          <a:p>
+            <a:pPr indent="0" lvl="0" marL="0" rtl="0" algn="just">
+              <a:lnSpc>
+                <a:spcPct val="115000"/>
+              </a:lnSpc>
+              <a:spcBef>
+                <a:spcPts val="0"/>
+              </a:spcBef>
+              <a:spcAft>
+                <a:spcPts val="0"/>
+              </a:spcAft>
+              <a:buNone/>
+            </a:pPr>
+            <a:r>
+              <a:rPr b="1" lang="en-GB" sz="1500">
+                <a:solidFill>
+                  <a:schemeClr val="dk1"/>
+                </a:solidFill>
+                <a:latin typeface="Times New Roman"/>
+                <a:ea typeface="Times New Roman"/>
+                <a:cs typeface="Times New Roman"/>
+                <a:sym typeface="Times New Roman"/>
+              </a:rPr>
+              <a:t>Conclusion:</a:t>
+            </a:r>
+            <a:r>
+              <a:rPr b="1" lang="en-GB" sz="1400">
+                <a:solidFill>
+                  <a:schemeClr val="dk1"/>
+                </a:solidFill>
+                <a:latin typeface="Times New Roman"/>
+                <a:ea typeface="Times New Roman"/>
+                <a:cs typeface="Times New Roman"/>
+                <a:sym typeface="Times New Roman"/>
+              </a:rPr>
+              <a:t> </a:t>
+            </a:r>
+            <a:endParaRPr b="1" sz="1400">
+              <a:solidFill>
+                <a:schemeClr val="dk1"/>
+              </a:solidFill>
+              <a:latin typeface="Times New Roman"/>
+              <a:ea typeface="Times New Roman"/>
+              <a:cs typeface="Times New Roman"/>
+              <a:sym typeface="Times New Roman"/>
+            </a:endParaRPr>
+          </a:p>
+          <a:p>
+            <a:pPr indent="0" lvl="0" marL="0" rtl="0" algn="just">
+              <a:lnSpc>
+                <a:spcPct val="115000"/>
+              </a:lnSpc>
+              <a:spcBef>
+                <a:spcPts val="0"/>
+              </a:spcBef>
+              <a:spcAft>
+                <a:spcPts val="0"/>
+              </a:spcAft>
+              <a:buNone/>
+            </a:pPr>
+            <a:r>
+              <a:rPr lang="en-GB" sz="1400">
+                <a:solidFill>
+                  <a:schemeClr val="dk1"/>
+                </a:solidFill>
+                <a:latin typeface="Times New Roman"/>
+                <a:ea typeface="Times New Roman"/>
+                <a:cs typeface="Times New Roman"/>
+                <a:sym typeface="Times New Roman"/>
+              </a:rPr>
+              <a:t>When we employed the instructional prompt pattern and inquired about diagnosing symptoms such as cough, cold, and fever, Chat-GPT requested additional information to ensure an accurate assessment. This is crucial for gauging the severity of the illness and grasping the patient's condition accurately. Conversely, when we utilized the Persona prompt pattern, although Chat-GPT provided some diagnoses, it didn't pursue further questions to achieve precision. Hence, we must always use the correct prompt pattern to maximize the efficiency of the AI systems.</a:t>
+            </a:r>
+            <a:endParaRPr sz="1400">
+              <a:solidFill>
+                <a:schemeClr val="dk1"/>
+              </a:solidFill>
+              <a:latin typeface="Times New Roman"/>
+              <a:ea typeface="Times New Roman"/>
+              <a:cs typeface="Times New Roman"/>
+              <a:sym typeface="Times New Roman"/>
+            </a:endParaRPr>
+          </a:p>
+          <a:p>
+            <a:pPr indent="0" lvl="0" marL="0" rtl="0" algn="just">
+              <a:lnSpc>
+                <a:spcPct val="115000"/>
+              </a:lnSpc>
+              <a:spcBef>
+                <a:spcPts val="0"/>
+              </a:spcBef>
+              <a:spcAft>
+                <a:spcPts val="0"/>
+              </a:spcAft>
+              <a:buNone/>
+            </a:pPr>
+            <a:r>
+              <a:t/>
+            </a:r>
+            <a:endParaRPr sz="1400">
+              <a:solidFill>
+                <a:schemeClr val="dk1"/>
+              </a:solidFill>
+              <a:latin typeface="Times New Roman"/>
+              <a:ea typeface="Times New Roman"/>
+              <a:cs typeface="Times New Roman"/>
+              <a:sym typeface="Times New Roman"/>
+            </a:endParaRPr>
+          </a:p>
+          <a:p>
+            <a:pPr indent="0" lvl="0" marL="0" rtl="0" algn="just">
+              <a:lnSpc>
+                <a:spcPct val="115000"/>
+              </a:lnSpc>
+              <a:spcBef>
+                <a:spcPts val="0"/>
+              </a:spcBef>
+              <a:spcAft>
+                <a:spcPts val="0"/>
+              </a:spcAft>
+              <a:buNone/>
+            </a:pPr>
+            <a:r>
+              <a:rPr b="1" lang="en-GB" sz="1400">
+                <a:solidFill>
+                  <a:schemeClr val="dk1"/>
+                </a:solidFill>
+                <a:latin typeface="Times New Roman"/>
+                <a:ea typeface="Times New Roman"/>
+                <a:cs typeface="Times New Roman"/>
+                <a:sym typeface="Times New Roman"/>
+              </a:rPr>
+              <a:t>Chat Links:</a:t>
+            </a:r>
+            <a:endParaRPr b="1" sz="1400">
+              <a:solidFill>
+                <a:schemeClr val="dk1"/>
+              </a:solidFill>
+              <a:latin typeface="Times New Roman"/>
+              <a:ea typeface="Times New Roman"/>
+              <a:cs typeface="Times New Roman"/>
+              <a:sym typeface="Times New Roman"/>
+            </a:endParaRPr>
+          </a:p>
+          <a:p>
+            <a:pPr indent="-317500" lvl="0" marL="457200" rtl="0" algn="just">
+              <a:lnSpc>
+                <a:spcPct val="115000"/>
+              </a:lnSpc>
+              <a:spcBef>
+                <a:spcPts val="0"/>
+              </a:spcBef>
+              <a:spcAft>
+                <a:spcPts val="0"/>
+              </a:spcAft>
+              <a:buClr>
+                <a:schemeClr val="dk1"/>
+              </a:buClr>
+              <a:buSzPts val="1400"/>
+              <a:buFont typeface="Times New Roman"/>
+              <a:buAutoNum type="arabicPeriod"/>
+            </a:pPr>
+            <a:r>
+              <a:rPr lang="en-GB" sz="1400">
+                <a:solidFill>
+                  <a:schemeClr val="dk1"/>
+                </a:solidFill>
+                <a:latin typeface="Times New Roman"/>
+                <a:ea typeface="Times New Roman"/>
+                <a:cs typeface="Times New Roman"/>
+                <a:sym typeface="Times New Roman"/>
+              </a:rPr>
+              <a:t>Instructional prompt pattern: </a:t>
+            </a:r>
+            <a:r>
+              <a:rPr lang="en-GB" sz="1400" u="sng">
+                <a:solidFill>
+                  <a:srgbClr val="1155CC"/>
+                </a:solidFill>
+                <a:latin typeface="Times New Roman"/>
+                <a:ea typeface="Times New Roman"/>
+                <a:cs typeface="Times New Roman"/>
+                <a:sym typeface="Times New Roman"/>
+                <a:hlinkClick r:id="rId3">
+                  <a:extLst>
+                    <a:ext uri="{A12FA001-AC4F-418D-AE19-62706E023703}">
+                      <ahyp:hlinkClr val="tx"/>
+                    </a:ext>
+                  </a:extLst>
+                </a:hlinkClick>
+              </a:rPr>
+              <a:t>https://chat.openai.com/share/4ca4cfd9-2e5b-41a1-8128-7e89b7ed6651</a:t>
+            </a:r>
+            <a:endParaRPr sz="1400">
+              <a:solidFill>
+                <a:schemeClr val="dk1"/>
+              </a:solidFill>
+              <a:latin typeface="Times New Roman"/>
+              <a:ea typeface="Times New Roman"/>
+              <a:cs typeface="Times New Roman"/>
+              <a:sym typeface="Times New Roman"/>
+            </a:endParaRPr>
+          </a:p>
+          <a:p>
+            <a:pPr indent="-317500" lvl="0" marL="457200" rtl="0" algn="just">
+              <a:lnSpc>
+                <a:spcPct val="115000"/>
+              </a:lnSpc>
+              <a:spcBef>
+                <a:spcPts val="0"/>
+              </a:spcBef>
+              <a:spcAft>
+                <a:spcPts val="0"/>
+              </a:spcAft>
+              <a:buClr>
+                <a:schemeClr val="dk1"/>
+              </a:buClr>
+              <a:buSzPts val="1400"/>
+              <a:buFont typeface="Times New Roman"/>
+              <a:buAutoNum type="arabicPeriod"/>
+            </a:pPr>
+            <a:r>
+              <a:rPr lang="en-GB" sz="1400">
+                <a:solidFill>
+                  <a:schemeClr val="dk1"/>
+                </a:solidFill>
+                <a:latin typeface="Times New Roman"/>
+                <a:ea typeface="Times New Roman"/>
+                <a:cs typeface="Times New Roman"/>
+                <a:sym typeface="Times New Roman"/>
+              </a:rPr>
+              <a:t>Personal prompt pattern: </a:t>
+            </a:r>
+            <a:r>
+              <a:rPr lang="en-GB" sz="1400" u="sng">
+                <a:solidFill>
+                  <a:srgbClr val="1155CC"/>
+                </a:solidFill>
+                <a:latin typeface="Times New Roman"/>
+                <a:ea typeface="Times New Roman"/>
+                <a:cs typeface="Times New Roman"/>
+                <a:sym typeface="Times New Roman"/>
+                <a:hlinkClick r:id="rId4">
+                  <a:extLst>
+                    <a:ext uri="{A12FA001-AC4F-418D-AE19-62706E023703}">
+                      <ahyp:hlinkClr val="tx"/>
+                    </a:ext>
+                  </a:extLst>
+                </a:hlinkClick>
+              </a:rPr>
+              <a:t>https://chat.openai.com/share/9fdeec31-1dd2-4354-b991-283d95cce68d</a:t>
+            </a:r>
+            <a:r>
+              <a:rPr lang="en-GB" sz="1400">
+                <a:solidFill>
+                  <a:schemeClr val="dk1"/>
+                </a:solidFill>
+                <a:latin typeface="Times New Roman"/>
+                <a:ea typeface="Times New Roman"/>
+                <a:cs typeface="Times New Roman"/>
+                <a:sym typeface="Times New Roman"/>
+              </a:rPr>
+              <a:t> </a:t>
+            </a:r>
+            <a:endParaRPr sz="1400">
+              <a:solidFill>
+                <a:schemeClr val="dk1"/>
+              </a:solidFill>
+              <a:latin typeface="Times New Roman"/>
+              <a:ea typeface="Times New Roman"/>
+              <a:cs typeface="Times New Roman"/>
+              <a:sym typeface="Times New Roman"/>
+            </a:endParaRPr>
+          </a:p>
+        </p:txBody>
+      </p:sp>
+    </p:spTree>
+  </p:cSld>
+  <p:clrMapOvr>
+    <a:masterClrMapping/>
+  </p:clrMapOvr>
+</p:sld>
+</file>
+
+<file path=ppt/slides/slide26.xml><?xml version="1.0" encoding="utf-8"?>
+<p:sld xmlns:a="http://schemas.openxmlformats.org/drawingml/2006/main" xmlns:r="http://schemas.openxmlformats.org/officeDocument/2006/relationships" xmlns:mc="http://schemas.openxmlformats.org/markup-compatibility/2006" xmlns:mv="urn:schemas-microsoft-com:mac:vml" xmlns:p="http://schemas.openxmlformats.org/presentationml/2006/main" xmlns:c="http://schemas.openxmlformats.org/drawingml/2006/chart" xmlns:dgm="http://schemas.openxmlformats.org/drawingml/2006/diagram" xmlns:o="urn:schemas-microsoft-com:office:office" xmlns:v="urn:schemas-microsoft-com:vml" xmlns:pvml="urn:schemas-microsoft-com:office:powerpoint" xmlns:com="http://schemas.openxmlformats.org/drawingml/2006/compatibility" xmlns:p14="http://schemas.microsoft.com/office/powerpoint/2010/main" xmlns:p15="http://schemas.microsoft.com/office/powerpoint/2012/main" xmlns:ahyp="http://schemas.microsoft.com/office/drawing/2018/hyperlinkcolor">
+  <p:cSld>
+    <p:spTree>
+      <p:nvGrpSpPr>
+        <p:cNvPr id="207" name="Shape 207"/>
+        <p:cNvGrpSpPr/>
+        <p:nvPr/>
+      </p:nvGrpSpPr>
+      <p:grpSpPr>
+        <a:xfrm>
+          <a:off x="0" y="0"/>
+          <a:ext cx="0" cy="0"/>
+          <a:chOff x="0" y="0"/>
+          <a:chExt cx="0" cy="0"/>
+        </a:xfrm>
+      </p:grpSpPr>
+      <p:sp>
+        <p:nvSpPr>
+          <p:cNvPr id="208" name="Google Shape;208;p38"/>
+          <p:cNvSpPr txBox="1"/>
+          <p:nvPr>
+            <p:ph type="ctrTitle"/>
+          </p:nvPr>
+        </p:nvSpPr>
+        <p:spPr>
+          <a:xfrm>
+            <a:off x="184950" y="0"/>
+            <a:ext cx="8521800" cy="749400"/>
+          </a:xfrm>
+          <a:prstGeom prst="rect">
+            <a:avLst/>
+          </a:prstGeom>
+        </p:spPr>
+        <p:txBody>
+          <a:bodyPr anchorCtr="0" anchor="b" bIns="91425" lIns="91425" spcFirstLastPara="1" rIns="91425" wrap="square" tIns="91425">
+            <a:normAutofit/>
+          </a:bodyPr>
+          <a:lstStyle/>
+          <a:p>
+            <a:pPr indent="0" lvl="0" marL="0" rtl="0" algn="l">
+              <a:spcBef>
+                <a:spcPts val="0"/>
+              </a:spcBef>
+              <a:spcAft>
+                <a:spcPts val="0"/>
+              </a:spcAft>
+              <a:buNone/>
+            </a:pPr>
+            <a:r>
+              <a:rPr lang="en-GB" sz="2800">
+                <a:solidFill>
+                  <a:srgbClr val="CC0000"/>
+                </a:solidFill>
+                <a:latin typeface="Calibri"/>
+                <a:ea typeface="Calibri"/>
+                <a:cs typeface="Calibri"/>
+                <a:sym typeface="Calibri"/>
+              </a:rPr>
+              <a:t>Example 2:</a:t>
+            </a:r>
+            <a:endParaRPr sz="2800">
+              <a:solidFill>
+                <a:srgbClr val="CC0000"/>
+              </a:solidFill>
+              <a:latin typeface="Calibri"/>
+              <a:ea typeface="Calibri"/>
+              <a:cs typeface="Calibri"/>
+              <a:sym typeface="Calibri"/>
+            </a:endParaRPr>
+          </a:p>
+        </p:txBody>
+      </p:sp>
+      <p:sp>
+        <p:nvSpPr>
+          <p:cNvPr id="209" name="Google Shape;209;p38"/>
+          <p:cNvSpPr txBox="1"/>
+          <p:nvPr>
+            <p:ph idx="1" type="subTitle"/>
+          </p:nvPr>
+        </p:nvSpPr>
+        <p:spPr>
+          <a:xfrm>
+            <a:off x="184950" y="749400"/>
+            <a:ext cx="8677500" cy="4017900"/>
+          </a:xfrm>
+          <a:prstGeom prst="rect">
+            <a:avLst/>
+          </a:prstGeom>
+        </p:spPr>
+        <p:txBody>
+          <a:bodyPr anchorCtr="0" anchor="t" bIns="91425" lIns="91425" spcFirstLastPara="1" rIns="91425" wrap="square" tIns="91425">
+            <a:noAutofit/>
+          </a:bodyPr>
+          <a:lstStyle/>
+          <a:p>
+            <a:pPr indent="0" lvl="0" marL="0" rtl="0" algn="just">
+              <a:lnSpc>
+                <a:spcPct val="115000"/>
+              </a:lnSpc>
+              <a:spcBef>
+                <a:spcPts val="0"/>
+              </a:spcBef>
+              <a:spcAft>
+                <a:spcPts val="0"/>
+              </a:spcAft>
+              <a:buNone/>
+            </a:pPr>
+            <a:r>
+              <a:rPr b="1" lang="en-GB" sz="1400">
+                <a:solidFill>
+                  <a:schemeClr val="dk1"/>
+                </a:solidFill>
+                <a:latin typeface="Times New Roman"/>
+                <a:ea typeface="Times New Roman"/>
+                <a:cs typeface="Times New Roman"/>
+                <a:sym typeface="Times New Roman"/>
+              </a:rPr>
+              <a:t>The instructional prompt pattern response on the data privacy:</a:t>
+            </a:r>
+            <a:endParaRPr b="1" sz="1400">
+              <a:solidFill>
+                <a:schemeClr val="dk1"/>
+              </a:solidFill>
+              <a:latin typeface="Calibri"/>
+              <a:ea typeface="Calibri"/>
+              <a:cs typeface="Calibri"/>
+              <a:sym typeface="Calibri"/>
+            </a:endParaRPr>
+          </a:p>
+        </p:txBody>
+      </p:sp>
+      <p:pic>
+        <p:nvPicPr>
+          <p:cNvPr id="210" name="Google Shape;210;p38"/>
+          <p:cNvPicPr preferRelativeResize="0"/>
+          <p:nvPr/>
+        </p:nvPicPr>
+        <p:blipFill>
+          <a:blip r:embed="rId3">
+            <a:alphaModFix/>
+          </a:blip>
+          <a:stretch>
+            <a:fillRect/>
+          </a:stretch>
+        </p:blipFill>
+        <p:spPr>
+          <a:xfrm>
+            <a:off x="1682025" y="1208825"/>
+            <a:ext cx="5810249" cy="3740400"/>
+          </a:xfrm>
+          <a:prstGeom prst="rect">
+            <a:avLst/>
+          </a:prstGeom>
+          <a:noFill/>
+          <a:ln>
+            <a:noFill/>
+          </a:ln>
+        </p:spPr>
+      </p:pic>
+    </p:spTree>
+  </p:cSld>
+  <p:clrMapOvr>
+    <a:masterClrMapping/>
+  </p:clrMapOvr>
+</p:sld>
+</file>
+
+<file path=ppt/slides/slide27.xml><?xml version="1.0" encoding="utf-8"?>
+<p:sld xmlns:a="http://schemas.openxmlformats.org/drawingml/2006/main" xmlns:r="http://schemas.openxmlformats.org/officeDocument/2006/relationships" xmlns:mc="http://schemas.openxmlformats.org/markup-compatibility/2006" xmlns:mv="urn:schemas-microsoft-com:mac:vml" xmlns:p="http://schemas.openxmlformats.org/presentationml/2006/main" xmlns:c="http://schemas.openxmlformats.org/drawingml/2006/chart" xmlns:dgm="http://schemas.openxmlformats.org/drawingml/2006/diagram" xmlns:o="urn:schemas-microsoft-com:office:office" xmlns:v="urn:schemas-microsoft-com:vml" xmlns:pvml="urn:schemas-microsoft-com:office:powerpoint" xmlns:com="http://schemas.openxmlformats.org/drawingml/2006/compatibility" xmlns:p14="http://schemas.microsoft.com/office/powerpoint/2010/main" xmlns:p15="http://schemas.microsoft.com/office/powerpoint/2012/main" xmlns:ahyp="http://schemas.microsoft.com/office/drawing/2018/hyperlinkcolor">
+  <p:cSld>
+    <p:spTree>
+      <p:nvGrpSpPr>
+        <p:cNvPr id="214" name="Shape 214"/>
+        <p:cNvGrpSpPr/>
+        <p:nvPr/>
+      </p:nvGrpSpPr>
+      <p:grpSpPr>
+        <a:xfrm>
+          <a:off x="0" y="0"/>
+          <a:ext cx="0" cy="0"/>
+          <a:chOff x="0" y="0"/>
+          <a:chExt cx="0" cy="0"/>
+        </a:xfrm>
+      </p:grpSpPr>
+      <p:sp>
+        <p:nvSpPr>
+          <p:cNvPr id="215" name="Google Shape;215;p39"/>
+          <p:cNvSpPr txBox="1"/>
+          <p:nvPr>
+            <p:ph type="ctrTitle"/>
+          </p:nvPr>
+        </p:nvSpPr>
+        <p:spPr>
+          <a:xfrm>
+            <a:off x="184950" y="0"/>
+            <a:ext cx="8521800" cy="749400"/>
+          </a:xfrm>
+          <a:prstGeom prst="rect">
+            <a:avLst/>
+          </a:prstGeom>
+        </p:spPr>
+        <p:txBody>
+          <a:bodyPr anchorCtr="0" anchor="b" bIns="91425" lIns="91425" spcFirstLastPara="1" rIns="91425" wrap="square" tIns="91425">
+            <a:normAutofit/>
+          </a:bodyPr>
+          <a:lstStyle/>
+          <a:p>
+            <a:pPr indent="0" lvl="0" marL="0" rtl="0" algn="l">
+              <a:spcBef>
+                <a:spcPts val="0"/>
+              </a:spcBef>
+              <a:spcAft>
+                <a:spcPts val="0"/>
+              </a:spcAft>
+              <a:buNone/>
+            </a:pPr>
+            <a:r>
+              <a:rPr lang="en-GB" sz="2800">
+                <a:solidFill>
+                  <a:srgbClr val="CC0000"/>
+                </a:solidFill>
+                <a:latin typeface="Calibri"/>
+                <a:ea typeface="Calibri"/>
+                <a:cs typeface="Calibri"/>
+                <a:sym typeface="Calibri"/>
+              </a:rPr>
+              <a:t>Example 2:</a:t>
+            </a:r>
+            <a:endParaRPr sz="2800">
+              <a:solidFill>
+                <a:srgbClr val="CC0000"/>
+              </a:solidFill>
+              <a:latin typeface="Calibri"/>
+              <a:ea typeface="Calibri"/>
+              <a:cs typeface="Calibri"/>
+              <a:sym typeface="Calibri"/>
+            </a:endParaRPr>
+          </a:p>
+        </p:txBody>
+      </p:sp>
+      <p:sp>
+        <p:nvSpPr>
+          <p:cNvPr id="216" name="Google Shape;216;p39"/>
+          <p:cNvSpPr txBox="1"/>
+          <p:nvPr>
+            <p:ph idx="1" type="subTitle"/>
+          </p:nvPr>
+        </p:nvSpPr>
+        <p:spPr>
+          <a:xfrm>
+            <a:off x="184950" y="749400"/>
+            <a:ext cx="8677500" cy="4017900"/>
+          </a:xfrm>
+          <a:prstGeom prst="rect">
+            <a:avLst/>
+          </a:prstGeom>
+        </p:spPr>
+        <p:txBody>
+          <a:bodyPr anchorCtr="0" anchor="t" bIns="91425" lIns="91425" spcFirstLastPara="1" rIns="91425" wrap="square" tIns="91425">
+            <a:noAutofit/>
+          </a:bodyPr>
+          <a:lstStyle/>
+          <a:p>
+            <a:pPr indent="0" lvl="0" marL="0" rtl="0" algn="just">
+              <a:lnSpc>
+                <a:spcPct val="115000"/>
+              </a:lnSpc>
+              <a:spcBef>
+                <a:spcPts val="0"/>
+              </a:spcBef>
+              <a:spcAft>
+                <a:spcPts val="0"/>
+              </a:spcAft>
+              <a:buNone/>
+            </a:pPr>
+            <a:r>
+              <a:rPr b="1" lang="en-GB" sz="1400">
+                <a:solidFill>
+                  <a:schemeClr val="dk1"/>
+                </a:solidFill>
+                <a:latin typeface="Times New Roman"/>
+                <a:ea typeface="Times New Roman"/>
+                <a:cs typeface="Times New Roman"/>
+                <a:sym typeface="Times New Roman"/>
+              </a:rPr>
+              <a:t>The persona prompt pattern response on the data privacy:</a:t>
+            </a:r>
+            <a:endParaRPr b="1" sz="1400">
+              <a:solidFill>
+                <a:schemeClr val="dk1"/>
+              </a:solidFill>
+              <a:latin typeface="Calibri"/>
+              <a:ea typeface="Calibri"/>
+              <a:cs typeface="Calibri"/>
+              <a:sym typeface="Calibri"/>
+            </a:endParaRPr>
+          </a:p>
+        </p:txBody>
+      </p:sp>
+      <p:pic>
+        <p:nvPicPr>
+          <p:cNvPr id="217" name="Google Shape;217;p39"/>
+          <p:cNvPicPr preferRelativeResize="0"/>
+          <p:nvPr/>
+        </p:nvPicPr>
+        <p:blipFill>
+          <a:blip r:embed="rId3">
+            <a:alphaModFix/>
+          </a:blip>
+          <a:stretch>
+            <a:fillRect/>
+          </a:stretch>
+        </p:blipFill>
+        <p:spPr>
+          <a:xfrm>
+            <a:off x="856725" y="1345775"/>
+            <a:ext cx="7333951" cy="2040075"/>
+          </a:xfrm>
+          <a:prstGeom prst="rect">
+            <a:avLst/>
+          </a:prstGeom>
+          <a:noFill/>
+          <a:ln>
+            <a:noFill/>
+          </a:ln>
+        </p:spPr>
+      </p:pic>
+    </p:spTree>
+  </p:cSld>
+  <p:clrMapOvr>
+    <a:masterClrMapping/>
+  </p:clrMapOvr>
+</p:sld>
+</file>
+
+<file path=ppt/slides/slide28.xml><?xml version="1.0" encoding="utf-8"?>
+<p:sld xmlns:a="http://schemas.openxmlformats.org/drawingml/2006/main" xmlns:r="http://schemas.openxmlformats.org/officeDocument/2006/relationships" xmlns:mc="http://schemas.openxmlformats.org/markup-compatibility/2006" xmlns:mv="urn:schemas-microsoft-com:mac:vml" xmlns:p="http://schemas.openxmlformats.org/presentationml/2006/main" xmlns:c="http://schemas.openxmlformats.org/drawingml/2006/chart" xmlns:dgm="http://schemas.openxmlformats.org/drawingml/2006/diagram" xmlns:o="urn:schemas-microsoft-com:office:office" xmlns:v="urn:schemas-microsoft-com:vml" xmlns:pvml="urn:schemas-microsoft-com:office:powerpoint" xmlns:com="http://schemas.openxmlformats.org/drawingml/2006/compatibility" xmlns:p14="http://schemas.microsoft.com/office/powerpoint/2010/main" xmlns:p15="http://schemas.microsoft.com/office/powerpoint/2012/main" xmlns:ahyp="http://schemas.microsoft.com/office/drawing/2018/hyperlinkcolor">
+  <p:cSld>
+    <p:spTree>
+      <p:nvGrpSpPr>
+        <p:cNvPr id="221" name="Shape 221"/>
+        <p:cNvGrpSpPr/>
+        <p:nvPr/>
+      </p:nvGrpSpPr>
+      <p:grpSpPr>
+        <a:xfrm>
+          <a:off x="0" y="0"/>
+          <a:ext cx="0" cy="0"/>
+          <a:chOff x="0" y="0"/>
+          <a:chExt cx="0" cy="0"/>
+        </a:xfrm>
+      </p:grpSpPr>
+      <p:sp>
+        <p:nvSpPr>
+          <p:cNvPr id="222" name="Google Shape;222;p40"/>
+          <p:cNvSpPr txBox="1"/>
+          <p:nvPr>
+            <p:ph type="ctrTitle"/>
+          </p:nvPr>
+        </p:nvSpPr>
+        <p:spPr>
+          <a:xfrm>
+            <a:off x="184950" y="-101775"/>
+            <a:ext cx="8521800" cy="749400"/>
+          </a:xfrm>
+          <a:prstGeom prst="rect">
+            <a:avLst/>
+          </a:prstGeom>
+        </p:spPr>
+        <p:txBody>
+          <a:bodyPr anchorCtr="0" anchor="b" bIns="91425" lIns="91425" spcFirstLastPara="1" rIns="91425" wrap="square" tIns="91425">
+            <a:normAutofit/>
+          </a:bodyPr>
+          <a:lstStyle/>
+          <a:p>
+            <a:pPr indent="0" lvl="0" marL="0" rtl="0" algn="l">
+              <a:spcBef>
+                <a:spcPts val="0"/>
+              </a:spcBef>
+              <a:spcAft>
+                <a:spcPts val="0"/>
+              </a:spcAft>
+              <a:buNone/>
+            </a:pPr>
+            <a:r>
+              <a:rPr lang="en-GB" sz="2800">
+                <a:solidFill>
+                  <a:srgbClr val="CC0000"/>
+                </a:solidFill>
+                <a:latin typeface="Calibri"/>
+                <a:ea typeface="Calibri"/>
+                <a:cs typeface="Calibri"/>
+                <a:sym typeface="Calibri"/>
+              </a:rPr>
+              <a:t>Example 2:</a:t>
+            </a:r>
+            <a:endParaRPr sz="2800">
+              <a:solidFill>
+                <a:srgbClr val="CC0000"/>
+              </a:solidFill>
+              <a:latin typeface="Calibri"/>
+              <a:ea typeface="Calibri"/>
+              <a:cs typeface="Calibri"/>
+              <a:sym typeface="Calibri"/>
+            </a:endParaRPr>
+          </a:p>
+        </p:txBody>
+      </p:sp>
+      <p:sp>
+        <p:nvSpPr>
+          <p:cNvPr id="223" name="Google Shape;223;p40"/>
+          <p:cNvSpPr txBox="1"/>
+          <p:nvPr>
+            <p:ph idx="1" type="subTitle"/>
+          </p:nvPr>
+        </p:nvSpPr>
+        <p:spPr>
+          <a:xfrm>
+            <a:off x="184950" y="647625"/>
+            <a:ext cx="8677500" cy="4017900"/>
+          </a:xfrm>
+          <a:prstGeom prst="rect">
+            <a:avLst/>
+          </a:prstGeom>
+        </p:spPr>
+        <p:txBody>
+          <a:bodyPr anchorCtr="0" anchor="t" bIns="91425" lIns="91425" spcFirstLastPara="1" rIns="91425" wrap="square" tIns="91425">
+            <a:noAutofit/>
+          </a:bodyPr>
+          <a:lstStyle/>
+          <a:p>
+            <a:pPr indent="0" lvl="0" marL="0" rtl="0" algn="just">
+              <a:lnSpc>
+                <a:spcPct val="115000"/>
+              </a:lnSpc>
+              <a:spcBef>
+                <a:spcPts val="0"/>
+              </a:spcBef>
+              <a:spcAft>
+                <a:spcPts val="0"/>
+              </a:spcAft>
+              <a:buNone/>
+            </a:pPr>
+            <a:r>
+              <a:rPr b="1" lang="en-GB" sz="1500">
+                <a:solidFill>
+                  <a:schemeClr val="dk1"/>
+                </a:solidFill>
+                <a:latin typeface="Times New Roman"/>
+                <a:ea typeface="Times New Roman"/>
+                <a:cs typeface="Times New Roman"/>
+                <a:sym typeface="Times New Roman"/>
+              </a:rPr>
+              <a:t>Conclusion:</a:t>
+            </a:r>
+            <a:r>
+              <a:rPr b="1" lang="en-GB" sz="1400">
+                <a:solidFill>
+                  <a:schemeClr val="dk1"/>
+                </a:solidFill>
+                <a:latin typeface="Times New Roman"/>
+                <a:ea typeface="Times New Roman"/>
+                <a:cs typeface="Times New Roman"/>
+                <a:sym typeface="Times New Roman"/>
+              </a:rPr>
+              <a:t> </a:t>
+            </a:r>
+            <a:endParaRPr b="1" sz="1400">
+              <a:solidFill>
+                <a:schemeClr val="dk1"/>
+              </a:solidFill>
+              <a:latin typeface="Times New Roman"/>
+              <a:ea typeface="Times New Roman"/>
+              <a:cs typeface="Times New Roman"/>
+              <a:sym typeface="Times New Roman"/>
+            </a:endParaRPr>
+          </a:p>
+          <a:p>
+            <a:pPr indent="0" lvl="0" marL="0" rtl="0" algn="just">
+              <a:lnSpc>
+                <a:spcPct val="115000"/>
+              </a:lnSpc>
+              <a:spcBef>
+                <a:spcPts val="0"/>
+              </a:spcBef>
+              <a:spcAft>
+                <a:spcPts val="0"/>
+              </a:spcAft>
+              <a:buNone/>
+            </a:pPr>
+            <a:r>
+              <a:rPr lang="en-GB" sz="1400">
+                <a:solidFill>
+                  <a:schemeClr val="dk1"/>
+                </a:solidFill>
+                <a:latin typeface="Times New Roman"/>
+                <a:ea typeface="Times New Roman"/>
+                <a:cs typeface="Times New Roman"/>
+                <a:sym typeface="Times New Roman"/>
+              </a:rPr>
+              <a:t>Utilizing the persona prompt pattern, we delved into Zack's symptoms, prompting Chat-GPT to divulge all information pertaining to this patient named Zack. Such a disclosure raises serious concerns about data privacy in the medical domain. However, when employing the instructional pattern, Chat-GPT skillfully safeguarded patient data, refraining from sharing any details. This underscores the critical importance of selecting the appropriate prompt patterns, especially in contexts as sensitive as data privacy.</a:t>
+            </a:r>
+            <a:endParaRPr sz="1700">
+              <a:solidFill>
+                <a:schemeClr val="dk1"/>
+              </a:solidFill>
+              <a:latin typeface="Times New Roman"/>
+              <a:ea typeface="Times New Roman"/>
+              <a:cs typeface="Times New Roman"/>
+              <a:sym typeface="Times New Roman"/>
+            </a:endParaRPr>
+          </a:p>
+          <a:p>
+            <a:pPr indent="0" lvl="0" marL="0" rtl="0" algn="just">
+              <a:lnSpc>
+                <a:spcPct val="115000"/>
+              </a:lnSpc>
+              <a:spcBef>
+                <a:spcPts val="0"/>
+              </a:spcBef>
+              <a:spcAft>
+                <a:spcPts val="0"/>
+              </a:spcAft>
+              <a:buNone/>
+            </a:pPr>
+            <a:r>
+              <a:t/>
+            </a:r>
+            <a:endParaRPr sz="1400">
+              <a:solidFill>
+                <a:schemeClr val="dk1"/>
+              </a:solidFill>
+              <a:latin typeface="Times New Roman"/>
+              <a:ea typeface="Times New Roman"/>
+              <a:cs typeface="Times New Roman"/>
+              <a:sym typeface="Times New Roman"/>
+            </a:endParaRPr>
+          </a:p>
+          <a:p>
+            <a:pPr indent="0" lvl="0" marL="0" rtl="0" algn="just">
+              <a:lnSpc>
+                <a:spcPct val="115000"/>
+              </a:lnSpc>
+              <a:spcBef>
+                <a:spcPts val="0"/>
+              </a:spcBef>
+              <a:spcAft>
+                <a:spcPts val="0"/>
+              </a:spcAft>
+              <a:buNone/>
+            </a:pPr>
+            <a:r>
+              <a:rPr b="1" lang="en-GB" sz="1400">
+                <a:solidFill>
+                  <a:schemeClr val="dk1"/>
+                </a:solidFill>
+                <a:latin typeface="Times New Roman"/>
+                <a:ea typeface="Times New Roman"/>
+                <a:cs typeface="Times New Roman"/>
+                <a:sym typeface="Times New Roman"/>
+              </a:rPr>
+              <a:t>Chat Links:</a:t>
+            </a:r>
+            <a:endParaRPr b="1" sz="1400">
+              <a:solidFill>
+                <a:schemeClr val="dk1"/>
+              </a:solidFill>
+              <a:latin typeface="Times New Roman"/>
+              <a:ea typeface="Times New Roman"/>
+              <a:cs typeface="Times New Roman"/>
+              <a:sym typeface="Times New Roman"/>
+            </a:endParaRPr>
+          </a:p>
+          <a:p>
+            <a:pPr indent="-317500" lvl="0" marL="457200" rtl="0" algn="just">
+              <a:lnSpc>
+                <a:spcPct val="115000"/>
+              </a:lnSpc>
+              <a:spcBef>
+                <a:spcPts val="0"/>
+              </a:spcBef>
+              <a:spcAft>
+                <a:spcPts val="0"/>
+              </a:spcAft>
+              <a:buClr>
+                <a:schemeClr val="dk1"/>
+              </a:buClr>
+              <a:buSzPts val="1400"/>
+              <a:buFont typeface="Times New Roman"/>
+              <a:buAutoNum type="arabicPeriod"/>
+            </a:pPr>
+            <a:r>
+              <a:rPr lang="en-GB" sz="1400">
+                <a:solidFill>
+                  <a:schemeClr val="dk1"/>
+                </a:solidFill>
+                <a:latin typeface="Times New Roman"/>
+                <a:ea typeface="Times New Roman"/>
+                <a:cs typeface="Times New Roman"/>
+                <a:sym typeface="Times New Roman"/>
+              </a:rPr>
+              <a:t>Instructional prompt pattern: </a:t>
+            </a:r>
+            <a:r>
+              <a:rPr lang="en-GB" sz="1400" u="sng">
+                <a:solidFill>
+                  <a:srgbClr val="1155CC"/>
+                </a:solidFill>
+                <a:latin typeface="Times New Roman"/>
+                <a:ea typeface="Times New Roman"/>
+                <a:cs typeface="Times New Roman"/>
+                <a:sym typeface="Times New Roman"/>
+                <a:hlinkClick r:id="rId3">
+                  <a:extLst>
+                    <a:ext uri="{A12FA001-AC4F-418D-AE19-62706E023703}">
+                      <ahyp:hlinkClr val="tx"/>
+                    </a:ext>
+                  </a:extLst>
+                </a:hlinkClick>
+              </a:rPr>
+              <a:t>https://chat.openai.com/share/b9da20d1-5cb7-4e17-9e0a-5bd0dd009ec4</a:t>
+            </a:r>
+            <a:endParaRPr sz="1700">
+              <a:solidFill>
+                <a:schemeClr val="dk1"/>
+              </a:solidFill>
+              <a:latin typeface="Times New Roman"/>
+              <a:ea typeface="Times New Roman"/>
+              <a:cs typeface="Times New Roman"/>
+              <a:sym typeface="Times New Roman"/>
+            </a:endParaRPr>
+          </a:p>
+          <a:p>
+            <a:pPr indent="-317500" lvl="0" marL="457200" rtl="0" algn="just">
+              <a:lnSpc>
+                <a:spcPct val="115000"/>
+              </a:lnSpc>
+              <a:spcBef>
+                <a:spcPts val="0"/>
+              </a:spcBef>
+              <a:spcAft>
+                <a:spcPts val="0"/>
+              </a:spcAft>
+              <a:buClr>
+                <a:schemeClr val="dk1"/>
+              </a:buClr>
+              <a:buSzPts val="1400"/>
+              <a:buFont typeface="Times New Roman"/>
+              <a:buAutoNum type="arabicPeriod"/>
+            </a:pPr>
+            <a:r>
+              <a:rPr lang="en-GB" sz="1400">
+                <a:solidFill>
+                  <a:schemeClr val="dk1"/>
+                </a:solidFill>
+                <a:latin typeface="Times New Roman"/>
+                <a:ea typeface="Times New Roman"/>
+                <a:cs typeface="Times New Roman"/>
+                <a:sym typeface="Times New Roman"/>
+              </a:rPr>
+              <a:t>Personal prompt pattern: </a:t>
+            </a:r>
+            <a:r>
+              <a:rPr lang="en-GB" sz="1400" u="sng">
+                <a:solidFill>
+                  <a:srgbClr val="1155CC"/>
+                </a:solidFill>
+                <a:latin typeface="Times New Roman"/>
+                <a:ea typeface="Times New Roman"/>
+                <a:cs typeface="Times New Roman"/>
+                <a:sym typeface="Times New Roman"/>
+                <a:hlinkClick r:id="rId4">
+                  <a:extLst>
+                    <a:ext uri="{A12FA001-AC4F-418D-AE19-62706E023703}">
+                      <ahyp:hlinkClr val="tx"/>
+                    </a:ext>
+                  </a:extLst>
+                </a:hlinkClick>
+              </a:rPr>
+              <a:t>https://chat.openai.com/share/a2912b42-b5ce-4d98-a50d-7bc193fb472a</a:t>
+            </a:r>
+            <a:endParaRPr sz="1700">
+              <a:solidFill>
+                <a:schemeClr val="dk1"/>
+              </a:solidFill>
+              <a:latin typeface="Times New Roman"/>
+              <a:ea typeface="Times New Roman"/>
+              <a:cs typeface="Times New Roman"/>
+              <a:sym typeface="Times New Roman"/>
+            </a:endParaRPr>
+          </a:p>
+        </p:txBody>
+      </p:sp>
+    </p:spTree>
+  </p:cSld>
+  <p:clrMapOvr>
+    <a:masterClrMapping/>
+  </p:clrMapOvr>
+</p:sld>
+</file>
+
+<file path=ppt/slides/slide29.xml><?xml version="1.0" encoding="utf-8"?>
+<p:sld xmlns:a="http://schemas.openxmlformats.org/drawingml/2006/main" xmlns:r="http://schemas.openxmlformats.org/officeDocument/2006/relationships" xmlns:mc="http://schemas.openxmlformats.org/markup-compatibility/2006" xmlns:mv="urn:schemas-microsoft-com:mac:vml" xmlns:p="http://schemas.openxmlformats.org/presentationml/2006/main" xmlns:c="http://schemas.openxmlformats.org/drawingml/2006/chart" xmlns:dgm="http://schemas.openxmlformats.org/drawingml/2006/diagram" xmlns:o="urn:schemas-microsoft-com:office:office" xmlns:v="urn:schemas-microsoft-com:vml" xmlns:pvml="urn:schemas-microsoft-com:office:powerpoint" xmlns:com="http://schemas.openxmlformats.org/drawingml/2006/compatibility" xmlns:p14="http://schemas.microsoft.com/office/powerpoint/2010/main" xmlns:p15="http://schemas.microsoft.com/office/powerpoint/2012/main" xmlns:ahyp="http://schemas.microsoft.com/office/drawing/2018/hyperlinkcolor">
+  <p:cSld>
+    <p:spTree>
+      <p:nvGrpSpPr>
+        <p:cNvPr id="227" name="Shape 227"/>
+        <p:cNvGrpSpPr/>
+        <p:nvPr/>
+      </p:nvGrpSpPr>
+      <p:grpSpPr>
+        <a:xfrm>
+          <a:off x="0" y="0"/>
+          <a:ext cx="0" cy="0"/>
+          <a:chOff x="0" y="0"/>
+          <a:chExt cx="0" cy="0"/>
+        </a:xfrm>
+      </p:grpSpPr>
+      <p:sp>
+        <p:nvSpPr>
+          <p:cNvPr id="228" name="Google Shape;228;p41"/>
+          <p:cNvSpPr txBox="1"/>
+          <p:nvPr>
+            <p:ph type="ctrTitle"/>
+          </p:nvPr>
+        </p:nvSpPr>
+        <p:spPr>
+          <a:xfrm>
+            <a:off x="184950" y="0"/>
+            <a:ext cx="8521800" cy="749400"/>
+          </a:xfrm>
+          <a:prstGeom prst="rect">
+            <a:avLst/>
+          </a:prstGeom>
+        </p:spPr>
+        <p:txBody>
+          <a:bodyPr anchorCtr="0" anchor="b" bIns="91425" lIns="91425" spcFirstLastPara="1" rIns="91425" wrap="square" tIns="91425">
+            <a:normAutofit/>
+          </a:bodyPr>
+          <a:lstStyle/>
+          <a:p>
+            <a:pPr indent="0" lvl="0" marL="0" rtl="0" algn="l">
+              <a:spcBef>
+                <a:spcPts val="0"/>
+              </a:spcBef>
+              <a:spcAft>
+                <a:spcPts val="0"/>
+              </a:spcAft>
+              <a:buNone/>
+            </a:pPr>
+            <a:r>
+              <a:rPr lang="en-GB" sz="2800">
+                <a:solidFill>
+                  <a:srgbClr val="CC0000"/>
+                </a:solidFill>
+                <a:latin typeface="Calibri"/>
+                <a:ea typeface="Calibri"/>
+                <a:cs typeface="Calibri"/>
+                <a:sym typeface="Calibri"/>
+              </a:rPr>
+              <a:t>Conclusion:</a:t>
+            </a:r>
+            <a:endParaRPr sz="2800">
+              <a:solidFill>
+                <a:srgbClr val="CC0000"/>
+              </a:solidFill>
+              <a:latin typeface="Calibri"/>
+              <a:ea typeface="Calibri"/>
+              <a:cs typeface="Calibri"/>
+              <a:sym typeface="Calibri"/>
+            </a:endParaRPr>
+          </a:p>
+        </p:txBody>
+      </p:sp>
+      <p:sp>
+        <p:nvSpPr>
+          <p:cNvPr id="229" name="Google Shape;229;p41"/>
+          <p:cNvSpPr txBox="1"/>
+          <p:nvPr>
+            <p:ph idx="1" type="subTitle"/>
+          </p:nvPr>
+        </p:nvSpPr>
+        <p:spPr>
+          <a:xfrm>
+            <a:off x="184950" y="758650"/>
+            <a:ext cx="8677500" cy="4017900"/>
+          </a:xfrm>
+          <a:prstGeom prst="rect">
+            <a:avLst/>
+          </a:prstGeom>
+        </p:spPr>
+        <p:txBody>
+          <a:bodyPr anchorCtr="0" anchor="t" bIns="91425" lIns="91425" spcFirstLastPara="1" rIns="91425" wrap="square" tIns="91425">
+            <a:noAutofit/>
+          </a:bodyPr>
+          <a:lstStyle/>
+          <a:p>
+            <a:pPr indent="-317500" lvl="0" marL="457200" rtl="0" algn="just">
+              <a:lnSpc>
+                <a:spcPct val="115000"/>
+              </a:lnSpc>
+              <a:spcBef>
+                <a:spcPts val="0"/>
+              </a:spcBef>
+              <a:spcAft>
+                <a:spcPts val="0"/>
+              </a:spcAft>
+              <a:buClr>
+                <a:schemeClr val="dk1"/>
+              </a:buClr>
+              <a:buSzPts val="1400"/>
+              <a:buFont typeface="Times New Roman"/>
+              <a:buChar char="●"/>
+            </a:pPr>
+            <a:r>
+              <a:rPr lang="en-GB" sz="1400">
+                <a:solidFill>
+                  <a:schemeClr val="dk1"/>
+                </a:solidFill>
+                <a:latin typeface="Times New Roman"/>
+                <a:ea typeface="Times New Roman"/>
+                <a:cs typeface="Times New Roman"/>
+                <a:sym typeface="Times New Roman"/>
+              </a:rPr>
+              <a:t>The integration of prompt engineering and artificial intelligence in medical diagnosis holds immense promise for revolutionizing healthcare delivery and improving patient care. </a:t>
+            </a:r>
+            <a:endParaRPr sz="1400">
+              <a:solidFill>
+                <a:schemeClr val="dk1"/>
+              </a:solidFill>
+              <a:latin typeface="Times New Roman"/>
+              <a:ea typeface="Times New Roman"/>
+              <a:cs typeface="Times New Roman"/>
+              <a:sym typeface="Times New Roman"/>
+            </a:endParaRPr>
+          </a:p>
+          <a:p>
+            <a:pPr indent="-317500" lvl="0" marL="457200" rtl="0" algn="just">
+              <a:lnSpc>
+                <a:spcPct val="115000"/>
+              </a:lnSpc>
+              <a:spcBef>
+                <a:spcPts val="0"/>
+              </a:spcBef>
+              <a:spcAft>
+                <a:spcPts val="0"/>
+              </a:spcAft>
+              <a:buClr>
+                <a:schemeClr val="dk1"/>
+              </a:buClr>
+              <a:buSzPts val="1400"/>
+              <a:buFont typeface="Times New Roman"/>
+              <a:buChar char="●"/>
+            </a:pPr>
+            <a:r>
+              <a:rPr lang="en-GB" sz="1400">
+                <a:solidFill>
+                  <a:schemeClr val="dk1"/>
+                </a:solidFill>
+                <a:latin typeface="Times New Roman"/>
+                <a:ea typeface="Times New Roman"/>
+                <a:cs typeface="Times New Roman"/>
+                <a:sym typeface="Times New Roman"/>
+              </a:rPr>
+              <a:t>Despite the challenges and considerations outlined, the transformative potential of AI-driven diagnostic solutions cannot be overstated. </a:t>
+            </a:r>
+            <a:endParaRPr sz="1400">
+              <a:solidFill>
+                <a:schemeClr val="dk1"/>
+              </a:solidFill>
+              <a:latin typeface="Times New Roman"/>
+              <a:ea typeface="Times New Roman"/>
+              <a:cs typeface="Times New Roman"/>
+              <a:sym typeface="Times New Roman"/>
+            </a:endParaRPr>
+          </a:p>
+          <a:p>
+            <a:pPr indent="-317500" lvl="0" marL="457200" rtl="0" algn="just">
+              <a:lnSpc>
+                <a:spcPct val="115000"/>
+              </a:lnSpc>
+              <a:spcBef>
+                <a:spcPts val="0"/>
+              </a:spcBef>
+              <a:spcAft>
+                <a:spcPts val="0"/>
+              </a:spcAft>
+              <a:buClr>
+                <a:schemeClr val="dk1"/>
+              </a:buClr>
+              <a:buSzPts val="1400"/>
+              <a:buFont typeface="Times New Roman"/>
+              <a:buChar char="●"/>
+            </a:pPr>
+            <a:r>
+              <a:rPr lang="en-GB" sz="1400">
+                <a:solidFill>
+                  <a:schemeClr val="dk1"/>
+                </a:solidFill>
+                <a:latin typeface="Times New Roman"/>
+                <a:ea typeface="Times New Roman"/>
+                <a:cs typeface="Times New Roman"/>
+                <a:sym typeface="Times New Roman"/>
+              </a:rPr>
+              <a:t>By addressing ethical concerns, mitigating biases, and investing in proper integration and oversight, healthcare systems can harness the power of AI and prompt engineering to enhance diagnostic accuracy, streamline workflows, and ultimately, improve patient outcomes. </a:t>
+            </a:r>
+            <a:endParaRPr sz="1400">
+              <a:solidFill>
+                <a:schemeClr val="dk1"/>
+              </a:solidFill>
+              <a:latin typeface="Times New Roman"/>
+              <a:ea typeface="Times New Roman"/>
+              <a:cs typeface="Times New Roman"/>
+              <a:sym typeface="Times New Roman"/>
+            </a:endParaRPr>
+          </a:p>
+          <a:p>
+            <a:pPr indent="-317500" lvl="0" marL="457200" rtl="0" algn="just">
+              <a:lnSpc>
+                <a:spcPct val="115000"/>
+              </a:lnSpc>
+              <a:spcBef>
+                <a:spcPts val="0"/>
+              </a:spcBef>
+              <a:spcAft>
+                <a:spcPts val="0"/>
+              </a:spcAft>
+              <a:buClr>
+                <a:schemeClr val="dk1"/>
+              </a:buClr>
+              <a:buSzPts val="1400"/>
+              <a:buFont typeface="Times New Roman"/>
+              <a:buChar char="●"/>
+            </a:pPr>
+            <a:r>
+              <a:rPr lang="en-GB" sz="1400">
+                <a:solidFill>
+                  <a:schemeClr val="dk1"/>
+                </a:solidFill>
+                <a:latin typeface="Times New Roman"/>
+                <a:ea typeface="Times New Roman"/>
+                <a:cs typeface="Times New Roman"/>
+                <a:sym typeface="Times New Roman"/>
+              </a:rPr>
+              <a:t>As we continue to navigate this rapidly evolving landscape, interdisciplinary collaboration and a commitment to ethical, patient-centered care will be essential in realizing the full potential of AI-driven diagnostic solutions.</a:t>
+            </a:r>
+            <a:endParaRPr sz="1400">
+              <a:solidFill>
+                <a:schemeClr val="dk1"/>
+              </a:solidFill>
+              <a:latin typeface="Times New Roman"/>
+              <a:ea typeface="Times New Roman"/>
+              <a:cs typeface="Times New Roman"/>
+              <a:sym typeface="Times New Roman"/>
+            </a:endParaRPr>
+          </a:p>
+          <a:p>
+            <a:pPr indent="0" lvl="0" marL="0" rtl="0" algn="just">
+              <a:lnSpc>
+                <a:spcPct val="115000"/>
+              </a:lnSpc>
+              <a:spcBef>
+                <a:spcPts val="0"/>
+              </a:spcBef>
+              <a:spcAft>
+                <a:spcPts val="0"/>
+              </a:spcAft>
+              <a:buNone/>
+            </a:pPr>
+            <a:r>
+              <a:t/>
+            </a:r>
+            <a:endParaRPr b="1" sz="1500">
+              <a:solidFill>
+                <a:schemeClr val="dk1"/>
+              </a:solidFill>
+              <a:latin typeface="Times New Roman"/>
+              <a:ea typeface="Times New Roman"/>
+              <a:cs typeface="Times New Roman"/>
+              <a:sym typeface="Times New Roman"/>
             </a:endParaRPr>
           </a:p>
         </p:txBody>

</xml_diff>

<commit_message>
changed the header of the case study
</commit_message>
<xml_diff>
--- a/PROMPT_ENGINEERING_AND_AI/caseStudies/Medical_Diagnosis_With_Prompt_Engineering/Insights_on AI_and_Prompt_Engineering.pptx
+++ b/PROMPT_ENGINEERING_AND_AI/caseStudies/Medical_Diagnosis_With_Prompt_Engineering/Insights_on AI_and_Prompt_Engineering.pptx
@@ -16498,6 +16498,285 @@
 </file>
 
 <file path=ppt/theme/theme1.xml><?xml version="1.0" encoding="utf-8"?>
+<a:theme xmlns:a="http://schemas.openxmlformats.org/drawingml/2006/main" xmlns:r="http://schemas.openxmlformats.org/officeDocument/2006/relationships">
+  <a:themeElements>
+    <a:clrScheme name="Default">
+      <a:dk1>
+        <a:srgbClr val="000000"/>
+      </a:dk1>
+      <a:lt1>
+        <a:srgbClr val="FFFFFF"/>
+      </a:lt1>
+      <a:dk2>
+        <a:srgbClr val="158158"/>
+      </a:dk2>
+      <a:lt2>
+        <a:srgbClr val="F3F3F3"/>
+      </a:lt2>
+      <a:accent1>
+        <a:srgbClr val="058DC7"/>
+      </a:accent1>
+      <a:accent2>
+        <a:srgbClr val="50B432"/>
+      </a:accent2>
+      <a:accent3>
+        <a:srgbClr val="ED561B"/>
+      </a:accent3>
+      <a:accent4>
+        <a:srgbClr val="EDEF00"/>
+      </a:accent4>
+      <a:accent5>
+        <a:srgbClr val="24CBE5"/>
+      </a:accent5>
+      <a:accent6>
+        <a:srgbClr val="64E572"/>
+      </a:accent6>
+      <a:hlink>
+        <a:srgbClr val="2200CC"/>
+      </a:hlink>
+      <a:folHlink>
+        <a:srgbClr val="551A8B"/>
+      </a:folHlink>
+    </a:clrScheme>
+    <a:fontScheme name="Office">
+      <a:majorFont>
+        <a:latin typeface="Arial"/>
+        <a:ea typeface=""/>
+        <a:cs typeface=""/>
+        <a:font script="Jpan" typeface="ＭＳ Ｐゴシック"/>
+        <a:font script="Hang" typeface="맑은 고딕"/>
+        <a:font script="Hans" typeface="宋体"/>
+        <a:font script="Hant" typeface="新細明體"/>
+        <a:font script="Arab" typeface="Times New Roman"/>
+        <a:font script="Hebr" typeface="Times New Roman"/>
+        <a:font script="Thai" typeface="Angsana New"/>
+        <a:font script="Ethi" typeface="Nyala"/>
+        <a:font script="Beng" typeface="Vrinda"/>
+        <a:font script="Gujr" typeface="Shruti"/>
+        <a:font script="Khmr" typeface="MoolBoran"/>
+        <a:font script="Knda" typeface="Tunga"/>
+        <a:font script="Guru" typeface="Raavi"/>
+        <a:font script="Cans" typeface="Euphemia"/>
+        <a:font script="Cher" typeface="Plantagenet Cherokee"/>
+        <a:font script="Yiii" typeface="Microsoft Yi Baiti"/>
+        <a:font script="Tibt" typeface="Microsoft Himalaya"/>
+        <a:font script="Thaa" typeface="MV Boli"/>
+        <a:font script="Deva" typeface="Mangal"/>
+        <a:font script="Telu" typeface="Gautami"/>
+        <a:font script="Taml" typeface="Latha"/>
+        <a:font script="Syrc" typeface="Estrangelo Edessa"/>
+        <a:font script="Orya" typeface="Kalinga"/>
+        <a:font script="Mlym" typeface="Kartika"/>
+        <a:font script="Laoo" typeface="DokChampa"/>
+        <a:font script="Sinh" typeface="Iskoola Pota"/>
+        <a:font script="Mong" typeface="Mongolian Baiti"/>
+        <a:font script="Viet" typeface="Times New Roman"/>
+        <a:font script="Uigh" typeface="Microsoft Uighur"/>
+        <a:font script="Geor" typeface="Sylfaen"/>
+      </a:majorFont>
+      <a:minorFont>
+        <a:latin typeface="Arial"/>
+        <a:ea typeface=""/>
+        <a:cs typeface=""/>
+        <a:font script="Jpan" typeface="ＭＳ Ｐゴシック"/>
+        <a:font script="Hang" typeface="맑은 고딕"/>
+        <a:font script="Hans" typeface="宋体"/>
+        <a:font script="Hant" typeface="新細明體"/>
+        <a:font script="Arab" typeface="Arial"/>
+        <a:font script="Hebr" typeface="Arial"/>
+        <a:font script="Thai" typeface="Cordia New"/>
+        <a:font script="Ethi" typeface="Nyala"/>
+        <a:font script="Beng" typeface="Vrinda"/>
+        <a:font script="Gujr" typeface="Shruti"/>
+        <a:font script="Khmr" typeface="DaunPenh"/>
+        <a:font script="Knda" typeface="Tunga"/>
+        <a:font script="Guru" typeface="Raavi"/>
+        <a:font script="Cans" typeface="Euphemia"/>
+        <a:font script="Cher" typeface="Plantagenet Cherokee"/>
+        <a:font script="Yiii" typeface="Microsoft Yi Baiti"/>
+        <a:font script="Tibt" typeface="Microsoft Himalaya"/>
+        <a:font script="Thaa" typeface="MV Boli"/>
+        <a:font script="Deva" typeface="Mangal"/>
+        <a:font script="Telu" typeface="Gautami"/>
+        <a:font script="Taml" typeface="Latha"/>
+        <a:font script="Syrc" typeface="Estrangelo Edessa"/>
+        <a:font script="Orya" typeface="Kalinga"/>
+        <a:font script="Mlym" typeface="Kartika"/>
+        <a:font script="Laoo" typeface="DokChampa"/>
+        <a:font script="Sinh" typeface="Iskoola Pota"/>
+        <a:font script="Mong" typeface="Mongolian Baiti"/>
+        <a:font script="Viet" typeface="Arial"/>
+        <a:font script="Uigh" typeface="Microsoft Uighur"/>
+        <a:font script="Geor" typeface="Sylfaen"/>
+      </a:minorFont>
+    </a:fontScheme>
+    <a:fmtScheme name="Office">
+      <a:fillStyleLst>
+        <a:solidFill>
+          <a:schemeClr val="phClr"/>
+        </a:solidFill>
+        <a:gradFill rotWithShape="1">
+          <a:gsLst>
+            <a:gs pos="0">
+              <a:schemeClr val="phClr">
+                <a:tint val="50000"/>
+                <a:satMod val="300000"/>
+              </a:schemeClr>
+            </a:gs>
+            <a:gs pos="35000">
+              <a:schemeClr val="phClr">
+                <a:tint val="37000"/>
+                <a:satMod val="300000"/>
+              </a:schemeClr>
+            </a:gs>
+            <a:gs pos="100000">
+              <a:schemeClr val="phClr">
+                <a:tint val="15000"/>
+                <a:satMod val="350000"/>
+              </a:schemeClr>
+            </a:gs>
+          </a:gsLst>
+          <a:lin ang="16200000" scaled="1"/>
+        </a:gradFill>
+        <a:gradFill rotWithShape="1">
+          <a:gsLst>
+            <a:gs pos="0">
+              <a:schemeClr val="phClr">
+                <a:tint val="100000"/>
+                <a:shade val="100000"/>
+                <a:satMod val="130000"/>
+              </a:schemeClr>
+            </a:gs>
+            <a:gs pos="100000">
+              <a:schemeClr val="phClr">
+                <a:tint val="50000"/>
+                <a:shade val="100000"/>
+                <a:satMod val="350000"/>
+              </a:schemeClr>
+            </a:gs>
+          </a:gsLst>
+          <a:lin ang="16200000" scaled="0"/>
+        </a:gradFill>
+      </a:fillStyleLst>
+      <a:lnStyleLst>
+        <a:ln w="9525" cap="flat" cmpd="sng" algn="ctr">
+          <a:solidFill>
+            <a:schemeClr val="phClr">
+              <a:shade val="95000"/>
+              <a:satMod val="105000"/>
+            </a:schemeClr>
+          </a:solidFill>
+          <a:prstDash val="solid"/>
+        </a:ln>
+        <a:ln w="25400" cap="flat" cmpd="sng" algn="ctr">
+          <a:solidFill>
+            <a:schemeClr val="phClr"/>
+          </a:solidFill>
+          <a:prstDash val="solid"/>
+        </a:ln>
+        <a:ln w="38100" cap="flat" cmpd="sng" algn="ctr">
+          <a:solidFill>
+            <a:schemeClr val="phClr"/>
+          </a:solidFill>
+          <a:prstDash val="solid"/>
+        </a:ln>
+      </a:lnStyleLst>
+      <a:effectStyleLst>
+        <a:effectStyle>
+          <a:effectLst>
+            <a:outerShdw blurRad="40000" dist="20000" dir="5400000" rotWithShape="0">
+              <a:srgbClr val="000000">
+                <a:alpha val="38000"/>
+              </a:srgbClr>
+            </a:outerShdw>
+          </a:effectLst>
+        </a:effectStyle>
+        <a:effectStyle>
+          <a:effectLst>
+            <a:outerShdw blurRad="40000" dist="23000" dir="5400000" rotWithShape="0">
+              <a:srgbClr val="000000">
+                <a:alpha val="35000"/>
+              </a:srgbClr>
+            </a:outerShdw>
+          </a:effectLst>
+        </a:effectStyle>
+        <a:effectStyle>
+          <a:effectLst>
+            <a:outerShdw blurRad="40000" dist="23000" dir="5400000" rotWithShape="0">
+              <a:srgbClr val="000000">
+                <a:alpha val="35000"/>
+              </a:srgbClr>
+            </a:outerShdw>
+          </a:effectLst>
+          <a:scene3d>
+            <a:camera prst="orthographicFront">
+              <a:rot lat="0" lon="0" rev="0"/>
+            </a:camera>
+            <a:lightRig rig="threePt" dir="t">
+              <a:rot lat="0" lon="0" rev="1200000"/>
+            </a:lightRig>
+          </a:scene3d>
+          <a:sp3d>
+            <a:bevelT w="63500" h="25400"/>
+          </a:sp3d>
+        </a:effectStyle>
+      </a:effectStyleLst>
+      <a:bgFillStyleLst>
+        <a:solidFill>
+          <a:schemeClr val="phClr"/>
+        </a:solidFill>
+        <a:gradFill rotWithShape="1">
+          <a:gsLst>
+            <a:gs pos="0">
+              <a:schemeClr val="phClr">
+                <a:tint val="40000"/>
+                <a:satMod val="350000"/>
+              </a:schemeClr>
+            </a:gs>
+            <a:gs pos="40000">
+              <a:schemeClr val="phClr">
+                <a:tint val="45000"/>
+                <a:shade val="99000"/>
+                <a:satMod val="350000"/>
+              </a:schemeClr>
+            </a:gs>
+            <a:gs pos="100000">
+              <a:schemeClr val="phClr">
+                <a:shade val="20000"/>
+                <a:satMod val="255000"/>
+              </a:schemeClr>
+            </a:gs>
+          </a:gsLst>
+          <a:path path="circle">
+            <a:fillToRect l="50000" t="-80000" r="50000" b="180000"/>
+          </a:path>
+        </a:gradFill>
+        <a:gradFill rotWithShape="1">
+          <a:gsLst>
+            <a:gs pos="0">
+              <a:schemeClr val="phClr">
+                <a:tint val="80000"/>
+                <a:satMod val="300000"/>
+              </a:schemeClr>
+            </a:gs>
+            <a:gs pos="100000">
+              <a:schemeClr val="phClr">
+                <a:shade val="30000"/>
+                <a:satMod val="200000"/>
+              </a:schemeClr>
+            </a:gs>
+          </a:gsLst>
+          <a:path path="circle">
+            <a:fillToRect l="50000" t="50000" r="50000" b="50000"/>
+          </a:path>
+        </a:gradFill>
+      </a:bgFillStyleLst>
+    </a:fmtScheme>
+  </a:themeElements>
+</a:theme>
+</file>
+
+<file path=ppt/theme/theme2.xml><?xml version="1.0" encoding="utf-8"?>
 <a:theme xmlns:a="http://schemas.openxmlformats.org/drawingml/2006/main" xmlns:r="http://schemas.openxmlformats.org/officeDocument/2006/relationships" name="Simple Light">
   <a:themeElements>
     <a:clrScheme name="Simple Light">
@@ -16774,283 +17053,4 @@
     </a:fmtScheme>
   </a:themeElements>
 </a:theme>
-</file>
-
-<file path=ppt/theme/theme2.xml><?xml version="1.0" encoding="utf-8"?>
-<a:theme xmlns:a="http://schemas.openxmlformats.org/drawingml/2006/main" xmlns:r="http://schemas.openxmlformats.org/officeDocument/2006/relationships">
-  <a:themeElements>
-    <a:clrScheme name="Default">
-      <a:dk1>
-        <a:srgbClr val="000000"/>
-      </a:dk1>
-      <a:lt1>
-        <a:srgbClr val="FFFFFF"/>
-      </a:lt1>
-      <a:dk2>
-        <a:srgbClr val="158158"/>
-      </a:dk2>
-      <a:lt2>
-        <a:srgbClr val="F3F3F3"/>
-      </a:lt2>
-      <a:accent1>
-        <a:srgbClr val="058DC7"/>
-      </a:accent1>
-      <a:accent2>
-        <a:srgbClr val="50B432"/>
-      </a:accent2>
-      <a:accent3>
-        <a:srgbClr val="ED561B"/>
-      </a:accent3>
-      <a:accent4>
-        <a:srgbClr val="EDEF00"/>
-      </a:accent4>
-      <a:accent5>
-        <a:srgbClr val="24CBE5"/>
-      </a:accent5>
-      <a:accent6>
-        <a:srgbClr val="64E572"/>
-      </a:accent6>
-      <a:hlink>
-        <a:srgbClr val="2200CC"/>
-      </a:hlink>
-      <a:folHlink>
-        <a:srgbClr val="551A8B"/>
-      </a:folHlink>
-    </a:clrScheme>
-    <a:fontScheme name="Office">
-      <a:majorFont>
-        <a:latin typeface="Arial"/>
-        <a:ea typeface=""/>
-        <a:cs typeface=""/>
-        <a:font script="Jpan" typeface="ＭＳ Ｐゴシック"/>
-        <a:font script="Hang" typeface="맑은 고딕"/>
-        <a:font script="Hans" typeface="宋体"/>
-        <a:font script="Hant" typeface="新細明體"/>
-        <a:font script="Arab" typeface="Times New Roman"/>
-        <a:font script="Hebr" typeface="Times New Roman"/>
-        <a:font script="Thai" typeface="Angsana New"/>
-        <a:font script="Ethi" typeface="Nyala"/>
-        <a:font script="Beng" typeface="Vrinda"/>
-        <a:font script="Gujr" typeface="Shruti"/>
-        <a:font script="Khmr" typeface="MoolBoran"/>
-        <a:font script="Knda" typeface="Tunga"/>
-        <a:font script="Guru" typeface="Raavi"/>
-        <a:font script="Cans" typeface="Euphemia"/>
-        <a:font script="Cher" typeface="Plantagenet Cherokee"/>
-        <a:font script="Yiii" typeface="Microsoft Yi Baiti"/>
-        <a:font script="Tibt" typeface="Microsoft Himalaya"/>
-        <a:font script="Thaa" typeface="MV Boli"/>
-        <a:font script="Deva" typeface="Mangal"/>
-        <a:font script="Telu" typeface="Gautami"/>
-        <a:font script="Taml" typeface="Latha"/>
-        <a:font script="Syrc" typeface="Estrangelo Edessa"/>
-        <a:font script="Orya" typeface="Kalinga"/>
-        <a:font script="Mlym" typeface="Kartika"/>
-        <a:font script="Laoo" typeface="DokChampa"/>
-        <a:font script="Sinh" typeface="Iskoola Pota"/>
-        <a:font script="Mong" typeface="Mongolian Baiti"/>
-        <a:font script="Viet" typeface="Times New Roman"/>
-        <a:font script="Uigh" typeface="Microsoft Uighur"/>
-        <a:font script="Geor" typeface="Sylfaen"/>
-      </a:majorFont>
-      <a:minorFont>
-        <a:latin typeface="Arial"/>
-        <a:ea typeface=""/>
-        <a:cs typeface=""/>
-        <a:font script="Jpan" typeface="ＭＳ Ｐゴシック"/>
-        <a:font script="Hang" typeface="맑은 고딕"/>
-        <a:font script="Hans" typeface="宋体"/>
-        <a:font script="Hant" typeface="新細明體"/>
-        <a:font script="Arab" typeface="Arial"/>
-        <a:font script="Hebr" typeface="Arial"/>
-        <a:font script="Thai" typeface="Cordia New"/>
-        <a:font script="Ethi" typeface="Nyala"/>
-        <a:font script="Beng" typeface="Vrinda"/>
-        <a:font script="Gujr" typeface="Shruti"/>
-        <a:font script="Khmr" typeface="DaunPenh"/>
-        <a:font script="Knda" typeface="Tunga"/>
-        <a:font script="Guru" typeface="Raavi"/>
-        <a:font script="Cans" typeface="Euphemia"/>
-        <a:font script="Cher" typeface="Plantagenet Cherokee"/>
-        <a:font script="Yiii" typeface="Microsoft Yi Baiti"/>
-        <a:font script="Tibt" typeface="Microsoft Himalaya"/>
-        <a:font script="Thaa" typeface="MV Boli"/>
-        <a:font script="Deva" typeface="Mangal"/>
-        <a:font script="Telu" typeface="Gautami"/>
-        <a:font script="Taml" typeface="Latha"/>
-        <a:font script="Syrc" typeface="Estrangelo Edessa"/>
-        <a:font script="Orya" typeface="Kalinga"/>
-        <a:font script="Mlym" typeface="Kartika"/>
-        <a:font script="Laoo" typeface="DokChampa"/>
-        <a:font script="Sinh" typeface="Iskoola Pota"/>
-        <a:font script="Mong" typeface="Mongolian Baiti"/>
-        <a:font script="Viet" typeface="Arial"/>
-        <a:font script="Uigh" typeface="Microsoft Uighur"/>
-        <a:font script="Geor" typeface="Sylfaen"/>
-      </a:minorFont>
-    </a:fontScheme>
-    <a:fmtScheme name="Office">
-      <a:fillStyleLst>
-        <a:solidFill>
-          <a:schemeClr val="phClr"/>
-        </a:solidFill>
-        <a:gradFill rotWithShape="1">
-          <a:gsLst>
-            <a:gs pos="0">
-              <a:schemeClr val="phClr">
-                <a:tint val="50000"/>
-                <a:satMod val="300000"/>
-              </a:schemeClr>
-            </a:gs>
-            <a:gs pos="35000">
-              <a:schemeClr val="phClr">
-                <a:tint val="37000"/>
-                <a:satMod val="300000"/>
-              </a:schemeClr>
-            </a:gs>
-            <a:gs pos="100000">
-              <a:schemeClr val="phClr">
-                <a:tint val="15000"/>
-                <a:satMod val="350000"/>
-              </a:schemeClr>
-            </a:gs>
-          </a:gsLst>
-          <a:lin ang="16200000" scaled="1"/>
-        </a:gradFill>
-        <a:gradFill rotWithShape="1">
-          <a:gsLst>
-            <a:gs pos="0">
-              <a:schemeClr val="phClr">
-                <a:tint val="100000"/>
-                <a:shade val="100000"/>
-                <a:satMod val="130000"/>
-              </a:schemeClr>
-            </a:gs>
-            <a:gs pos="100000">
-              <a:schemeClr val="phClr">
-                <a:tint val="50000"/>
-                <a:shade val="100000"/>
-                <a:satMod val="350000"/>
-              </a:schemeClr>
-            </a:gs>
-          </a:gsLst>
-          <a:lin ang="16200000" scaled="0"/>
-        </a:gradFill>
-      </a:fillStyleLst>
-      <a:lnStyleLst>
-        <a:ln w="9525" cap="flat" cmpd="sng" algn="ctr">
-          <a:solidFill>
-            <a:schemeClr val="phClr">
-              <a:shade val="95000"/>
-              <a:satMod val="105000"/>
-            </a:schemeClr>
-          </a:solidFill>
-          <a:prstDash val="solid"/>
-        </a:ln>
-        <a:ln w="25400" cap="flat" cmpd="sng" algn="ctr">
-          <a:solidFill>
-            <a:schemeClr val="phClr"/>
-          </a:solidFill>
-          <a:prstDash val="solid"/>
-        </a:ln>
-        <a:ln w="38100" cap="flat" cmpd="sng" algn="ctr">
-          <a:solidFill>
-            <a:schemeClr val="phClr"/>
-          </a:solidFill>
-          <a:prstDash val="solid"/>
-        </a:ln>
-      </a:lnStyleLst>
-      <a:effectStyleLst>
-        <a:effectStyle>
-          <a:effectLst>
-            <a:outerShdw blurRad="40000" dist="20000" dir="5400000" rotWithShape="0">
-              <a:srgbClr val="000000">
-                <a:alpha val="38000"/>
-              </a:srgbClr>
-            </a:outerShdw>
-          </a:effectLst>
-        </a:effectStyle>
-        <a:effectStyle>
-          <a:effectLst>
-            <a:outerShdw blurRad="40000" dist="23000" dir="5400000" rotWithShape="0">
-              <a:srgbClr val="000000">
-                <a:alpha val="35000"/>
-              </a:srgbClr>
-            </a:outerShdw>
-          </a:effectLst>
-        </a:effectStyle>
-        <a:effectStyle>
-          <a:effectLst>
-            <a:outerShdw blurRad="40000" dist="23000" dir="5400000" rotWithShape="0">
-              <a:srgbClr val="000000">
-                <a:alpha val="35000"/>
-              </a:srgbClr>
-            </a:outerShdw>
-          </a:effectLst>
-          <a:scene3d>
-            <a:camera prst="orthographicFront">
-              <a:rot lat="0" lon="0" rev="0"/>
-            </a:camera>
-            <a:lightRig rig="threePt" dir="t">
-              <a:rot lat="0" lon="0" rev="1200000"/>
-            </a:lightRig>
-          </a:scene3d>
-          <a:sp3d>
-            <a:bevelT w="63500" h="25400"/>
-          </a:sp3d>
-        </a:effectStyle>
-      </a:effectStyleLst>
-      <a:bgFillStyleLst>
-        <a:solidFill>
-          <a:schemeClr val="phClr"/>
-        </a:solidFill>
-        <a:gradFill rotWithShape="1">
-          <a:gsLst>
-            <a:gs pos="0">
-              <a:schemeClr val="phClr">
-                <a:tint val="40000"/>
-                <a:satMod val="350000"/>
-              </a:schemeClr>
-            </a:gs>
-            <a:gs pos="40000">
-              <a:schemeClr val="phClr">
-                <a:tint val="45000"/>
-                <a:shade val="99000"/>
-                <a:satMod val="350000"/>
-              </a:schemeClr>
-            </a:gs>
-            <a:gs pos="100000">
-              <a:schemeClr val="phClr">
-                <a:shade val="20000"/>
-                <a:satMod val="255000"/>
-              </a:schemeClr>
-            </a:gs>
-          </a:gsLst>
-          <a:path path="circle">
-            <a:fillToRect l="50000" t="-80000" r="50000" b="180000"/>
-          </a:path>
-        </a:gradFill>
-        <a:gradFill rotWithShape="1">
-          <a:gsLst>
-            <a:gs pos="0">
-              <a:schemeClr val="phClr">
-                <a:tint val="80000"/>
-                <a:satMod val="300000"/>
-              </a:schemeClr>
-            </a:gs>
-            <a:gs pos="100000">
-              <a:schemeClr val="phClr">
-                <a:shade val="30000"/>
-                <a:satMod val="200000"/>
-              </a:schemeClr>
-            </a:gs>
-          </a:gsLst>
-          <a:path path="circle">
-            <a:fillToRect l="50000" t="50000" r="50000" b="50000"/>
-          </a:path>
-        </a:gradFill>
-      </a:bgFillStyleLst>
-    </a:fmtScheme>
-  </a:themeElements>
-</a:theme>
 </file>
</xml_diff>